<commit_message>
visualizations at a region level is done. Visualization at station level including clustering needs to be done
</commit_message>
<xml_diff>
--- a/Rental_Fleet_Demand_Forecast/docs/read_me/SW_control_flow_master_branch.pptx
+++ b/Rental_Fleet_Demand_Forecast/docs/read_me/SW_control_flow_master_branch.pptx
@@ -276,7 +276,7 @@
           <a:p>
             <a:fld id="{501C5513-828F-40DC-BD54-7AD8E5214853}" type="datetimeFigureOut">
               <a:rPr lang="en-SG" smtClean="0"/>
-              <a:t>25/5/2023</a:t>
+              <a:t>9/6/2023</a:t>
             </a:fld>
             <a:endParaRPr lang="en-SG"/>
           </a:p>
@@ -476,7 +476,7 @@
           <a:p>
             <a:fld id="{501C5513-828F-40DC-BD54-7AD8E5214853}" type="datetimeFigureOut">
               <a:rPr lang="en-SG" smtClean="0"/>
-              <a:t>25/5/2023</a:t>
+              <a:t>9/6/2023</a:t>
             </a:fld>
             <a:endParaRPr lang="en-SG"/>
           </a:p>
@@ -686,7 +686,7 @@
           <a:p>
             <a:fld id="{501C5513-828F-40DC-BD54-7AD8E5214853}" type="datetimeFigureOut">
               <a:rPr lang="en-SG" smtClean="0"/>
-              <a:t>25/5/2023</a:t>
+              <a:t>9/6/2023</a:t>
             </a:fld>
             <a:endParaRPr lang="en-SG"/>
           </a:p>
@@ -886,7 +886,7 @@
           <a:p>
             <a:fld id="{501C5513-828F-40DC-BD54-7AD8E5214853}" type="datetimeFigureOut">
               <a:rPr lang="en-SG" smtClean="0"/>
-              <a:t>25/5/2023</a:t>
+              <a:t>9/6/2023</a:t>
             </a:fld>
             <a:endParaRPr lang="en-SG"/>
           </a:p>
@@ -1162,7 +1162,7 @@
           <a:p>
             <a:fld id="{501C5513-828F-40DC-BD54-7AD8E5214853}" type="datetimeFigureOut">
               <a:rPr lang="en-SG" smtClean="0"/>
-              <a:t>25/5/2023</a:t>
+              <a:t>9/6/2023</a:t>
             </a:fld>
             <a:endParaRPr lang="en-SG"/>
           </a:p>
@@ -1430,7 +1430,7 @@
           <a:p>
             <a:fld id="{501C5513-828F-40DC-BD54-7AD8E5214853}" type="datetimeFigureOut">
               <a:rPr lang="en-SG" smtClean="0"/>
-              <a:t>25/5/2023</a:t>
+              <a:t>9/6/2023</a:t>
             </a:fld>
             <a:endParaRPr lang="en-SG"/>
           </a:p>
@@ -1845,7 +1845,7 @@
           <a:p>
             <a:fld id="{501C5513-828F-40DC-BD54-7AD8E5214853}" type="datetimeFigureOut">
               <a:rPr lang="en-SG" smtClean="0"/>
-              <a:t>25/5/2023</a:t>
+              <a:t>9/6/2023</a:t>
             </a:fld>
             <a:endParaRPr lang="en-SG"/>
           </a:p>
@@ -1987,7 +1987,7 @@
           <a:p>
             <a:fld id="{501C5513-828F-40DC-BD54-7AD8E5214853}" type="datetimeFigureOut">
               <a:rPr lang="en-SG" smtClean="0"/>
-              <a:t>25/5/2023</a:t>
+              <a:t>9/6/2023</a:t>
             </a:fld>
             <a:endParaRPr lang="en-SG"/>
           </a:p>
@@ -2100,7 +2100,7 @@
           <a:p>
             <a:fld id="{501C5513-828F-40DC-BD54-7AD8E5214853}" type="datetimeFigureOut">
               <a:rPr lang="en-SG" smtClean="0"/>
-              <a:t>25/5/2023</a:t>
+              <a:t>9/6/2023</a:t>
             </a:fld>
             <a:endParaRPr lang="en-SG"/>
           </a:p>
@@ -2413,7 +2413,7 @@
           <a:p>
             <a:fld id="{501C5513-828F-40DC-BD54-7AD8E5214853}" type="datetimeFigureOut">
               <a:rPr lang="en-SG" smtClean="0"/>
-              <a:t>25/5/2023</a:t>
+              <a:t>9/6/2023</a:t>
             </a:fld>
             <a:endParaRPr lang="en-SG"/>
           </a:p>
@@ -2702,7 +2702,7 @@
           <a:p>
             <a:fld id="{501C5513-828F-40DC-BD54-7AD8E5214853}" type="datetimeFigureOut">
               <a:rPr lang="en-SG" smtClean="0"/>
-              <a:t>25/5/2023</a:t>
+              <a:t>9/6/2023</a:t>
             </a:fld>
             <a:endParaRPr lang="en-SG"/>
           </a:p>
@@ -2945,7 +2945,7 @@
           <a:p>
             <a:fld id="{501C5513-828F-40DC-BD54-7AD8E5214853}" type="datetimeFigureOut">
               <a:rPr lang="en-SG" smtClean="0"/>
-              <a:t>25/5/2023</a:t>
+              <a:t>9/6/2023</a:t>
             </a:fld>
             <a:endParaRPr lang="en-SG"/>
           </a:p>
@@ -4681,47 +4681,6 @@
           <a:chExt cx="0" cy="0"/>
         </a:xfrm>
       </p:grpSpPr>
-      <p:sp>
-        <p:nvSpPr>
-          <p:cNvPr id="7" name="TextBox 6">
-            <a:hlinkClick r:id="rId2" action="ppaction://hlinksldjump"/>
-            <a:extLst>
-              <a:ext uri="{FF2B5EF4-FFF2-40B4-BE49-F238E27FC236}">
-                <a16:creationId xmlns:a16="http://schemas.microsoft.com/office/drawing/2014/main" id="{D4C3CDD9-5CBA-34BC-E2ED-6FE746F91DB0}"/>
-              </a:ext>
-            </a:extLst>
-          </p:cNvPr>
-          <p:cNvSpPr txBox="1"/>
-          <p:nvPr/>
-        </p:nvSpPr>
-        <p:spPr>
-          <a:xfrm>
-            <a:off x="4257649" y="6536860"/>
-            <a:ext cx="1129164" cy="307777"/>
-          </a:xfrm>
-          <a:prstGeom prst="rect">
-            <a:avLst/>
-          </a:prstGeom>
-          <a:noFill/>
-          <a:ln>
-            <a:solidFill>
-              <a:schemeClr val="tx1"/>
-            </a:solidFill>
-          </a:ln>
-        </p:spPr>
-        <p:txBody>
-          <a:bodyPr wrap="square" rtlCol="0">
-            <a:spAutoFit/>
-          </a:bodyPr>
-          <a:lstStyle/>
-          <a:p>
-            <a:r>
-              <a:rPr lang="en-SG" sz="1400" dirty="0"/>
-              <a:t>Continued..</a:t>
-            </a:r>
-          </a:p>
-        </p:txBody>
-      </p:sp>
       <p:cxnSp>
         <p:nvCxnSpPr>
           <p:cNvPr id="12" name="Straight Arrow Connector 11">
@@ -5503,176 +5462,6 @@
       </p:cxnSp>
       <p:sp>
         <p:nvSpPr>
-          <p:cNvPr id="43" name="Flowchart: Data 42">
-            <a:extLst>
-              <a:ext uri="{FF2B5EF4-FFF2-40B4-BE49-F238E27FC236}">
-                <a16:creationId xmlns:a16="http://schemas.microsoft.com/office/drawing/2014/main" id="{8C70DEF7-1C7A-4298-B80D-A5512061A554}"/>
-              </a:ext>
-            </a:extLst>
-          </p:cNvPr>
-          <p:cNvSpPr/>
-          <p:nvPr/>
-        </p:nvSpPr>
-        <p:spPr>
-          <a:xfrm>
-            <a:off x="1717890" y="5711988"/>
-            <a:ext cx="4897925" cy="709685"/>
-          </a:xfrm>
-          <a:prstGeom prst="flowChartInputOutput">
-            <a:avLst/>
-          </a:prstGeom>
-          <a:noFill/>
-          <a:ln w="28575">
-            <a:solidFill>
-              <a:srgbClr val="92D050"/>
-            </a:solidFill>
-          </a:ln>
-        </p:spPr>
-        <p:style>
-          <a:lnRef idx="2">
-            <a:schemeClr val="accent1">
-              <a:shade val="50000"/>
-            </a:schemeClr>
-          </a:lnRef>
-          <a:fillRef idx="1">
-            <a:schemeClr val="accent1"/>
-          </a:fillRef>
-          <a:effectRef idx="0">
-            <a:schemeClr val="accent1"/>
-          </a:effectRef>
-          <a:fontRef idx="minor">
-            <a:schemeClr val="lt1"/>
-          </a:fontRef>
-        </p:style>
-        <p:txBody>
-          <a:bodyPr rtlCol="0" anchor="ctr"/>
-          <a:lstStyle/>
-          <a:p>
-            <a:r>
-              <a:rPr lang="en-US" sz="1000" b="0" dirty="0">
-                <a:solidFill>
-                  <a:srgbClr val="CE9178"/>
-                </a:solidFill>
-                <a:effectLst/>
-                <a:latin typeface="Consolas" panose="020B0609020204030204" pitchFamily="49" charset="0"/>
-              </a:rPr>
-              <a:t>Woodlands_all_clstr_train_data.csv</a:t>
-            </a:r>
-          </a:p>
-          <a:p>
-            <a:r>
-              <a:rPr lang="en-US" sz="1000" b="0" dirty="0">
-                <a:solidFill>
-                  <a:srgbClr val="CE9178"/>
-                </a:solidFill>
-                <a:effectLst/>
-                <a:latin typeface="Consolas" panose="020B0609020204030204" pitchFamily="49" charset="0"/>
-              </a:rPr>
-              <a:t>Woodlands_all_clstr_full_train_data.csv</a:t>
-            </a:r>
-            <a:endParaRPr lang="en-US" sz="1000" b="0" dirty="0">
-              <a:solidFill>
-                <a:srgbClr val="CCCCCC"/>
-              </a:solidFill>
-              <a:effectLst/>
-              <a:latin typeface="Consolas" panose="020B0609020204030204" pitchFamily="49" charset="0"/>
-            </a:endParaRPr>
-          </a:p>
-          <a:p>
-            <a:r>
-              <a:rPr lang="en-US" sz="1000" b="0" dirty="0">
-                <a:solidFill>
-                  <a:srgbClr val="CE9178"/>
-                </a:solidFill>
-                <a:effectLst/>
-                <a:latin typeface="Consolas" panose="020B0609020204030204" pitchFamily="49" charset="0"/>
-              </a:rPr>
-              <a:t>Woodlands</a:t>
-            </a:r>
-            <a:r>
-              <a:rPr lang="en-SG" sz="1000" b="0" dirty="0">
-                <a:solidFill>
-                  <a:srgbClr val="CE9178"/>
-                </a:solidFill>
-                <a:effectLst/>
-                <a:latin typeface="Consolas" panose="020B0609020204030204" pitchFamily="49" charset="0"/>
-              </a:rPr>
-              <a:t>_</a:t>
-            </a:r>
-            <a:r>
-              <a:rPr lang="en-SG" sz="1000" b="0" dirty="0" err="1">
-                <a:solidFill>
-                  <a:srgbClr val="CE9178"/>
-                </a:solidFill>
-                <a:effectLst/>
-                <a:latin typeface="Consolas" panose="020B0609020204030204" pitchFamily="49" charset="0"/>
-              </a:rPr>
-              <a:t>all_clstr_val_data</a:t>
-            </a:r>
-            <a:r>
-              <a:rPr lang="en-US" sz="1000" b="0" dirty="0">
-                <a:solidFill>
-                  <a:srgbClr val="CE9178"/>
-                </a:solidFill>
-                <a:effectLst/>
-                <a:latin typeface="Consolas" panose="020B0609020204030204" pitchFamily="49" charset="0"/>
-              </a:rPr>
-              <a:t>.csv</a:t>
-            </a:r>
-            <a:endParaRPr lang="en-SG" sz="1000" b="0" dirty="0">
-              <a:solidFill>
-                <a:srgbClr val="CCCCCC"/>
-              </a:solidFill>
-              <a:effectLst/>
-              <a:latin typeface="Consolas" panose="020B0609020204030204" pitchFamily="49" charset="0"/>
-            </a:endParaRPr>
-          </a:p>
-          <a:p>
-            <a:r>
-              <a:rPr lang="en-US" sz="1000" b="0" dirty="0">
-                <a:solidFill>
-                  <a:srgbClr val="CE9178"/>
-                </a:solidFill>
-                <a:effectLst/>
-                <a:latin typeface="Consolas" panose="020B0609020204030204" pitchFamily="49" charset="0"/>
-              </a:rPr>
-              <a:t>Woodlands</a:t>
-            </a:r>
-            <a:r>
-              <a:rPr lang="en-SG" sz="1000" b="0" dirty="0">
-                <a:solidFill>
-                  <a:srgbClr val="CE9178"/>
-                </a:solidFill>
-                <a:effectLst/>
-                <a:latin typeface="Consolas" panose="020B0609020204030204" pitchFamily="49" charset="0"/>
-              </a:rPr>
-              <a:t>_</a:t>
-            </a:r>
-            <a:r>
-              <a:rPr lang="en-SG" sz="1000" b="0" dirty="0" err="1">
-                <a:solidFill>
-                  <a:srgbClr val="CE9178"/>
-                </a:solidFill>
-                <a:effectLst/>
-                <a:latin typeface="Consolas" panose="020B0609020204030204" pitchFamily="49" charset="0"/>
-              </a:rPr>
-              <a:t>all_clstr_test_data</a:t>
-            </a:r>
-            <a:r>
-              <a:rPr lang="en-US" sz="1000" b="0" dirty="0">
-                <a:solidFill>
-                  <a:srgbClr val="CE9178"/>
-                </a:solidFill>
-                <a:effectLst/>
-                <a:latin typeface="Consolas" panose="020B0609020204030204" pitchFamily="49" charset="0"/>
-              </a:rPr>
-              <a:t>.csv</a:t>
-            </a:r>
-          </a:p>
-        </p:txBody>
-      </p:sp>
-      <p:sp>
-        <p:nvSpPr>
           <p:cNvPr id="48" name="Rectangle: Rounded Corners 47">
             <a:extLst>
               <a:ext uri="{FF2B5EF4-FFF2-40B4-BE49-F238E27FC236}">
@@ -5737,7 +5526,7 @@
       <p:sp>
         <p:nvSpPr>
           <p:cNvPr id="53" name="Flowchart: Process 52">
-            <a:hlinkClick r:id="rId3" action="ppaction://hlinksldjump"/>
+            <a:hlinkClick r:id="rId2" action="ppaction://hlinksldjump"/>
             <a:extLst>
               <a:ext uri="{FF2B5EF4-FFF2-40B4-BE49-F238E27FC236}">
                 <a16:creationId xmlns:a16="http://schemas.microsoft.com/office/drawing/2014/main" id="{EEAB755A-0EF9-1DB2-85BD-525E5E507652}"/>
@@ -5829,14 +5618,13 @@
           <p:cNvCxnSpPr>
             <a:cxnSpLocks/>
             <a:stCxn id="53" idx="2"/>
-            <a:endCxn id="43" idx="1"/>
           </p:cNvCxnSpPr>
           <p:nvPr/>
         </p:nvCxnSpPr>
         <p:spPr>
-          <a:xfrm>
-            <a:off x="4166853" y="5481617"/>
-            <a:ext cx="0" cy="230371"/>
+          <a:xfrm flipH="1">
+            <a:off x="4160061" y="5481617"/>
+            <a:ext cx="6792" cy="1312513"/>
           </a:xfrm>
           <a:prstGeom prst="straightConnector1">
             <a:avLst/>
@@ -6395,18 +6183,18 @@
           </p:cNvPr>
           <p:cNvCxnSpPr>
             <a:cxnSpLocks/>
-            <a:stCxn id="21" idx="2"/>
-            <a:endCxn id="43" idx="2"/>
           </p:cNvCxnSpPr>
           <p:nvPr/>
         </p:nvCxnSpPr>
         <p:spPr>
           <a:xfrm rot="16200000" flipH="1">
-            <a:off x="1516964" y="5376111"/>
-            <a:ext cx="470029" cy="911410"/>
+            <a:off x="697609" y="6195466"/>
+            <a:ext cx="1197330" cy="2"/>
           </a:xfrm>
-          <a:prstGeom prst="bentConnector2">
-            <a:avLst/>
+          <a:prstGeom prst="bentConnector3">
+            <a:avLst>
+              <a:gd name="adj1" fmla="val 50000"/>
+            </a:avLst>
           </a:prstGeom>
           <a:ln>
             <a:prstDash val="dash"/>
@@ -6428,55 +6216,6 @@
           </a:fontRef>
         </p:style>
       </p:cxnSp>
-      <p:sp>
-        <p:nvSpPr>
-          <p:cNvPr id="79" name="Multiplication Sign 78">
-            <a:extLst>
-              <a:ext uri="{FF2B5EF4-FFF2-40B4-BE49-F238E27FC236}">
-                <a16:creationId xmlns:a16="http://schemas.microsoft.com/office/drawing/2014/main" id="{15CDDFEF-83F2-8FC3-05B0-27234FE3D8A4}"/>
-              </a:ext>
-            </a:extLst>
-          </p:cNvPr>
-          <p:cNvSpPr/>
-          <p:nvPr/>
-        </p:nvSpPr>
-        <p:spPr>
-          <a:xfrm>
-            <a:off x="1006562" y="5711988"/>
-            <a:ext cx="579421" cy="480195"/>
-          </a:xfrm>
-          <a:prstGeom prst="mathMultiply">
-            <a:avLst/>
-          </a:prstGeom>
-          <a:solidFill>
-            <a:srgbClr val="FF0000"/>
-          </a:solidFill>
-        </p:spPr>
-        <p:style>
-          <a:lnRef idx="2">
-            <a:schemeClr val="accent1">
-              <a:shade val="50000"/>
-            </a:schemeClr>
-          </a:lnRef>
-          <a:fillRef idx="1">
-            <a:schemeClr val="accent1"/>
-          </a:fillRef>
-          <a:effectRef idx="0">
-            <a:schemeClr val="accent1"/>
-          </a:effectRef>
-          <a:fontRef idx="minor">
-            <a:schemeClr val="lt1"/>
-          </a:fontRef>
-        </p:style>
-        <p:txBody>
-          <a:bodyPr rtlCol="0" anchor="ctr"/>
-          <a:lstStyle/>
-          <a:p>
-            <a:pPr algn="ctr"/>
-            <a:endParaRPr lang="en-SG"/>
-          </a:p>
-        </p:txBody>
-      </p:sp>
       <p:sp>
         <p:nvSpPr>
           <p:cNvPr id="83" name="Flowchart: Process 82">
@@ -7129,48 +6868,94 @@
           </a:fontRef>
         </p:style>
       </p:cxnSp>
-      <p:cxnSp>
-        <p:nvCxnSpPr>
-          <p:cNvPr id="196" name="Straight Arrow Connector 195">
-            <a:extLst>
-              <a:ext uri="{FF2B5EF4-FFF2-40B4-BE49-F238E27FC236}">
-                <a16:creationId xmlns:a16="http://schemas.microsoft.com/office/drawing/2014/main" id="{AC71306F-5E11-CC40-C846-5DC4FD57584B}"/>
-              </a:ext>
-            </a:extLst>
-          </p:cNvPr>
-          <p:cNvCxnSpPr>
-            <a:cxnSpLocks/>
-            <a:stCxn id="43" idx="4"/>
-          </p:cNvCxnSpPr>
+      <p:sp>
+        <p:nvSpPr>
+          <p:cNvPr id="2" name="TextBox 1">
+            <a:extLst>
+              <a:ext uri="{FF2B5EF4-FFF2-40B4-BE49-F238E27FC236}">
+                <a16:creationId xmlns:a16="http://schemas.microsoft.com/office/drawing/2014/main" id="{B2DB0722-F639-C1C6-82C1-55E16B65DC1D}"/>
+              </a:ext>
+            </a:extLst>
+          </p:cNvPr>
+          <p:cNvSpPr txBox="1"/>
           <p:nvPr/>
-        </p:nvCxnSpPr>
+        </p:nvSpPr>
         <p:spPr>
           <a:xfrm>
-            <a:off x="4166853" y="6421673"/>
-            <a:ext cx="0" cy="415036"/>
+            <a:off x="11517997" y="223012"/>
+            <a:ext cx="569387" cy="6411976"/>
           </a:xfrm>
-          <a:prstGeom prst="straightConnector1">
+          <a:prstGeom prst="rect">
             <a:avLst/>
           </a:prstGeom>
+          <a:solidFill>
+            <a:srgbClr val="00B0F0"/>
+          </a:solidFill>
+        </p:spPr>
+        <p:txBody>
+          <a:bodyPr vert="eaVert" wrap="square" rtlCol="0">
+            <a:spAutoFit/>
+          </a:bodyPr>
+          <a:lstStyle/>
+          <a:p>
+            <a:pPr algn="ctr"/>
+            <a:r>
+              <a:rPr lang="en-US" sz="2500" dirty="0">
+                <a:solidFill>
+                  <a:srgbClr val="FF0000"/>
+                </a:solidFill>
+              </a:rPr>
+              <a:t>MAIN Control Flow</a:t>
+            </a:r>
+            <a:endParaRPr lang="en-SG" sz="2500" dirty="0">
+              <a:solidFill>
+                <a:srgbClr val="FF0000"/>
+              </a:solidFill>
+            </a:endParaRPr>
+          </a:p>
+        </p:txBody>
+      </p:sp>
+      <p:sp>
+        <p:nvSpPr>
+          <p:cNvPr id="3" name="TextBox 2">
+            <a:hlinkClick r:id="rId3" action="ppaction://hlinksldjump"/>
+            <a:extLst>
+              <a:ext uri="{FF2B5EF4-FFF2-40B4-BE49-F238E27FC236}">
+                <a16:creationId xmlns:a16="http://schemas.microsoft.com/office/drawing/2014/main" id="{06A3918D-8E2A-514D-6177-BB773C44129C}"/>
+              </a:ext>
+            </a:extLst>
+          </p:cNvPr>
+          <p:cNvSpPr txBox="1"/>
+          <p:nvPr/>
+        </p:nvSpPr>
+        <p:spPr>
+          <a:xfrm>
+            <a:off x="4472539" y="5765066"/>
+            <a:ext cx="1059000" cy="307777"/>
+          </a:xfrm>
+          <a:prstGeom prst="rect">
+            <a:avLst/>
+          </a:prstGeom>
+          <a:noFill/>
           <a:ln>
-            <a:tailEnd type="triangle"/>
+            <a:solidFill>
+              <a:schemeClr val="tx1"/>
+            </a:solidFill>
           </a:ln>
         </p:spPr>
-        <p:style>
-          <a:lnRef idx="1">
-            <a:schemeClr val="dk1"/>
-          </a:lnRef>
-          <a:fillRef idx="0">
-            <a:schemeClr val="dk1"/>
-          </a:fillRef>
-          <a:effectRef idx="0">
-            <a:schemeClr val="dk1"/>
-          </a:effectRef>
-          <a:fontRef idx="minor">
-            <a:schemeClr val="tx1"/>
-          </a:fontRef>
-        </p:style>
-      </p:cxnSp>
+        <p:txBody>
+          <a:bodyPr wrap="square" rtlCol="0">
+            <a:spAutoFit/>
+          </a:bodyPr>
+          <a:lstStyle/>
+          <a:p>
+            <a:r>
+              <a:rPr lang="en-SG" sz="1400" dirty="0"/>
+              <a:t>Continued..</a:t>
+            </a:r>
+          </a:p>
+        </p:txBody>
+      </p:sp>
     </p:spTree>
     <p:extLst>
       <p:ext uri="{BB962C8B-B14F-4D97-AF65-F5344CB8AC3E}">
@@ -7215,7 +7000,7 @@
         </p:nvSpPr>
         <p:spPr>
           <a:xfrm>
-            <a:off x="1987614" y="491425"/>
+            <a:off x="2393865" y="1992735"/>
             <a:ext cx="2697166" cy="369332"/>
           </a:xfrm>
           <a:prstGeom prst="flowChartProcess">
@@ -7279,7 +7064,7 @@
         </p:nvCxnSpPr>
         <p:spPr>
           <a:xfrm flipH="1">
-            <a:off x="3336197" y="99846"/>
+            <a:off x="3742448" y="1601156"/>
             <a:ext cx="6791" cy="391579"/>
           </a:xfrm>
           <a:prstGeom prst="straightConnector1">
@@ -7304,47 +7089,6 @@
           </a:fontRef>
         </p:style>
       </p:cxnSp>
-      <p:sp>
-        <p:nvSpPr>
-          <p:cNvPr id="4" name="TextBox 3">
-            <a:hlinkClick r:id="rId2" action="ppaction://hlinksldjump"/>
-            <a:extLst>
-              <a:ext uri="{FF2B5EF4-FFF2-40B4-BE49-F238E27FC236}">
-                <a16:creationId xmlns:a16="http://schemas.microsoft.com/office/drawing/2014/main" id="{C3977AAD-686E-915A-8DA3-0FC99298729C}"/>
-              </a:ext>
-            </a:extLst>
-          </p:cNvPr>
-          <p:cNvSpPr txBox="1"/>
-          <p:nvPr/>
-        </p:nvSpPr>
-        <p:spPr>
-          <a:xfrm>
-            <a:off x="3542425" y="99846"/>
-            <a:ext cx="1059000" cy="307777"/>
-          </a:xfrm>
-          <a:prstGeom prst="rect">
-            <a:avLst/>
-          </a:prstGeom>
-          <a:noFill/>
-          <a:ln>
-            <a:solidFill>
-              <a:schemeClr val="tx1"/>
-            </a:solidFill>
-          </a:ln>
-        </p:spPr>
-        <p:txBody>
-          <a:bodyPr wrap="square" rtlCol="0">
-            <a:spAutoFit/>
-          </a:bodyPr>
-          <a:lstStyle/>
-          <a:p>
-            <a:r>
-              <a:rPr lang="en-SG" sz="1400" dirty="0"/>
-              <a:t>Continued..</a:t>
-            </a:r>
-          </a:p>
-        </p:txBody>
-      </p:sp>
       <p:sp>
         <p:nvSpPr>
           <p:cNvPr id="6" name="Oval 5">
@@ -7406,6 +7150,397 @@
           </a:p>
         </p:txBody>
       </p:sp>
+      <p:sp>
+        <p:nvSpPr>
+          <p:cNvPr id="5" name="TextBox 4">
+            <a:hlinkClick r:id="rId2" action="ppaction://hlinksldjump"/>
+            <a:extLst>
+              <a:ext uri="{FF2B5EF4-FFF2-40B4-BE49-F238E27FC236}">
+                <a16:creationId xmlns:a16="http://schemas.microsoft.com/office/drawing/2014/main" id="{B7A3FF41-DC9B-371D-D864-01C4F07DD3BB}"/>
+              </a:ext>
+            </a:extLst>
+          </p:cNvPr>
+          <p:cNvSpPr txBox="1"/>
+          <p:nvPr/>
+        </p:nvSpPr>
+        <p:spPr>
+          <a:xfrm>
+            <a:off x="3887206" y="369333"/>
+            <a:ext cx="1129164" cy="307777"/>
+          </a:xfrm>
+          <a:prstGeom prst="rect">
+            <a:avLst/>
+          </a:prstGeom>
+          <a:noFill/>
+          <a:ln>
+            <a:solidFill>
+              <a:schemeClr val="tx1"/>
+            </a:solidFill>
+          </a:ln>
+        </p:spPr>
+        <p:txBody>
+          <a:bodyPr wrap="square" rtlCol="0">
+            <a:spAutoFit/>
+          </a:bodyPr>
+          <a:lstStyle/>
+          <a:p>
+            <a:r>
+              <a:rPr lang="en-SG" sz="1400" dirty="0"/>
+              <a:t>Continued..</a:t>
+            </a:r>
+          </a:p>
+        </p:txBody>
+      </p:sp>
+      <p:sp>
+        <p:nvSpPr>
+          <p:cNvPr id="7" name="Flowchart: Data 6">
+            <a:extLst>
+              <a:ext uri="{FF2B5EF4-FFF2-40B4-BE49-F238E27FC236}">
+                <a16:creationId xmlns:a16="http://schemas.microsoft.com/office/drawing/2014/main" id="{1F939D23-5BFF-B09D-4D1F-5B97F056E7FB}"/>
+              </a:ext>
+            </a:extLst>
+          </p:cNvPr>
+          <p:cNvSpPr/>
+          <p:nvPr/>
+        </p:nvSpPr>
+        <p:spPr>
+          <a:xfrm>
+            <a:off x="1308970" y="904996"/>
+            <a:ext cx="4897925" cy="709685"/>
+          </a:xfrm>
+          <a:prstGeom prst="flowChartInputOutput">
+            <a:avLst/>
+          </a:prstGeom>
+          <a:noFill/>
+          <a:ln w="28575">
+            <a:solidFill>
+              <a:srgbClr val="92D050"/>
+            </a:solidFill>
+          </a:ln>
+        </p:spPr>
+        <p:style>
+          <a:lnRef idx="2">
+            <a:schemeClr val="accent1">
+              <a:shade val="50000"/>
+            </a:schemeClr>
+          </a:lnRef>
+          <a:fillRef idx="1">
+            <a:schemeClr val="accent1"/>
+          </a:fillRef>
+          <a:effectRef idx="0">
+            <a:schemeClr val="accent1"/>
+          </a:effectRef>
+          <a:fontRef idx="minor">
+            <a:schemeClr val="lt1"/>
+          </a:fontRef>
+        </p:style>
+        <p:txBody>
+          <a:bodyPr rtlCol="0" anchor="ctr"/>
+          <a:lstStyle/>
+          <a:p>
+            <a:r>
+              <a:rPr lang="en-US" sz="1000" b="0" dirty="0">
+                <a:solidFill>
+                  <a:srgbClr val="CE9178"/>
+                </a:solidFill>
+                <a:effectLst/>
+                <a:latin typeface="Consolas" panose="020B0609020204030204" pitchFamily="49" charset="0"/>
+              </a:rPr>
+              <a:t>Woodlands_all_clstr_train_data.csv</a:t>
+            </a:r>
+          </a:p>
+          <a:p>
+            <a:r>
+              <a:rPr lang="en-US" sz="1000" b="0" dirty="0">
+                <a:solidFill>
+                  <a:srgbClr val="CE9178"/>
+                </a:solidFill>
+                <a:effectLst/>
+                <a:latin typeface="Consolas" panose="020B0609020204030204" pitchFamily="49" charset="0"/>
+              </a:rPr>
+              <a:t>Woodlands_all_clstr_full_train_data.csv</a:t>
+            </a:r>
+            <a:endParaRPr lang="en-US" sz="1000" b="0" dirty="0">
+              <a:solidFill>
+                <a:srgbClr val="CCCCCC"/>
+              </a:solidFill>
+              <a:effectLst/>
+              <a:latin typeface="Consolas" panose="020B0609020204030204" pitchFamily="49" charset="0"/>
+            </a:endParaRPr>
+          </a:p>
+          <a:p>
+            <a:r>
+              <a:rPr lang="en-US" sz="1000" b="0" dirty="0">
+                <a:solidFill>
+                  <a:srgbClr val="CE9178"/>
+                </a:solidFill>
+                <a:effectLst/>
+                <a:latin typeface="Consolas" panose="020B0609020204030204" pitchFamily="49" charset="0"/>
+              </a:rPr>
+              <a:t>Woodlands</a:t>
+            </a:r>
+            <a:r>
+              <a:rPr lang="en-SG" sz="1000" b="0" dirty="0">
+                <a:solidFill>
+                  <a:srgbClr val="CE9178"/>
+                </a:solidFill>
+                <a:effectLst/>
+                <a:latin typeface="Consolas" panose="020B0609020204030204" pitchFamily="49" charset="0"/>
+              </a:rPr>
+              <a:t>_</a:t>
+            </a:r>
+            <a:r>
+              <a:rPr lang="en-SG" sz="1000" b="0" dirty="0" err="1">
+                <a:solidFill>
+                  <a:srgbClr val="CE9178"/>
+                </a:solidFill>
+                <a:effectLst/>
+                <a:latin typeface="Consolas" panose="020B0609020204030204" pitchFamily="49" charset="0"/>
+              </a:rPr>
+              <a:t>all_clstr_val_data</a:t>
+            </a:r>
+            <a:r>
+              <a:rPr lang="en-US" sz="1000" b="0" dirty="0">
+                <a:solidFill>
+                  <a:srgbClr val="CE9178"/>
+                </a:solidFill>
+                <a:effectLst/>
+                <a:latin typeface="Consolas" panose="020B0609020204030204" pitchFamily="49" charset="0"/>
+              </a:rPr>
+              <a:t>.csv</a:t>
+            </a:r>
+            <a:endParaRPr lang="en-SG" sz="1000" b="0" dirty="0">
+              <a:solidFill>
+                <a:srgbClr val="CCCCCC"/>
+              </a:solidFill>
+              <a:effectLst/>
+              <a:latin typeface="Consolas" panose="020B0609020204030204" pitchFamily="49" charset="0"/>
+            </a:endParaRPr>
+          </a:p>
+          <a:p>
+            <a:r>
+              <a:rPr lang="en-US" sz="1000" b="0" dirty="0">
+                <a:solidFill>
+                  <a:srgbClr val="CE9178"/>
+                </a:solidFill>
+                <a:effectLst/>
+                <a:latin typeface="Consolas" panose="020B0609020204030204" pitchFamily="49" charset="0"/>
+              </a:rPr>
+              <a:t>Woodlands</a:t>
+            </a:r>
+            <a:r>
+              <a:rPr lang="en-SG" sz="1000" b="0" dirty="0">
+                <a:solidFill>
+                  <a:srgbClr val="CE9178"/>
+                </a:solidFill>
+                <a:effectLst/>
+                <a:latin typeface="Consolas" panose="020B0609020204030204" pitchFamily="49" charset="0"/>
+              </a:rPr>
+              <a:t>_</a:t>
+            </a:r>
+            <a:r>
+              <a:rPr lang="en-SG" sz="1000" b="0" dirty="0" err="1">
+                <a:solidFill>
+                  <a:srgbClr val="CE9178"/>
+                </a:solidFill>
+                <a:effectLst/>
+                <a:latin typeface="Consolas" panose="020B0609020204030204" pitchFamily="49" charset="0"/>
+              </a:rPr>
+              <a:t>all_clstr_test_data</a:t>
+            </a:r>
+            <a:r>
+              <a:rPr lang="en-US" sz="1000" b="0" dirty="0">
+                <a:solidFill>
+                  <a:srgbClr val="CE9178"/>
+                </a:solidFill>
+                <a:effectLst/>
+                <a:latin typeface="Consolas" panose="020B0609020204030204" pitchFamily="49" charset="0"/>
+              </a:rPr>
+              <a:t>.csv</a:t>
+            </a:r>
+          </a:p>
+        </p:txBody>
+      </p:sp>
+      <p:sp>
+        <p:nvSpPr>
+          <p:cNvPr id="8" name="Multiplication Sign 7">
+            <a:extLst>
+              <a:ext uri="{FF2B5EF4-FFF2-40B4-BE49-F238E27FC236}">
+                <a16:creationId xmlns:a16="http://schemas.microsoft.com/office/drawing/2014/main" id="{892264EA-7146-3F7B-8C0A-EF3433A4C501}"/>
+              </a:ext>
+            </a:extLst>
+          </p:cNvPr>
+          <p:cNvSpPr/>
+          <p:nvPr/>
+        </p:nvSpPr>
+        <p:spPr>
+          <a:xfrm>
+            <a:off x="604311" y="342838"/>
+            <a:ext cx="579421" cy="480195"/>
+          </a:xfrm>
+          <a:prstGeom prst="mathMultiply">
+            <a:avLst/>
+          </a:prstGeom>
+          <a:solidFill>
+            <a:srgbClr val="FF0000"/>
+          </a:solidFill>
+        </p:spPr>
+        <p:style>
+          <a:lnRef idx="2">
+            <a:schemeClr val="accent1">
+              <a:shade val="50000"/>
+            </a:schemeClr>
+          </a:lnRef>
+          <a:fillRef idx="1">
+            <a:schemeClr val="accent1"/>
+          </a:fillRef>
+          <a:effectRef idx="0">
+            <a:schemeClr val="accent1"/>
+          </a:effectRef>
+          <a:fontRef idx="minor">
+            <a:schemeClr val="lt1"/>
+          </a:fontRef>
+        </p:style>
+        <p:txBody>
+          <a:bodyPr rtlCol="0" anchor="ctr"/>
+          <a:lstStyle/>
+          <a:p>
+            <a:pPr algn="ctr"/>
+            <a:endParaRPr lang="en-SG"/>
+          </a:p>
+        </p:txBody>
+      </p:sp>
+      <p:cxnSp>
+        <p:nvCxnSpPr>
+          <p:cNvPr id="9" name="Straight Arrow Connector 8">
+            <a:extLst>
+              <a:ext uri="{FF2B5EF4-FFF2-40B4-BE49-F238E27FC236}">
+                <a16:creationId xmlns:a16="http://schemas.microsoft.com/office/drawing/2014/main" id="{2B7625B2-157F-2E6F-EE28-931417BCEBB4}"/>
+              </a:ext>
+            </a:extLst>
+          </p:cNvPr>
+          <p:cNvCxnSpPr>
+            <a:cxnSpLocks/>
+          </p:cNvCxnSpPr>
+          <p:nvPr/>
+        </p:nvCxnSpPr>
+        <p:spPr>
+          <a:xfrm>
+            <a:off x="3742448" y="0"/>
+            <a:ext cx="0" cy="884628"/>
+          </a:xfrm>
+          <a:prstGeom prst="straightConnector1">
+            <a:avLst/>
+          </a:prstGeom>
+          <a:ln>
+            <a:tailEnd type="triangle"/>
+          </a:ln>
+        </p:spPr>
+        <p:style>
+          <a:lnRef idx="1">
+            <a:schemeClr val="dk1"/>
+          </a:lnRef>
+          <a:fillRef idx="0">
+            <a:schemeClr val="dk1"/>
+          </a:fillRef>
+          <a:effectRef idx="0">
+            <a:schemeClr val="dk1"/>
+          </a:effectRef>
+          <a:fontRef idx="minor">
+            <a:schemeClr val="tx1"/>
+          </a:fontRef>
+        </p:style>
+      </p:cxnSp>
+      <p:sp>
+        <p:nvSpPr>
+          <p:cNvPr id="10" name="TextBox 9">
+            <a:extLst>
+              <a:ext uri="{FF2B5EF4-FFF2-40B4-BE49-F238E27FC236}">
+                <a16:creationId xmlns:a16="http://schemas.microsoft.com/office/drawing/2014/main" id="{D9C7351D-B83F-6294-3E34-93A890E0C8FC}"/>
+              </a:ext>
+            </a:extLst>
+          </p:cNvPr>
+          <p:cNvSpPr txBox="1"/>
+          <p:nvPr/>
+        </p:nvSpPr>
+        <p:spPr>
+          <a:xfrm>
+            <a:off x="11519765" y="169577"/>
+            <a:ext cx="569387" cy="6411976"/>
+          </a:xfrm>
+          <a:prstGeom prst="rect">
+            <a:avLst/>
+          </a:prstGeom>
+          <a:solidFill>
+            <a:srgbClr val="00B0F0"/>
+          </a:solidFill>
+        </p:spPr>
+        <p:txBody>
+          <a:bodyPr vert="eaVert" wrap="square" rtlCol="0">
+            <a:spAutoFit/>
+          </a:bodyPr>
+          <a:lstStyle/>
+          <a:p>
+            <a:pPr algn="ctr"/>
+            <a:r>
+              <a:rPr lang="en-US" sz="2500" dirty="0">
+                <a:solidFill>
+                  <a:srgbClr val="FF0000"/>
+                </a:solidFill>
+              </a:rPr>
+              <a:t>MAIN Control Flow</a:t>
+            </a:r>
+            <a:endParaRPr lang="en-SG" sz="2500" dirty="0">
+              <a:solidFill>
+                <a:srgbClr val="FF0000"/>
+              </a:solidFill>
+            </a:endParaRPr>
+          </a:p>
+        </p:txBody>
+      </p:sp>
+      <p:cxnSp>
+        <p:nvCxnSpPr>
+          <p:cNvPr id="11" name="Connector: Elbow 10">
+            <a:extLst>
+              <a:ext uri="{FF2B5EF4-FFF2-40B4-BE49-F238E27FC236}">
+                <a16:creationId xmlns:a16="http://schemas.microsoft.com/office/drawing/2014/main" id="{3E85513E-4B54-759C-BC1F-570F58B3E03B}"/>
+              </a:ext>
+            </a:extLst>
+          </p:cNvPr>
+          <p:cNvCxnSpPr>
+            <a:cxnSpLocks/>
+            <a:endCxn id="7" idx="2"/>
+          </p:cNvCxnSpPr>
+          <p:nvPr/>
+        </p:nvCxnSpPr>
+        <p:spPr>
+          <a:xfrm rot="16200000" flipH="1">
+            <a:off x="669491" y="130567"/>
+            <a:ext cx="1353804" cy="904740"/>
+          </a:xfrm>
+          <a:prstGeom prst="bentConnector2">
+            <a:avLst/>
+          </a:prstGeom>
+          <a:ln>
+            <a:prstDash val="dash"/>
+            <a:tailEnd type="triangle"/>
+          </a:ln>
+        </p:spPr>
+        <p:style>
+          <a:lnRef idx="1">
+            <a:schemeClr val="dk1"/>
+          </a:lnRef>
+          <a:fillRef idx="0">
+            <a:schemeClr val="dk1"/>
+          </a:fillRef>
+          <a:effectRef idx="0">
+            <a:schemeClr val="dk1"/>
+          </a:effectRef>
+          <a:fontRef idx="minor">
+            <a:schemeClr val="tx1"/>
+          </a:fontRef>
+        </p:style>
+      </p:cxnSp>
     </p:spTree>
     <p:extLst>
       <p:ext uri="{BB962C8B-B14F-4D97-AF65-F5344CB8AC3E}">
@@ -7436,6 +7571,53 @@
           <a:chExt cx="0" cy="0"/>
         </a:xfrm>
       </p:grpSpPr>
+      <p:sp>
+        <p:nvSpPr>
+          <p:cNvPr id="2" name="TextBox 1">
+            <a:extLst>
+              <a:ext uri="{FF2B5EF4-FFF2-40B4-BE49-F238E27FC236}">
+                <a16:creationId xmlns:a16="http://schemas.microsoft.com/office/drawing/2014/main" id="{40603548-B5FD-8E4F-0833-6A4818ABF69F}"/>
+              </a:ext>
+            </a:extLst>
+          </p:cNvPr>
+          <p:cNvSpPr txBox="1"/>
+          <p:nvPr/>
+        </p:nvSpPr>
+        <p:spPr>
+          <a:xfrm>
+            <a:off x="11519765" y="127048"/>
+            <a:ext cx="569387" cy="6411976"/>
+          </a:xfrm>
+          <a:prstGeom prst="rect">
+            <a:avLst/>
+          </a:prstGeom>
+          <a:solidFill>
+            <a:srgbClr val="FF0000"/>
+          </a:solidFill>
+        </p:spPr>
+        <p:txBody>
+          <a:bodyPr vert="eaVert" wrap="square" rtlCol="0">
+            <a:spAutoFit/>
+          </a:bodyPr>
+          <a:lstStyle/>
+          <a:p>
+            <a:pPr algn="ctr"/>
+            <a:r>
+              <a:rPr lang="en-US" sz="2500" dirty="0">
+                <a:solidFill>
+                  <a:srgbClr val="FFFF00"/>
+                </a:solidFill>
+              </a:rPr>
+              <a:t>VISUALIZATION Control Flow</a:t>
+            </a:r>
+            <a:endParaRPr lang="en-SG" sz="2500" dirty="0">
+              <a:solidFill>
+                <a:srgbClr val="FFFF00"/>
+              </a:solidFill>
+            </a:endParaRPr>
+          </a:p>
+        </p:txBody>
+      </p:sp>
     </p:spTree>
     <p:extLst>
       <p:ext uri="{BB962C8B-B14F-4D97-AF65-F5344CB8AC3E}">

</xml_diff>

<commit_message>
Added SGP  and NYC maps, added station level clustering analysis for SGP and NYC
</commit_message>
<xml_diff>
--- a/Rental_Fleet_Demand_Forecast/docs/read_me/SW_control_flow_master_branch.pptx
+++ b/Rental_Fleet_Demand_Forecast/docs/read_me/SW_control_flow_master_branch.pptx
@@ -276,7 +276,7 @@
           <a:p>
             <a:fld id="{501C5513-828F-40DC-BD54-7AD8E5214853}" type="datetimeFigureOut">
               <a:rPr lang="en-SG" smtClean="0"/>
-              <a:t>9/6/2023</a:t>
+              <a:t>10/6/2023</a:t>
             </a:fld>
             <a:endParaRPr lang="en-SG"/>
           </a:p>
@@ -476,7 +476,7 @@
           <a:p>
             <a:fld id="{501C5513-828F-40DC-BD54-7AD8E5214853}" type="datetimeFigureOut">
               <a:rPr lang="en-SG" smtClean="0"/>
-              <a:t>9/6/2023</a:t>
+              <a:t>10/6/2023</a:t>
             </a:fld>
             <a:endParaRPr lang="en-SG"/>
           </a:p>
@@ -686,7 +686,7 @@
           <a:p>
             <a:fld id="{501C5513-828F-40DC-BD54-7AD8E5214853}" type="datetimeFigureOut">
               <a:rPr lang="en-SG" smtClean="0"/>
-              <a:t>9/6/2023</a:t>
+              <a:t>10/6/2023</a:t>
             </a:fld>
             <a:endParaRPr lang="en-SG"/>
           </a:p>
@@ -886,7 +886,7 @@
           <a:p>
             <a:fld id="{501C5513-828F-40DC-BD54-7AD8E5214853}" type="datetimeFigureOut">
               <a:rPr lang="en-SG" smtClean="0"/>
-              <a:t>9/6/2023</a:t>
+              <a:t>10/6/2023</a:t>
             </a:fld>
             <a:endParaRPr lang="en-SG"/>
           </a:p>
@@ -1162,7 +1162,7 @@
           <a:p>
             <a:fld id="{501C5513-828F-40DC-BD54-7AD8E5214853}" type="datetimeFigureOut">
               <a:rPr lang="en-SG" smtClean="0"/>
-              <a:t>9/6/2023</a:t>
+              <a:t>10/6/2023</a:t>
             </a:fld>
             <a:endParaRPr lang="en-SG"/>
           </a:p>
@@ -1430,7 +1430,7 @@
           <a:p>
             <a:fld id="{501C5513-828F-40DC-BD54-7AD8E5214853}" type="datetimeFigureOut">
               <a:rPr lang="en-SG" smtClean="0"/>
-              <a:t>9/6/2023</a:t>
+              <a:t>10/6/2023</a:t>
             </a:fld>
             <a:endParaRPr lang="en-SG"/>
           </a:p>
@@ -1845,7 +1845,7 @@
           <a:p>
             <a:fld id="{501C5513-828F-40DC-BD54-7AD8E5214853}" type="datetimeFigureOut">
               <a:rPr lang="en-SG" smtClean="0"/>
-              <a:t>9/6/2023</a:t>
+              <a:t>10/6/2023</a:t>
             </a:fld>
             <a:endParaRPr lang="en-SG"/>
           </a:p>
@@ -1987,7 +1987,7 @@
           <a:p>
             <a:fld id="{501C5513-828F-40DC-BD54-7AD8E5214853}" type="datetimeFigureOut">
               <a:rPr lang="en-SG" smtClean="0"/>
-              <a:t>9/6/2023</a:t>
+              <a:t>10/6/2023</a:t>
             </a:fld>
             <a:endParaRPr lang="en-SG"/>
           </a:p>
@@ -2100,7 +2100,7 @@
           <a:p>
             <a:fld id="{501C5513-828F-40DC-BD54-7AD8E5214853}" type="datetimeFigureOut">
               <a:rPr lang="en-SG" smtClean="0"/>
-              <a:t>9/6/2023</a:t>
+              <a:t>10/6/2023</a:t>
             </a:fld>
             <a:endParaRPr lang="en-SG"/>
           </a:p>
@@ -2413,7 +2413,7 @@
           <a:p>
             <a:fld id="{501C5513-828F-40DC-BD54-7AD8E5214853}" type="datetimeFigureOut">
               <a:rPr lang="en-SG" smtClean="0"/>
-              <a:t>9/6/2023</a:t>
+              <a:t>10/6/2023</a:t>
             </a:fld>
             <a:endParaRPr lang="en-SG"/>
           </a:p>
@@ -2702,7 +2702,7 @@
           <a:p>
             <a:fld id="{501C5513-828F-40DC-BD54-7AD8E5214853}" type="datetimeFigureOut">
               <a:rPr lang="en-SG" smtClean="0"/>
-              <a:t>9/6/2023</a:t>
+              <a:t>10/6/2023</a:t>
             </a:fld>
             <a:endParaRPr lang="en-SG"/>
           </a:p>
@@ -2945,7 +2945,7 @@
           <a:p>
             <a:fld id="{501C5513-828F-40DC-BD54-7AD8E5214853}" type="datetimeFigureOut">
               <a:rPr lang="en-SG" smtClean="0"/>
-              <a:t>9/6/2023</a:t>
+              <a:t>10/6/2023</a:t>
             </a:fld>
             <a:endParaRPr lang="en-SG"/>
           </a:p>
@@ -6672,12 +6672,55 @@
           </a:fontRef>
         </p:style>
       </p:cxnSp>
-      <p:sp>
-        <p:nvSpPr>
-          <p:cNvPr id="177" name="Oval 176">
-            <a:extLst>
-              <a:ext uri="{FF2B5EF4-FFF2-40B4-BE49-F238E27FC236}">
-                <a16:creationId xmlns:a16="http://schemas.microsoft.com/office/drawing/2014/main" id="{C4B815C0-07C9-7DA1-356A-A561F0D474BC}"/>
+      <p:cxnSp>
+        <p:nvCxnSpPr>
+          <p:cNvPr id="178" name="Straight Arrow Connector 177">
+            <a:extLst>
+              <a:ext uri="{FF2B5EF4-FFF2-40B4-BE49-F238E27FC236}">
+                <a16:creationId xmlns:a16="http://schemas.microsoft.com/office/drawing/2014/main" id="{4BD376D1-3A50-CC1A-66D2-76D5FFC5AA3E}"/>
+              </a:ext>
+            </a:extLst>
+          </p:cNvPr>
+          <p:cNvCxnSpPr>
+            <a:cxnSpLocks/>
+            <a:stCxn id="4" idx="6"/>
+            <a:endCxn id="182" idx="0"/>
+          </p:cNvCxnSpPr>
+          <p:nvPr/>
+        </p:nvCxnSpPr>
+        <p:spPr>
+          <a:xfrm flipV="1">
+            <a:off x="2548559" y="353952"/>
+            <a:ext cx="596880" cy="2481"/>
+          </a:xfrm>
+          <a:prstGeom prst="straightConnector1">
+            <a:avLst/>
+          </a:prstGeom>
+          <a:ln>
+            <a:tailEnd type="triangle"/>
+          </a:ln>
+        </p:spPr>
+        <p:style>
+          <a:lnRef idx="1">
+            <a:schemeClr val="dk1"/>
+          </a:lnRef>
+          <a:fillRef idx="0">
+            <a:schemeClr val="dk1"/>
+          </a:fillRef>
+          <a:effectRef idx="0">
+            <a:schemeClr val="dk1"/>
+          </a:effectRef>
+          <a:fontRef idx="minor">
+            <a:schemeClr val="tx1"/>
+          </a:fontRef>
+        </p:style>
+      </p:cxnSp>
+      <p:sp>
+        <p:nvSpPr>
+          <p:cNvPr id="182" name="Thought Bubble: Cloud 181">
+            <a:extLst>
+              <a:ext uri="{FF2B5EF4-FFF2-40B4-BE49-F238E27FC236}">
+                <a16:creationId xmlns:a16="http://schemas.microsoft.com/office/drawing/2014/main" id="{3C2DDDAA-6B74-B7D1-A3E2-171B6040343E}"/>
               </a:ext>
             </a:extLst>
           </p:cNvPr>
@@ -6686,20 +6729,12 @@
         </p:nvSpPr>
         <p:spPr>
           <a:xfrm>
-            <a:off x="1585983" y="200876"/>
-            <a:ext cx="1075105" cy="317060"/>
-          </a:xfrm>
-          <a:prstGeom prst="ellipse">
+            <a:off x="3139105" y="63870"/>
+            <a:ext cx="2041913" cy="580164"/>
+          </a:xfrm>
+          <a:prstGeom prst="cloudCallout">
             <a:avLst/>
           </a:prstGeom>
-          <a:solidFill>
-            <a:schemeClr val="bg1"/>
-          </a:solidFill>
-          <a:ln>
-            <a:solidFill>
-              <a:schemeClr val="tx1"/>
-            </a:solidFill>
-          </a:ln>
         </p:spPr>
         <p:style>
           <a:lnRef idx="2">
@@ -6723,36 +6758,32 @@
           <a:p>
             <a:pPr algn="ctr"/>
             <a:r>
-              <a:rPr lang="en-SG" sz="1200" dirty="0">
-                <a:solidFill>
-                  <a:schemeClr val="tx1"/>
-                </a:solidFill>
-              </a:rPr>
-              <a:t>START</a:t>
+              <a:rPr lang="en-SG" dirty="0"/>
+              <a:t>Outflow Inflow API</a:t>
             </a:r>
           </a:p>
         </p:txBody>
       </p:sp>
       <p:cxnSp>
         <p:nvCxnSpPr>
-          <p:cNvPr id="178" name="Straight Arrow Connector 177">
-            <a:extLst>
-              <a:ext uri="{FF2B5EF4-FFF2-40B4-BE49-F238E27FC236}">
-                <a16:creationId xmlns:a16="http://schemas.microsoft.com/office/drawing/2014/main" id="{4BD376D1-3A50-CC1A-66D2-76D5FFC5AA3E}"/>
+          <p:cNvPr id="190" name="Straight Arrow Connector 189">
+            <a:extLst>
+              <a:ext uri="{FF2B5EF4-FFF2-40B4-BE49-F238E27FC236}">
+                <a16:creationId xmlns:a16="http://schemas.microsoft.com/office/drawing/2014/main" id="{08A2B5D8-3F5A-EA76-8713-97D819F502D7}"/>
               </a:ext>
             </a:extLst>
           </p:cNvPr>
           <p:cNvCxnSpPr>
             <a:cxnSpLocks/>
-            <a:stCxn id="177" idx="6"/>
-            <a:endCxn id="182" idx="0"/>
+            <a:stCxn id="182" idx="1"/>
+            <a:endCxn id="13" idx="1"/>
           </p:cNvCxnSpPr>
           <p:nvPr/>
         </p:nvCxnSpPr>
         <p:spPr>
-          <a:xfrm flipV="1">
-            <a:off x="2661088" y="353952"/>
-            <a:ext cx="484351" cy="5454"/>
+          <a:xfrm>
+            <a:off x="4160062" y="643416"/>
+            <a:ext cx="4" cy="219516"/>
           </a:xfrm>
           <a:prstGeom prst="straightConnector1">
             <a:avLst/>
@@ -6778,10 +6809,98 @@
       </p:cxnSp>
       <p:sp>
         <p:nvSpPr>
-          <p:cNvPr id="182" name="Thought Bubble: Cloud 181">
-            <a:extLst>
-              <a:ext uri="{FF2B5EF4-FFF2-40B4-BE49-F238E27FC236}">
-                <a16:creationId xmlns:a16="http://schemas.microsoft.com/office/drawing/2014/main" id="{3C2DDDAA-6B74-B7D1-A3E2-171B6040343E}"/>
+          <p:cNvPr id="2" name="TextBox 1">
+            <a:extLst>
+              <a:ext uri="{FF2B5EF4-FFF2-40B4-BE49-F238E27FC236}">
+                <a16:creationId xmlns:a16="http://schemas.microsoft.com/office/drawing/2014/main" id="{B2DB0722-F639-C1C6-82C1-55E16B65DC1D}"/>
+              </a:ext>
+            </a:extLst>
+          </p:cNvPr>
+          <p:cNvSpPr txBox="1"/>
+          <p:nvPr/>
+        </p:nvSpPr>
+        <p:spPr>
+          <a:xfrm>
+            <a:off x="11517997" y="223012"/>
+            <a:ext cx="569387" cy="6411976"/>
+          </a:xfrm>
+          <a:prstGeom prst="rect">
+            <a:avLst/>
+          </a:prstGeom>
+          <a:solidFill>
+            <a:srgbClr val="00B0F0"/>
+          </a:solidFill>
+        </p:spPr>
+        <p:txBody>
+          <a:bodyPr vert="eaVert" wrap="square" rtlCol="0">
+            <a:spAutoFit/>
+          </a:bodyPr>
+          <a:lstStyle/>
+          <a:p>
+            <a:pPr algn="ctr"/>
+            <a:r>
+              <a:rPr lang="en-US" sz="2500" dirty="0">
+                <a:solidFill>
+                  <a:srgbClr val="FF0000"/>
+                </a:solidFill>
+              </a:rPr>
+              <a:t>MAIN Control Flow 1</a:t>
+            </a:r>
+            <a:endParaRPr lang="en-SG" sz="2500" dirty="0">
+              <a:solidFill>
+                <a:srgbClr val="FF0000"/>
+              </a:solidFill>
+            </a:endParaRPr>
+          </a:p>
+        </p:txBody>
+      </p:sp>
+      <p:sp>
+        <p:nvSpPr>
+          <p:cNvPr id="3" name="TextBox 2">
+            <a:hlinkClick r:id="rId3" action="ppaction://hlinksldjump"/>
+            <a:extLst>
+              <a:ext uri="{FF2B5EF4-FFF2-40B4-BE49-F238E27FC236}">
+                <a16:creationId xmlns:a16="http://schemas.microsoft.com/office/drawing/2014/main" id="{06A3918D-8E2A-514D-6177-BB773C44129C}"/>
+              </a:ext>
+            </a:extLst>
+          </p:cNvPr>
+          <p:cNvSpPr txBox="1"/>
+          <p:nvPr/>
+        </p:nvSpPr>
+        <p:spPr>
+          <a:xfrm>
+            <a:off x="4472539" y="5765066"/>
+            <a:ext cx="1059000" cy="307777"/>
+          </a:xfrm>
+          <a:prstGeom prst="rect">
+            <a:avLst/>
+          </a:prstGeom>
+          <a:noFill/>
+          <a:ln>
+            <a:solidFill>
+              <a:schemeClr val="tx1"/>
+            </a:solidFill>
+          </a:ln>
+        </p:spPr>
+        <p:txBody>
+          <a:bodyPr wrap="square" rtlCol="0">
+            <a:spAutoFit/>
+          </a:bodyPr>
+          <a:lstStyle/>
+          <a:p>
+            <a:r>
+              <a:rPr lang="en-SG" sz="1400" dirty="0"/>
+              <a:t>Continued..</a:t>
+            </a:r>
+          </a:p>
+        </p:txBody>
+      </p:sp>
+      <p:sp>
+        <p:nvSpPr>
+          <p:cNvPr id="4" name="Oval 3">
+            <a:extLst>
+              <a:ext uri="{FF2B5EF4-FFF2-40B4-BE49-F238E27FC236}">
+                <a16:creationId xmlns:a16="http://schemas.microsoft.com/office/drawing/2014/main" id="{86190242-E97D-75C0-F91C-F6C456E4C1D6}"/>
               </a:ext>
             </a:extLst>
           </p:cNvPr>
@@ -6790,12 +6909,20 @@
         </p:nvSpPr>
         <p:spPr>
           <a:xfrm>
-            <a:off x="3139105" y="63870"/>
-            <a:ext cx="2041913" cy="580164"/>
-          </a:xfrm>
-          <a:prstGeom prst="cloudCallout">
+            <a:off x="1279466" y="171767"/>
+            <a:ext cx="1269093" cy="369332"/>
+          </a:xfrm>
+          <a:prstGeom prst="ellipse">
             <a:avLst/>
           </a:prstGeom>
+          <a:solidFill>
+            <a:schemeClr val="bg1"/>
+          </a:solidFill>
+          <a:ln w="28575">
+            <a:solidFill>
+              <a:schemeClr val="tx1"/>
+            </a:solidFill>
+          </a:ln>
         </p:spPr>
         <p:style>
           <a:lnRef idx="2">
@@ -6819,139 +6946,12 @@
           <a:p>
             <a:pPr algn="ctr"/>
             <a:r>
-              <a:rPr lang="en-SG" dirty="0"/>
-              <a:t>Outflow Inflow API</a:t>
-            </a:r>
-          </a:p>
-        </p:txBody>
-      </p:sp>
-      <p:cxnSp>
-        <p:nvCxnSpPr>
-          <p:cNvPr id="190" name="Straight Arrow Connector 189">
-            <a:extLst>
-              <a:ext uri="{FF2B5EF4-FFF2-40B4-BE49-F238E27FC236}">
-                <a16:creationId xmlns:a16="http://schemas.microsoft.com/office/drawing/2014/main" id="{08A2B5D8-3F5A-EA76-8713-97D819F502D7}"/>
-              </a:ext>
-            </a:extLst>
-          </p:cNvPr>
-          <p:cNvCxnSpPr>
-            <a:cxnSpLocks/>
-            <a:stCxn id="182" idx="1"/>
-            <a:endCxn id="13" idx="1"/>
-          </p:cNvCxnSpPr>
-          <p:nvPr/>
-        </p:nvCxnSpPr>
-        <p:spPr>
-          <a:xfrm>
-            <a:off x="4160062" y="643416"/>
-            <a:ext cx="4" cy="219516"/>
-          </a:xfrm>
-          <a:prstGeom prst="straightConnector1">
-            <a:avLst/>
-          </a:prstGeom>
-          <a:ln>
-            <a:tailEnd type="triangle"/>
-          </a:ln>
-        </p:spPr>
-        <p:style>
-          <a:lnRef idx="1">
-            <a:schemeClr val="dk1"/>
-          </a:lnRef>
-          <a:fillRef idx="0">
-            <a:schemeClr val="dk1"/>
-          </a:fillRef>
-          <a:effectRef idx="0">
-            <a:schemeClr val="dk1"/>
-          </a:effectRef>
-          <a:fontRef idx="minor">
-            <a:schemeClr val="tx1"/>
-          </a:fontRef>
-        </p:style>
-      </p:cxnSp>
-      <p:sp>
-        <p:nvSpPr>
-          <p:cNvPr id="2" name="TextBox 1">
-            <a:extLst>
-              <a:ext uri="{FF2B5EF4-FFF2-40B4-BE49-F238E27FC236}">
-                <a16:creationId xmlns:a16="http://schemas.microsoft.com/office/drawing/2014/main" id="{B2DB0722-F639-C1C6-82C1-55E16B65DC1D}"/>
-              </a:ext>
-            </a:extLst>
-          </p:cNvPr>
-          <p:cNvSpPr txBox="1"/>
-          <p:nvPr/>
-        </p:nvSpPr>
-        <p:spPr>
-          <a:xfrm>
-            <a:off x="11517997" y="223012"/>
-            <a:ext cx="569387" cy="6411976"/>
-          </a:xfrm>
-          <a:prstGeom prst="rect">
-            <a:avLst/>
-          </a:prstGeom>
-          <a:solidFill>
-            <a:srgbClr val="00B0F0"/>
-          </a:solidFill>
-        </p:spPr>
-        <p:txBody>
-          <a:bodyPr vert="eaVert" wrap="square" rtlCol="0">
-            <a:spAutoFit/>
-          </a:bodyPr>
-          <a:lstStyle/>
-          <a:p>
-            <a:pPr algn="ctr"/>
-            <a:r>
-              <a:rPr lang="en-US" sz="2500" dirty="0">
+              <a:rPr lang="en-SG" sz="1200" b="1" dirty="0">
                 <a:solidFill>
-                  <a:srgbClr val="FF0000"/>
+                  <a:schemeClr val="tx1"/>
                 </a:solidFill>
               </a:rPr>
-              <a:t>MAIN Control Flow</a:t>
-            </a:r>
-            <a:endParaRPr lang="en-SG" sz="2500" dirty="0">
-              <a:solidFill>
-                <a:srgbClr val="FF0000"/>
-              </a:solidFill>
-            </a:endParaRPr>
-          </a:p>
-        </p:txBody>
-      </p:sp>
-      <p:sp>
-        <p:nvSpPr>
-          <p:cNvPr id="3" name="TextBox 2">
-            <a:hlinkClick r:id="rId3" action="ppaction://hlinksldjump"/>
-            <a:extLst>
-              <a:ext uri="{FF2B5EF4-FFF2-40B4-BE49-F238E27FC236}">
-                <a16:creationId xmlns:a16="http://schemas.microsoft.com/office/drawing/2014/main" id="{06A3918D-8E2A-514D-6177-BB773C44129C}"/>
-              </a:ext>
-            </a:extLst>
-          </p:cNvPr>
-          <p:cNvSpPr txBox="1"/>
-          <p:nvPr/>
-        </p:nvSpPr>
-        <p:spPr>
-          <a:xfrm>
-            <a:off x="4472539" y="5765066"/>
-            <a:ext cx="1059000" cy="307777"/>
-          </a:xfrm>
-          <a:prstGeom prst="rect">
-            <a:avLst/>
-          </a:prstGeom>
-          <a:noFill/>
-          <a:ln>
-            <a:solidFill>
-              <a:schemeClr val="tx1"/>
-            </a:solidFill>
-          </a:ln>
-        </p:spPr>
-        <p:txBody>
-          <a:bodyPr wrap="square" rtlCol="0">
-            <a:spAutoFit/>
-          </a:bodyPr>
-          <a:lstStyle/>
-          <a:p>
-            <a:r>
-              <a:rPr lang="en-SG" sz="1400" dirty="0"/>
-              <a:t>Continued..</a:t>
+              <a:t>START</a:t>
             </a:r>
           </a:p>
         </p:txBody>
@@ -7091,30 +7091,69 @@
       </p:cxnSp>
       <p:sp>
         <p:nvSpPr>
-          <p:cNvPr id="6" name="Oval 5">
-            <a:extLst>
-              <a:ext uri="{FF2B5EF4-FFF2-40B4-BE49-F238E27FC236}">
-                <a16:creationId xmlns:a16="http://schemas.microsoft.com/office/drawing/2014/main" id="{B8DFBFE8-6942-BA90-0ECB-E294F162CF8A}"/>
-              </a:ext>
-            </a:extLst>
-          </p:cNvPr>
-          <p:cNvSpPr/>
+          <p:cNvPr id="5" name="TextBox 4">
+            <a:hlinkClick r:id="rId2" action="ppaction://hlinksldjump"/>
+            <a:extLst>
+              <a:ext uri="{FF2B5EF4-FFF2-40B4-BE49-F238E27FC236}">
+                <a16:creationId xmlns:a16="http://schemas.microsoft.com/office/drawing/2014/main" id="{B7A3FF41-DC9B-371D-D864-01C4F07DD3BB}"/>
+              </a:ext>
+            </a:extLst>
+          </p:cNvPr>
+          <p:cNvSpPr txBox="1"/>
           <p:nvPr/>
         </p:nvSpPr>
         <p:spPr>
           <a:xfrm>
-            <a:off x="4147227" y="4591807"/>
-            <a:ext cx="1075105" cy="317060"/>
-          </a:xfrm>
-          <a:prstGeom prst="ellipse">
+            <a:off x="3887206" y="369333"/>
+            <a:ext cx="1129164" cy="307777"/>
+          </a:xfrm>
+          <a:prstGeom prst="rect">
             <a:avLst/>
           </a:prstGeom>
-          <a:solidFill>
-            <a:schemeClr val="bg1"/>
-          </a:solidFill>
+          <a:noFill/>
           <a:ln>
             <a:solidFill>
               <a:schemeClr val="tx1"/>
+            </a:solidFill>
+          </a:ln>
+        </p:spPr>
+        <p:txBody>
+          <a:bodyPr wrap="square" rtlCol="0">
+            <a:spAutoFit/>
+          </a:bodyPr>
+          <a:lstStyle/>
+          <a:p>
+            <a:r>
+              <a:rPr lang="en-SG" sz="1400" dirty="0"/>
+              <a:t>Continued..</a:t>
+            </a:r>
+          </a:p>
+        </p:txBody>
+      </p:sp>
+      <p:sp>
+        <p:nvSpPr>
+          <p:cNvPr id="7" name="Flowchart: Data 6">
+            <a:extLst>
+              <a:ext uri="{FF2B5EF4-FFF2-40B4-BE49-F238E27FC236}">
+                <a16:creationId xmlns:a16="http://schemas.microsoft.com/office/drawing/2014/main" id="{1F939D23-5BFF-B09D-4D1F-5B97F056E7FB}"/>
+              </a:ext>
+            </a:extLst>
+          </p:cNvPr>
+          <p:cNvSpPr/>
+          <p:nvPr/>
+        </p:nvSpPr>
+        <p:spPr>
+          <a:xfrm>
+            <a:off x="1308970" y="904996"/>
+            <a:ext cx="4897925" cy="709685"/>
+          </a:xfrm>
+          <a:prstGeom prst="flowChartInputOutput">
+            <a:avLst/>
+          </a:prstGeom>
+          <a:noFill/>
+          <a:ln w="28575">
+            <a:solidFill>
+              <a:srgbClr val="92D050"/>
             </a:solidFill>
           </a:ln>
         </p:spPr>
@@ -7138,85 +7177,152 @@
           <a:bodyPr rtlCol="0" anchor="ctr"/>
           <a:lstStyle/>
           <a:p>
-            <a:pPr algn="ctr"/>
-            <a:r>
-              <a:rPr lang="en-SG" sz="1200" dirty="0">
+            <a:r>
+              <a:rPr lang="en-US" sz="1000" b="0" dirty="0">
                 <a:solidFill>
-                  <a:schemeClr val="tx1"/>
+                  <a:srgbClr val="CE9178"/>
                 </a:solidFill>
-              </a:rPr>
-              <a:t>FINISH</a:t>
-            </a:r>
-          </a:p>
-        </p:txBody>
-      </p:sp>
-      <p:sp>
-        <p:nvSpPr>
-          <p:cNvPr id="5" name="TextBox 4">
-            <a:hlinkClick r:id="rId2" action="ppaction://hlinksldjump"/>
-            <a:extLst>
-              <a:ext uri="{FF2B5EF4-FFF2-40B4-BE49-F238E27FC236}">
-                <a16:creationId xmlns:a16="http://schemas.microsoft.com/office/drawing/2014/main" id="{B7A3FF41-DC9B-371D-D864-01C4F07DD3BB}"/>
-              </a:ext>
-            </a:extLst>
-          </p:cNvPr>
-          <p:cNvSpPr txBox="1"/>
+                <a:effectLst/>
+                <a:latin typeface="Consolas" panose="020B0609020204030204" pitchFamily="49" charset="0"/>
+              </a:rPr>
+              <a:t>Woodlands_all_clstr_train_data.csv</a:t>
+            </a:r>
+          </a:p>
+          <a:p>
+            <a:r>
+              <a:rPr lang="en-US" sz="1000" b="0" dirty="0">
+                <a:solidFill>
+                  <a:srgbClr val="CE9178"/>
+                </a:solidFill>
+                <a:effectLst/>
+                <a:latin typeface="Consolas" panose="020B0609020204030204" pitchFamily="49" charset="0"/>
+              </a:rPr>
+              <a:t>Woodlands_all_clstr_full_train_data.csv</a:t>
+            </a:r>
+            <a:endParaRPr lang="en-US" sz="1000" b="0" dirty="0">
+              <a:solidFill>
+                <a:srgbClr val="CCCCCC"/>
+              </a:solidFill>
+              <a:effectLst/>
+              <a:latin typeface="Consolas" panose="020B0609020204030204" pitchFamily="49" charset="0"/>
+            </a:endParaRPr>
+          </a:p>
+          <a:p>
+            <a:r>
+              <a:rPr lang="en-US" sz="1000" b="0" dirty="0">
+                <a:solidFill>
+                  <a:srgbClr val="CE9178"/>
+                </a:solidFill>
+                <a:effectLst/>
+                <a:latin typeface="Consolas" panose="020B0609020204030204" pitchFamily="49" charset="0"/>
+              </a:rPr>
+              <a:t>Woodlands</a:t>
+            </a:r>
+            <a:r>
+              <a:rPr lang="en-SG" sz="1000" b="0" dirty="0">
+                <a:solidFill>
+                  <a:srgbClr val="CE9178"/>
+                </a:solidFill>
+                <a:effectLst/>
+                <a:latin typeface="Consolas" panose="020B0609020204030204" pitchFamily="49" charset="0"/>
+              </a:rPr>
+              <a:t>_</a:t>
+            </a:r>
+            <a:r>
+              <a:rPr lang="en-SG" sz="1000" b="0" dirty="0" err="1">
+                <a:solidFill>
+                  <a:srgbClr val="CE9178"/>
+                </a:solidFill>
+                <a:effectLst/>
+                <a:latin typeface="Consolas" panose="020B0609020204030204" pitchFamily="49" charset="0"/>
+              </a:rPr>
+              <a:t>all_clstr_val_data</a:t>
+            </a:r>
+            <a:r>
+              <a:rPr lang="en-US" sz="1000" b="0" dirty="0">
+                <a:solidFill>
+                  <a:srgbClr val="CE9178"/>
+                </a:solidFill>
+                <a:effectLst/>
+                <a:latin typeface="Consolas" panose="020B0609020204030204" pitchFamily="49" charset="0"/>
+              </a:rPr>
+              <a:t>.csv</a:t>
+            </a:r>
+            <a:endParaRPr lang="en-SG" sz="1000" b="0" dirty="0">
+              <a:solidFill>
+                <a:srgbClr val="CCCCCC"/>
+              </a:solidFill>
+              <a:effectLst/>
+              <a:latin typeface="Consolas" panose="020B0609020204030204" pitchFamily="49" charset="0"/>
+            </a:endParaRPr>
+          </a:p>
+          <a:p>
+            <a:r>
+              <a:rPr lang="en-US" sz="1000" b="0" dirty="0">
+                <a:solidFill>
+                  <a:srgbClr val="CE9178"/>
+                </a:solidFill>
+                <a:effectLst/>
+                <a:latin typeface="Consolas" panose="020B0609020204030204" pitchFamily="49" charset="0"/>
+              </a:rPr>
+              <a:t>Woodlands</a:t>
+            </a:r>
+            <a:r>
+              <a:rPr lang="en-SG" sz="1000" b="0" dirty="0">
+                <a:solidFill>
+                  <a:srgbClr val="CE9178"/>
+                </a:solidFill>
+                <a:effectLst/>
+                <a:latin typeface="Consolas" panose="020B0609020204030204" pitchFamily="49" charset="0"/>
+              </a:rPr>
+              <a:t>_</a:t>
+            </a:r>
+            <a:r>
+              <a:rPr lang="en-SG" sz="1000" b="0" dirty="0" err="1">
+                <a:solidFill>
+                  <a:srgbClr val="CE9178"/>
+                </a:solidFill>
+                <a:effectLst/>
+                <a:latin typeface="Consolas" panose="020B0609020204030204" pitchFamily="49" charset="0"/>
+              </a:rPr>
+              <a:t>all_clstr_test_data</a:t>
+            </a:r>
+            <a:r>
+              <a:rPr lang="en-US" sz="1000" b="0" dirty="0">
+                <a:solidFill>
+                  <a:srgbClr val="CE9178"/>
+                </a:solidFill>
+                <a:effectLst/>
+                <a:latin typeface="Consolas" panose="020B0609020204030204" pitchFamily="49" charset="0"/>
+              </a:rPr>
+              <a:t>.csv</a:t>
+            </a:r>
+          </a:p>
+        </p:txBody>
+      </p:sp>
+      <p:sp>
+        <p:nvSpPr>
+          <p:cNvPr id="8" name="Multiplication Sign 7">
+            <a:extLst>
+              <a:ext uri="{FF2B5EF4-FFF2-40B4-BE49-F238E27FC236}">
+                <a16:creationId xmlns:a16="http://schemas.microsoft.com/office/drawing/2014/main" id="{892264EA-7146-3F7B-8C0A-EF3433A4C501}"/>
+              </a:ext>
+            </a:extLst>
+          </p:cNvPr>
+          <p:cNvSpPr/>
           <p:nvPr/>
         </p:nvSpPr>
         <p:spPr>
           <a:xfrm>
-            <a:off x="3887206" y="369333"/>
-            <a:ext cx="1129164" cy="307777"/>
-          </a:xfrm>
-          <a:prstGeom prst="rect">
+            <a:off x="604311" y="342838"/>
+            <a:ext cx="579421" cy="480195"/>
+          </a:xfrm>
+          <a:prstGeom prst="mathMultiply">
             <a:avLst/>
           </a:prstGeom>
-          <a:noFill/>
-          <a:ln>
-            <a:solidFill>
-              <a:schemeClr val="tx1"/>
-            </a:solidFill>
-          </a:ln>
-        </p:spPr>
-        <p:txBody>
-          <a:bodyPr wrap="square" rtlCol="0">
-            <a:spAutoFit/>
-          </a:bodyPr>
-          <a:lstStyle/>
-          <a:p>
-            <a:r>
-              <a:rPr lang="en-SG" sz="1400" dirty="0"/>
-              <a:t>Continued..</a:t>
-            </a:r>
-          </a:p>
-        </p:txBody>
-      </p:sp>
-      <p:sp>
-        <p:nvSpPr>
-          <p:cNvPr id="7" name="Flowchart: Data 6">
-            <a:extLst>
-              <a:ext uri="{FF2B5EF4-FFF2-40B4-BE49-F238E27FC236}">
-                <a16:creationId xmlns:a16="http://schemas.microsoft.com/office/drawing/2014/main" id="{1F939D23-5BFF-B09D-4D1F-5B97F056E7FB}"/>
-              </a:ext>
-            </a:extLst>
-          </p:cNvPr>
-          <p:cNvSpPr/>
-          <p:nvPr/>
-        </p:nvSpPr>
-        <p:spPr>
-          <a:xfrm>
-            <a:off x="1308970" y="904996"/>
-            <a:ext cx="4897925" cy="709685"/>
-          </a:xfrm>
-          <a:prstGeom prst="flowChartInputOutput">
-            <a:avLst/>
-          </a:prstGeom>
-          <a:noFill/>
-          <a:ln w="28575">
-            <a:solidFill>
-              <a:srgbClr val="92D050"/>
-            </a:solidFill>
-          </a:ln>
+          <a:solidFill>
+            <a:srgbClr val="FF0000"/>
+          </a:solidFill>
         </p:spPr>
         <p:style>
           <a:lnRef idx="2">
@@ -7238,152 +7344,170 @@
           <a:bodyPr rtlCol="0" anchor="ctr"/>
           <a:lstStyle/>
           <a:p>
-            <a:r>
-              <a:rPr lang="en-US" sz="1000" b="0" dirty="0">
-                <a:solidFill>
-                  <a:srgbClr val="CE9178"/>
-                </a:solidFill>
-                <a:effectLst/>
-                <a:latin typeface="Consolas" panose="020B0609020204030204" pitchFamily="49" charset="0"/>
-              </a:rPr>
-              <a:t>Woodlands_all_clstr_train_data.csv</a:t>
-            </a:r>
-          </a:p>
-          <a:p>
-            <a:r>
-              <a:rPr lang="en-US" sz="1000" b="0" dirty="0">
-                <a:solidFill>
-                  <a:srgbClr val="CE9178"/>
-                </a:solidFill>
-                <a:effectLst/>
-                <a:latin typeface="Consolas" panose="020B0609020204030204" pitchFamily="49" charset="0"/>
-              </a:rPr>
-              <a:t>Woodlands_all_clstr_full_train_data.csv</a:t>
-            </a:r>
-            <a:endParaRPr lang="en-US" sz="1000" b="0" dirty="0">
-              <a:solidFill>
-                <a:srgbClr val="CCCCCC"/>
-              </a:solidFill>
-              <a:effectLst/>
-              <a:latin typeface="Consolas" panose="020B0609020204030204" pitchFamily="49" charset="0"/>
-            </a:endParaRPr>
-          </a:p>
-          <a:p>
-            <a:r>
-              <a:rPr lang="en-US" sz="1000" b="0" dirty="0">
-                <a:solidFill>
-                  <a:srgbClr val="CE9178"/>
-                </a:solidFill>
-                <a:effectLst/>
-                <a:latin typeface="Consolas" panose="020B0609020204030204" pitchFamily="49" charset="0"/>
-              </a:rPr>
-              <a:t>Woodlands</a:t>
-            </a:r>
-            <a:r>
-              <a:rPr lang="en-SG" sz="1000" b="0" dirty="0">
-                <a:solidFill>
-                  <a:srgbClr val="CE9178"/>
-                </a:solidFill>
-                <a:effectLst/>
-                <a:latin typeface="Consolas" panose="020B0609020204030204" pitchFamily="49" charset="0"/>
-              </a:rPr>
-              <a:t>_</a:t>
-            </a:r>
-            <a:r>
-              <a:rPr lang="en-SG" sz="1000" b="0" dirty="0" err="1">
-                <a:solidFill>
-                  <a:srgbClr val="CE9178"/>
-                </a:solidFill>
-                <a:effectLst/>
-                <a:latin typeface="Consolas" panose="020B0609020204030204" pitchFamily="49" charset="0"/>
-              </a:rPr>
-              <a:t>all_clstr_val_data</a:t>
-            </a:r>
-            <a:r>
-              <a:rPr lang="en-US" sz="1000" b="0" dirty="0">
-                <a:solidFill>
-                  <a:srgbClr val="CE9178"/>
-                </a:solidFill>
-                <a:effectLst/>
-                <a:latin typeface="Consolas" panose="020B0609020204030204" pitchFamily="49" charset="0"/>
-              </a:rPr>
-              <a:t>.csv</a:t>
-            </a:r>
-            <a:endParaRPr lang="en-SG" sz="1000" b="0" dirty="0">
-              <a:solidFill>
-                <a:srgbClr val="CCCCCC"/>
-              </a:solidFill>
-              <a:effectLst/>
-              <a:latin typeface="Consolas" panose="020B0609020204030204" pitchFamily="49" charset="0"/>
-            </a:endParaRPr>
-          </a:p>
-          <a:p>
-            <a:r>
-              <a:rPr lang="en-US" sz="1000" b="0" dirty="0">
-                <a:solidFill>
-                  <a:srgbClr val="CE9178"/>
-                </a:solidFill>
-                <a:effectLst/>
-                <a:latin typeface="Consolas" panose="020B0609020204030204" pitchFamily="49" charset="0"/>
-              </a:rPr>
-              <a:t>Woodlands</a:t>
-            </a:r>
-            <a:r>
-              <a:rPr lang="en-SG" sz="1000" b="0" dirty="0">
-                <a:solidFill>
-                  <a:srgbClr val="CE9178"/>
-                </a:solidFill>
-                <a:effectLst/>
-                <a:latin typeface="Consolas" panose="020B0609020204030204" pitchFamily="49" charset="0"/>
-              </a:rPr>
-              <a:t>_</a:t>
-            </a:r>
-            <a:r>
-              <a:rPr lang="en-SG" sz="1000" b="0" dirty="0" err="1">
-                <a:solidFill>
-                  <a:srgbClr val="CE9178"/>
-                </a:solidFill>
-                <a:effectLst/>
-                <a:latin typeface="Consolas" panose="020B0609020204030204" pitchFamily="49" charset="0"/>
-              </a:rPr>
-              <a:t>all_clstr_test_data</a:t>
-            </a:r>
-            <a:r>
-              <a:rPr lang="en-US" sz="1000" b="0" dirty="0">
-                <a:solidFill>
-                  <a:srgbClr val="CE9178"/>
-                </a:solidFill>
-                <a:effectLst/>
-                <a:latin typeface="Consolas" panose="020B0609020204030204" pitchFamily="49" charset="0"/>
-              </a:rPr>
-              <a:t>.csv</a:t>
-            </a:r>
-          </a:p>
-        </p:txBody>
-      </p:sp>
-      <p:sp>
-        <p:nvSpPr>
-          <p:cNvPr id="8" name="Multiplication Sign 7">
-            <a:extLst>
-              <a:ext uri="{FF2B5EF4-FFF2-40B4-BE49-F238E27FC236}">
-                <a16:creationId xmlns:a16="http://schemas.microsoft.com/office/drawing/2014/main" id="{892264EA-7146-3F7B-8C0A-EF3433A4C501}"/>
-              </a:ext>
-            </a:extLst>
-          </p:cNvPr>
-          <p:cNvSpPr/>
+            <a:pPr algn="ctr"/>
+            <a:endParaRPr lang="en-SG"/>
+          </a:p>
+        </p:txBody>
+      </p:sp>
+      <p:cxnSp>
+        <p:nvCxnSpPr>
+          <p:cNvPr id="9" name="Straight Arrow Connector 8">
+            <a:extLst>
+              <a:ext uri="{FF2B5EF4-FFF2-40B4-BE49-F238E27FC236}">
+                <a16:creationId xmlns:a16="http://schemas.microsoft.com/office/drawing/2014/main" id="{2B7625B2-157F-2E6F-EE28-931417BCEBB4}"/>
+              </a:ext>
+            </a:extLst>
+          </p:cNvPr>
+          <p:cNvCxnSpPr>
+            <a:cxnSpLocks/>
+          </p:cNvCxnSpPr>
           <p:nvPr/>
-        </p:nvSpPr>
+        </p:nvCxnSpPr>
         <p:spPr>
           <a:xfrm>
-            <a:off x="604311" y="342838"/>
-            <a:ext cx="579421" cy="480195"/>
-          </a:xfrm>
-          <a:prstGeom prst="mathMultiply">
+            <a:off x="3742448" y="0"/>
+            <a:ext cx="0" cy="884628"/>
+          </a:xfrm>
+          <a:prstGeom prst="straightConnector1">
+            <a:avLst/>
+          </a:prstGeom>
+          <a:ln>
+            <a:tailEnd type="triangle"/>
+          </a:ln>
+        </p:spPr>
+        <p:style>
+          <a:lnRef idx="1">
+            <a:schemeClr val="dk1"/>
+          </a:lnRef>
+          <a:fillRef idx="0">
+            <a:schemeClr val="dk1"/>
+          </a:fillRef>
+          <a:effectRef idx="0">
+            <a:schemeClr val="dk1"/>
+          </a:effectRef>
+          <a:fontRef idx="minor">
+            <a:schemeClr val="tx1"/>
+          </a:fontRef>
+        </p:style>
+      </p:cxnSp>
+      <p:sp>
+        <p:nvSpPr>
+          <p:cNvPr id="10" name="TextBox 9">
+            <a:extLst>
+              <a:ext uri="{FF2B5EF4-FFF2-40B4-BE49-F238E27FC236}">
+                <a16:creationId xmlns:a16="http://schemas.microsoft.com/office/drawing/2014/main" id="{D9C7351D-B83F-6294-3E34-93A890E0C8FC}"/>
+              </a:ext>
+            </a:extLst>
+          </p:cNvPr>
+          <p:cNvSpPr txBox="1"/>
+          <p:nvPr/>
+        </p:nvSpPr>
+        <p:spPr>
+          <a:xfrm>
+            <a:off x="11519765" y="169577"/>
+            <a:ext cx="569387" cy="6411976"/>
+          </a:xfrm>
+          <a:prstGeom prst="rect">
             <a:avLst/>
           </a:prstGeom>
           <a:solidFill>
-            <a:srgbClr val="FF0000"/>
+            <a:srgbClr val="00B0F0"/>
           </a:solidFill>
+        </p:spPr>
+        <p:txBody>
+          <a:bodyPr vert="eaVert" wrap="square" rtlCol="0">
+            <a:spAutoFit/>
+          </a:bodyPr>
+          <a:lstStyle/>
+          <a:p>
+            <a:pPr algn="ctr"/>
+            <a:r>
+              <a:rPr lang="en-US" sz="2500" dirty="0">
+                <a:solidFill>
+                  <a:srgbClr val="FF0000"/>
+                </a:solidFill>
+              </a:rPr>
+              <a:t>MAIN Control Flow 2</a:t>
+            </a:r>
+            <a:endParaRPr lang="en-SG" sz="2500" dirty="0">
+              <a:solidFill>
+                <a:srgbClr val="FF0000"/>
+              </a:solidFill>
+            </a:endParaRPr>
+          </a:p>
+        </p:txBody>
+      </p:sp>
+      <p:cxnSp>
+        <p:nvCxnSpPr>
+          <p:cNvPr id="11" name="Connector: Elbow 10">
+            <a:extLst>
+              <a:ext uri="{FF2B5EF4-FFF2-40B4-BE49-F238E27FC236}">
+                <a16:creationId xmlns:a16="http://schemas.microsoft.com/office/drawing/2014/main" id="{3E85513E-4B54-759C-BC1F-570F58B3E03B}"/>
+              </a:ext>
+            </a:extLst>
+          </p:cNvPr>
+          <p:cNvCxnSpPr>
+            <a:cxnSpLocks/>
+            <a:endCxn id="7" idx="2"/>
+          </p:cNvCxnSpPr>
+          <p:nvPr/>
+        </p:nvCxnSpPr>
+        <p:spPr>
+          <a:xfrm rot="16200000" flipH="1">
+            <a:off x="669491" y="130567"/>
+            <a:ext cx="1353804" cy="904740"/>
+          </a:xfrm>
+          <a:prstGeom prst="bentConnector2">
+            <a:avLst/>
+          </a:prstGeom>
+          <a:ln>
+            <a:prstDash val="dash"/>
+            <a:tailEnd type="triangle"/>
+          </a:ln>
+        </p:spPr>
+        <p:style>
+          <a:lnRef idx="1">
+            <a:schemeClr val="dk1"/>
+          </a:lnRef>
+          <a:fillRef idx="0">
+            <a:schemeClr val="dk1"/>
+          </a:fillRef>
+          <a:effectRef idx="0">
+            <a:schemeClr val="dk1"/>
+          </a:effectRef>
+          <a:fontRef idx="minor">
+            <a:schemeClr val="tx1"/>
+          </a:fontRef>
+        </p:style>
+      </p:cxnSp>
+      <p:sp>
+        <p:nvSpPr>
+          <p:cNvPr id="4" name="Oval 3">
+            <a:extLst>
+              <a:ext uri="{FF2B5EF4-FFF2-40B4-BE49-F238E27FC236}">
+                <a16:creationId xmlns:a16="http://schemas.microsoft.com/office/drawing/2014/main" id="{08A11511-3B88-B633-305A-16B02D190A53}"/>
+              </a:ext>
+            </a:extLst>
+          </p:cNvPr>
+          <p:cNvSpPr/>
+          <p:nvPr/>
+        </p:nvSpPr>
+        <p:spPr>
+          <a:xfrm>
+            <a:off x="3520190" y="5105019"/>
+            <a:ext cx="1269093" cy="369332"/>
+          </a:xfrm>
+          <a:prstGeom prst="ellipse">
+            <a:avLst/>
+          </a:prstGeom>
+          <a:solidFill>
+            <a:schemeClr val="bg1"/>
+          </a:solidFill>
+          <a:ln w="28575">
+            <a:solidFill>
+              <a:schemeClr val="tx1"/>
+            </a:solidFill>
+          </a:ln>
         </p:spPr>
         <p:style>
           <a:lnRef idx="2">
@@ -7406,141 +7530,17 @@
           <a:lstStyle/>
           <a:p>
             <a:pPr algn="ctr"/>
-            <a:endParaRPr lang="en-SG"/>
-          </a:p>
-        </p:txBody>
-      </p:sp>
-      <p:cxnSp>
-        <p:nvCxnSpPr>
-          <p:cNvPr id="9" name="Straight Arrow Connector 8">
-            <a:extLst>
-              <a:ext uri="{FF2B5EF4-FFF2-40B4-BE49-F238E27FC236}">
-                <a16:creationId xmlns:a16="http://schemas.microsoft.com/office/drawing/2014/main" id="{2B7625B2-157F-2E6F-EE28-931417BCEBB4}"/>
-              </a:ext>
-            </a:extLst>
-          </p:cNvPr>
-          <p:cNvCxnSpPr>
-            <a:cxnSpLocks/>
-          </p:cNvCxnSpPr>
-          <p:nvPr/>
-        </p:nvCxnSpPr>
-        <p:spPr>
-          <a:xfrm>
-            <a:off x="3742448" y="0"/>
-            <a:ext cx="0" cy="884628"/>
-          </a:xfrm>
-          <a:prstGeom prst="straightConnector1">
-            <a:avLst/>
-          </a:prstGeom>
-          <a:ln>
-            <a:tailEnd type="triangle"/>
-          </a:ln>
-        </p:spPr>
-        <p:style>
-          <a:lnRef idx="1">
-            <a:schemeClr val="dk1"/>
-          </a:lnRef>
-          <a:fillRef idx="0">
-            <a:schemeClr val="dk1"/>
-          </a:fillRef>
-          <a:effectRef idx="0">
-            <a:schemeClr val="dk1"/>
-          </a:effectRef>
-          <a:fontRef idx="minor">
-            <a:schemeClr val="tx1"/>
-          </a:fontRef>
-        </p:style>
-      </p:cxnSp>
-      <p:sp>
-        <p:nvSpPr>
-          <p:cNvPr id="10" name="TextBox 9">
-            <a:extLst>
-              <a:ext uri="{FF2B5EF4-FFF2-40B4-BE49-F238E27FC236}">
-                <a16:creationId xmlns:a16="http://schemas.microsoft.com/office/drawing/2014/main" id="{D9C7351D-B83F-6294-3E34-93A890E0C8FC}"/>
-              </a:ext>
-            </a:extLst>
-          </p:cNvPr>
-          <p:cNvSpPr txBox="1"/>
-          <p:nvPr/>
-        </p:nvSpPr>
-        <p:spPr>
-          <a:xfrm>
-            <a:off x="11519765" y="169577"/>
-            <a:ext cx="569387" cy="6411976"/>
-          </a:xfrm>
-          <a:prstGeom prst="rect">
-            <a:avLst/>
-          </a:prstGeom>
-          <a:solidFill>
-            <a:srgbClr val="00B0F0"/>
-          </a:solidFill>
-        </p:spPr>
-        <p:txBody>
-          <a:bodyPr vert="eaVert" wrap="square" rtlCol="0">
-            <a:spAutoFit/>
-          </a:bodyPr>
-          <a:lstStyle/>
-          <a:p>
-            <a:pPr algn="ctr"/>
-            <a:r>
-              <a:rPr lang="en-US" sz="2500" dirty="0">
+            <a:r>
+              <a:rPr lang="en-SG" sz="1200" b="1" dirty="0">
                 <a:solidFill>
-                  <a:srgbClr val="FF0000"/>
+                  <a:schemeClr val="tx1"/>
                 </a:solidFill>
               </a:rPr>
-              <a:t>MAIN Control Flow</a:t>
-            </a:r>
-            <a:endParaRPr lang="en-SG" sz="2500" dirty="0">
-              <a:solidFill>
-                <a:srgbClr val="FF0000"/>
-              </a:solidFill>
-            </a:endParaRPr>
-          </a:p>
-        </p:txBody>
-      </p:sp>
-      <p:cxnSp>
-        <p:nvCxnSpPr>
-          <p:cNvPr id="11" name="Connector: Elbow 10">
-            <a:extLst>
-              <a:ext uri="{FF2B5EF4-FFF2-40B4-BE49-F238E27FC236}">
-                <a16:creationId xmlns:a16="http://schemas.microsoft.com/office/drawing/2014/main" id="{3E85513E-4B54-759C-BC1F-570F58B3E03B}"/>
-              </a:ext>
-            </a:extLst>
-          </p:cNvPr>
-          <p:cNvCxnSpPr>
-            <a:cxnSpLocks/>
-            <a:endCxn id="7" idx="2"/>
-          </p:cNvCxnSpPr>
-          <p:nvPr/>
-        </p:nvCxnSpPr>
-        <p:spPr>
-          <a:xfrm rot="16200000" flipH="1">
-            <a:off x="669491" y="130567"/>
-            <a:ext cx="1353804" cy="904740"/>
-          </a:xfrm>
-          <a:prstGeom prst="bentConnector2">
-            <a:avLst/>
-          </a:prstGeom>
-          <a:ln>
-            <a:prstDash val="dash"/>
-            <a:tailEnd type="triangle"/>
-          </a:ln>
-        </p:spPr>
-        <p:style>
-          <a:lnRef idx="1">
-            <a:schemeClr val="dk1"/>
-          </a:lnRef>
-          <a:fillRef idx="0">
-            <a:schemeClr val="dk1"/>
-          </a:fillRef>
-          <a:effectRef idx="0">
-            <a:schemeClr val="dk1"/>
-          </a:effectRef>
-          <a:fontRef idx="minor">
-            <a:schemeClr val="tx1"/>
-          </a:fontRef>
-        </p:style>
-      </p:cxnSp>
+              <a:t>FINISH</a:t>
+            </a:r>
+          </a:p>
+        </p:txBody>
+      </p:sp>
     </p:spTree>
     <p:extLst>
       <p:ext uri="{BB962C8B-B14F-4D97-AF65-F5344CB8AC3E}">
@@ -7608,7 +7608,7 @@
                   <a:srgbClr val="FFFF00"/>
                 </a:solidFill>
               </a:rPr>
-              <a:t>VISUALIZATION Control Flow</a:t>
+              <a:t>VISUALIZATION Control Flow 1</a:t>
             </a:r>
             <a:endParaRPr lang="en-SG" sz="2500" dirty="0">
               <a:solidFill>
@@ -7618,6 +7618,1609 @@
           </a:p>
         </p:txBody>
       </p:sp>
+      <p:sp>
+        <p:nvSpPr>
+          <p:cNvPr id="4" name="Flowchart: Process 3">
+            <a:extLst>
+              <a:ext uri="{FF2B5EF4-FFF2-40B4-BE49-F238E27FC236}">
+                <a16:creationId xmlns:a16="http://schemas.microsoft.com/office/drawing/2014/main" id="{69EDD854-4DA5-4D3C-8205-5908909034D0}"/>
+              </a:ext>
+            </a:extLst>
+          </p:cNvPr>
+          <p:cNvSpPr/>
+          <p:nvPr/>
+        </p:nvSpPr>
+        <p:spPr>
+          <a:xfrm>
+            <a:off x="318083" y="1546389"/>
+            <a:ext cx="2264311" cy="369332"/>
+          </a:xfrm>
+          <a:prstGeom prst="flowChartProcess">
+            <a:avLst/>
+          </a:prstGeom>
+          <a:noFill/>
+          <a:ln w="28575">
+            <a:solidFill>
+              <a:schemeClr val="accent2">
+                <a:lumMod val="75000"/>
+              </a:schemeClr>
+            </a:solidFill>
+          </a:ln>
+        </p:spPr>
+        <p:style>
+          <a:lnRef idx="2">
+            <a:schemeClr val="accent1">
+              <a:shade val="50000"/>
+            </a:schemeClr>
+          </a:lnRef>
+          <a:fillRef idx="1">
+            <a:schemeClr val="accent1"/>
+          </a:fillRef>
+          <a:effectRef idx="0">
+            <a:schemeClr val="accent1"/>
+          </a:effectRef>
+          <a:fontRef idx="minor">
+            <a:schemeClr val="lt1"/>
+          </a:fontRef>
+        </p:style>
+        <p:txBody>
+          <a:bodyPr rtlCol="0" anchor="ctr"/>
+          <a:lstStyle/>
+          <a:p>
+            <a:pPr algn="ctr"/>
+            <a:r>
+              <a:rPr lang="en-US" sz="1000" dirty="0" err="1">
+                <a:solidFill>
+                  <a:schemeClr val="tx1"/>
+                </a:solidFill>
+              </a:rPr>
+              <a:t>country_unmet_demand_analysis.ipynb</a:t>
+            </a:r>
+            <a:endParaRPr lang="en-SG" sz="1000" dirty="0">
+              <a:solidFill>
+                <a:schemeClr val="tx1"/>
+              </a:solidFill>
+            </a:endParaRPr>
+          </a:p>
+        </p:txBody>
+      </p:sp>
+      <p:cxnSp>
+        <p:nvCxnSpPr>
+          <p:cNvPr id="32" name="Straight Arrow Connector 31">
+            <a:extLst>
+              <a:ext uri="{FF2B5EF4-FFF2-40B4-BE49-F238E27FC236}">
+                <a16:creationId xmlns:a16="http://schemas.microsoft.com/office/drawing/2014/main" id="{3120D262-9AA0-DD13-E105-DFF3FAFDAF1A}"/>
+              </a:ext>
+            </a:extLst>
+          </p:cNvPr>
+          <p:cNvCxnSpPr>
+            <a:cxnSpLocks/>
+            <a:stCxn id="230" idx="3"/>
+            <a:endCxn id="66" idx="0"/>
+          </p:cNvCxnSpPr>
+          <p:nvPr/>
+        </p:nvCxnSpPr>
+        <p:spPr>
+          <a:xfrm flipH="1">
+            <a:off x="9145780" y="1303166"/>
+            <a:ext cx="6924" cy="195614"/>
+          </a:xfrm>
+          <a:prstGeom prst="straightConnector1">
+            <a:avLst/>
+          </a:prstGeom>
+          <a:ln>
+            <a:tailEnd type="triangle"/>
+          </a:ln>
+        </p:spPr>
+        <p:style>
+          <a:lnRef idx="1">
+            <a:schemeClr val="dk1"/>
+          </a:lnRef>
+          <a:fillRef idx="0">
+            <a:schemeClr val="dk1"/>
+          </a:fillRef>
+          <a:effectRef idx="0">
+            <a:schemeClr val="dk1"/>
+          </a:effectRef>
+          <a:fontRef idx="minor">
+            <a:schemeClr val="tx1"/>
+          </a:fontRef>
+        </p:style>
+      </p:cxnSp>
+      <p:cxnSp>
+        <p:nvCxnSpPr>
+          <p:cNvPr id="34" name="Straight Arrow Connector 33">
+            <a:extLst>
+              <a:ext uri="{FF2B5EF4-FFF2-40B4-BE49-F238E27FC236}">
+                <a16:creationId xmlns:a16="http://schemas.microsoft.com/office/drawing/2014/main" id="{C053D23C-EB4E-9B12-62D5-C753048F42E1}"/>
+              </a:ext>
+            </a:extLst>
+          </p:cNvPr>
+          <p:cNvCxnSpPr>
+            <a:cxnSpLocks/>
+            <a:stCxn id="216" idx="3"/>
+            <a:endCxn id="64" idx="0"/>
+          </p:cNvCxnSpPr>
+          <p:nvPr/>
+        </p:nvCxnSpPr>
+        <p:spPr>
+          <a:xfrm>
+            <a:off x="3963982" y="754097"/>
+            <a:ext cx="0" cy="327295"/>
+          </a:xfrm>
+          <a:prstGeom prst="straightConnector1">
+            <a:avLst/>
+          </a:prstGeom>
+          <a:ln>
+            <a:tailEnd type="triangle"/>
+          </a:ln>
+        </p:spPr>
+        <p:style>
+          <a:lnRef idx="1">
+            <a:schemeClr val="dk1"/>
+          </a:lnRef>
+          <a:fillRef idx="0">
+            <a:schemeClr val="dk1"/>
+          </a:fillRef>
+          <a:effectRef idx="0">
+            <a:schemeClr val="dk1"/>
+          </a:effectRef>
+          <a:fontRef idx="minor">
+            <a:schemeClr val="tx1"/>
+          </a:fontRef>
+        </p:style>
+      </p:cxnSp>
+      <p:cxnSp>
+        <p:nvCxnSpPr>
+          <p:cNvPr id="36" name="Straight Arrow Connector 35">
+            <a:extLst>
+              <a:ext uri="{FF2B5EF4-FFF2-40B4-BE49-F238E27FC236}">
+                <a16:creationId xmlns:a16="http://schemas.microsoft.com/office/drawing/2014/main" id="{B4E017E9-6266-4077-3F9A-2D02F6E8738D}"/>
+              </a:ext>
+            </a:extLst>
+          </p:cNvPr>
+          <p:cNvCxnSpPr>
+            <a:cxnSpLocks/>
+          </p:cNvCxnSpPr>
+          <p:nvPr/>
+        </p:nvCxnSpPr>
+        <p:spPr>
+          <a:xfrm>
+            <a:off x="6687434" y="1125036"/>
+            <a:ext cx="0" cy="437857"/>
+          </a:xfrm>
+          <a:prstGeom prst="straightConnector1">
+            <a:avLst/>
+          </a:prstGeom>
+          <a:ln>
+            <a:tailEnd type="triangle"/>
+          </a:ln>
+        </p:spPr>
+        <p:style>
+          <a:lnRef idx="1">
+            <a:schemeClr val="dk1"/>
+          </a:lnRef>
+          <a:fillRef idx="0">
+            <a:schemeClr val="dk1"/>
+          </a:fillRef>
+          <a:effectRef idx="0">
+            <a:schemeClr val="dk1"/>
+          </a:effectRef>
+          <a:fontRef idx="minor">
+            <a:schemeClr val="tx1"/>
+          </a:fontRef>
+        </p:style>
+      </p:cxnSp>
+      <p:sp>
+        <p:nvSpPr>
+          <p:cNvPr id="64" name="Flowchart: Process 63">
+            <a:extLst>
+              <a:ext uri="{FF2B5EF4-FFF2-40B4-BE49-F238E27FC236}">
+                <a16:creationId xmlns:a16="http://schemas.microsoft.com/office/drawing/2014/main" id="{C3219185-7B36-363F-82BE-3DEABAAB97A9}"/>
+              </a:ext>
+            </a:extLst>
+          </p:cNvPr>
+          <p:cNvSpPr/>
+          <p:nvPr/>
+        </p:nvSpPr>
+        <p:spPr>
+          <a:xfrm>
+            <a:off x="2831826" y="1081392"/>
+            <a:ext cx="2264312" cy="369332"/>
+          </a:xfrm>
+          <a:prstGeom prst="flowChartProcess">
+            <a:avLst/>
+          </a:prstGeom>
+          <a:noFill/>
+          <a:ln w="28575">
+            <a:solidFill>
+              <a:schemeClr val="accent2">
+                <a:lumMod val="75000"/>
+              </a:schemeClr>
+            </a:solidFill>
+          </a:ln>
+        </p:spPr>
+        <p:style>
+          <a:lnRef idx="2">
+            <a:schemeClr val="accent1">
+              <a:shade val="50000"/>
+            </a:schemeClr>
+          </a:lnRef>
+          <a:fillRef idx="1">
+            <a:schemeClr val="accent1"/>
+          </a:fillRef>
+          <a:effectRef idx="0">
+            <a:schemeClr val="accent1"/>
+          </a:effectRef>
+          <a:fontRef idx="minor">
+            <a:schemeClr val="lt1"/>
+          </a:fontRef>
+        </p:style>
+        <p:txBody>
+          <a:bodyPr rtlCol="0" anchor="ctr"/>
+          <a:lstStyle/>
+          <a:p>
+            <a:pPr algn="ctr"/>
+            <a:r>
+              <a:rPr lang="en-US" sz="1000" dirty="0" err="1">
+                <a:solidFill>
+                  <a:schemeClr val="tx1"/>
+                </a:solidFill>
+              </a:rPr>
+              <a:t>region_unmet_demand_analysis.ipynb</a:t>
+            </a:r>
+            <a:endParaRPr lang="en-SG" sz="1000" dirty="0">
+              <a:solidFill>
+                <a:schemeClr val="tx1"/>
+              </a:solidFill>
+            </a:endParaRPr>
+          </a:p>
+        </p:txBody>
+      </p:sp>
+      <p:sp>
+        <p:nvSpPr>
+          <p:cNvPr id="65" name="Flowchart: Process 64">
+            <a:extLst>
+              <a:ext uri="{FF2B5EF4-FFF2-40B4-BE49-F238E27FC236}">
+                <a16:creationId xmlns:a16="http://schemas.microsoft.com/office/drawing/2014/main" id="{0AE29E50-19B9-20AF-0707-971AAEABAD47}"/>
+              </a:ext>
+            </a:extLst>
+          </p:cNvPr>
+          <p:cNvSpPr/>
+          <p:nvPr/>
+        </p:nvSpPr>
+        <p:spPr>
+          <a:xfrm>
+            <a:off x="5346567" y="1556095"/>
+            <a:ext cx="2264311" cy="369332"/>
+          </a:xfrm>
+          <a:prstGeom prst="flowChartProcess">
+            <a:avLst/>
+          </a:prstGeom>
+          <a:noFill/>
+          <a:ln w="28575">
+            <a:solidFill>
+              <a:schemeClr val="accent2">
+                <a:lumMod val="75000"/>
+              </a:schemeClr>
+            </a:solidFill>
+          </a:ln>
+        </p:spPr>
+        <p:style>
+          <a:lnRef idx="2">
+            <a:schemeClr val="accent1">
+              <a:shade val="50000"/>
+            </a:schemeClr>
+          </a:lnRef>
+          <a:fillRef idx="1">
+            <a:schemeClr val="accent1"/>
+          </a:fillRef>
+          <a:effectRef idx="0">
+            <a:schemeClr val="accent1"/>
+          </a:effectRef>
+          <a:fontRef idx="minor">
+            <a:schemeClr val="lt1"/>
+          </a:fontRef>
+        </p:style>
+        <p:txBody>
+          <a:bodyPr rtlCol="0" anchor="ctr"/>
+          <a:lstStyle/>
+          <a:p>
+            <a:pPr algn="ctr"/>
+            <a:r>
+              <a:rPr lang="en-US" sz="1000" dirty="0" err="1">
+                <a:solidFill>
+                  <a:schemeClr val="tx1"/>
+                </a:solidFill>
+              </a:rPr>
+              <a:t>station_unmet_demand_analysis.ipynb</a:t>
+            </a:r>
+            <a:endParaRPr lang="en-SG" sz="1000" dirty="0">
+              <a:solidFill>
+                <a:schemeClr val="tx1"/>
+              </a:solidFill>
+            </a:endParaRPr>
+          </a:p>
+        </p:txBody>
+      </p:sp>
+      <p:sp>
+        <p:nvSpPr>
+          <p:cNvPr id="66" name="Flowchart: Process 65">
+            <a:extLst>
+              <a:ext uri="{FF2B5EF4-FFF2-40B4-BE49-F238E27FC236}">
+                <a16:creationId xmlns:a16="http://schemas.microsoft.com/office/drawing/2014/main" id="{82A461D3-4C99-32BA-7DD0-B0FE3EA40734}"/>
+              </a:ext>
+            </a:extLst>
+          </p:cNvPr>
+          <p:cNvSpPr/>
+          <p:nvPr/>
+        </p:nvSpPr>
+        <p:spPr>
+          <a:xfrm>
+            <a:off x="8013624" y="1498780"/>
+            <a:ext cx="2264311" cy="369332"/>
+          </a:xfrm>
+          <a:prstGeom prst="flowChartProcess">
+            <a:avLst/>
+          </a:prstGeom>
+          <a:noFill/>
+          <a:ln w="28575">
+            <a:solidFill>
+              <a:schemeClr val="accent2">
+                <a:lumMod val="75000"/>
+              </a:schemeClr>
+            </a:solidFill>
+          </a:ln>
+        </p:spPr>
+        <p:style>
+          <a:lnRef idx="2">
+            <a:schemeClr val="accent1">
+              <a:shade val="50000"/>
+            </a:schemeClr>
+          </a:lnRef>
+          <a:fillRef idx="1">
+            <a:schemeClr val="accent1"/>
+          </a:fillRef>
+          <a:effectRef idx="0">
+            <a:schemeClr val="accent1"/>
+          </a:effectRef>
+          <a:fontRef idx="minor">
+            <a:schemeClr val="lt1"/>
+          </a:fontRef>
+        </p:style>
+        <p:txBody>
+          <a:bodyPr rtlCol="0" anchor="ctr"/>
+          <a:lstStyle/>
+          <a:p>
+            <a:pPr algn="ctr"/>
+            <a:r>
+              <a:rPr lang="en-SG" sz="1000" dirty="0" err="1">
+                <a:solidFill>
+                  <a:schemeClr val="tx1"/>
+                </a:solidFill>
+              </a:rPr>
+              <a:t>cluster_data_viz_analysis.ipynb</a:t>
+            </a:r>
+            <a:endParaRPr lang="en-SG" sz="1000" dirty="0">
+              <a:solidFill>
+                <a:schemeClr val="tx1"/>
+              </a:solidFill>
+            </a:endParaRPr>
+          </a:p>
+        </p:txBody>
+      </p:sp>
+      <p:sp>
+        <p:nvSpPr>
+          <p:cNvPr id="87" name="Rectangle: Rounded Corners 86">
+            <a:extLst>
+              <a:ext uri="{FF2B5EF4-FFF2-40B4-BE49-F238E27FC236}">
+                <a16:creationId xmlns:a16="http://schemas.microsoft.com/office/drawing/2014/main" id="{8621B8D5-1ABE-E51C-48DE-4594EE7B1509}"/>
+              </a:ext>
+            </a:extLst>
+          </p:cNvPr>
+          <p:cNvSpPr/>
+          <p:nvPr/>
+        </p:nvSpPr>
+        <p:spPr>
+          <a:xfrm>
+            <a:off x="7870965" y="2009108"/>
+            <a:ext cx="3004373" cy="4636136"/>
+          </a:xfrm>
+          <a:prstGeom prst="roundRect">
+            <a:avLst/>
+          </a:prstGeom>
+          <a:solidFill>
+            <a:schemeClr val="accent2">
+              <a:lumMod val="60000"/>
+              <a:lumOff val="40000"/>
+            </a:schemeClr>
+          </a:solidFill>
+        </p:spPr>
+        <p:style>
+          <a:lnRef idx="2">
+            <a:schemeClr val="accent1">
+              <a:shade val="50000"/>
+            </a:schemeClr>
+          </a:lnRef>
+          <a:fillRef idx="1">
+            <a:schemeClr val="accent1"/>
+          </a:fillRef>
+          <a:effectRef idx="0">
+            <a:schemeClr val="accent1"/>
+          </a:effectRef>
+          <a:fontRef idx="minor">
+            <a:schemeClr val="lt1"/>
+          </a:fontRef>
+        </p:style>
+        <p:txBody>
+          <a:bodyPr rtlCol="0" anchor="ctr"/>
+          <a:lstStyle/>
+          <a:p>
+            <a:r>
+              <a:rPr lang="en-US" sz="1000" dirty="0"/>
+              <a:t>Analysis of Individual cluster (if necessary)</a:t>
+            </a:r>
+          </a:p>
+          <a:p>
+            <a:pPr marL="228600" indent="-228600">
+              <a:buAutoNum type="arabicParenR"/>
+            </a:pPr>
+            <a:r>
+              <a:rPr lang="en-US" sz="1000" dirty="0"/>
+              <a:t>Line plot of individual TS</a:t>
+            </a:r>
+          </a:p>
+          <a:p>
+            <a:pPr marL="228600" indent="-228600">
+              <a:buAutoNum type="arabicParenR"/>
+            </a:pPr>
+            <a:r>
+              <a:rPr lang="en-US" sz="1000" dirty="0"/>
+              <a:t>Time series decomposition to see trend cycles</a:t>
+            </a:r>
+          </a:p>
+          <a:p>
+            <a:pPr marL="228600" indent="-228600">
+              <a:buAutoNum type="arabicParenR"/>
+            </a:pPr>
+            <a:r>
+              <a:rPr lang="en-US" sz="1000" dirty="0"/>
+              <a:t>Encoder length selection</a:t>
+            </a:r>
+          </a:p>
+          <a:p>
+            <a:pPr marL="228600" indent="-228600">
+              <a:buAutoNum type="arabicParenR"/>
+            </a:pPr>
+            <a:r>
+              <a:rPr lang="en-US" sz="1000" dirty="0"/>
+              <a:t>Histogram/ N-</a:t>
+            </a:r>
+            <a:r>
+              <a:rPr lang="en-US" sz="1000" dirty="0" err="1"/>
+              <a:t>binom</a:t>
+            </a:r>
+            <a:r>
+              <a:rPr lang="en-US" sz="1000" dirty="0"/>
+              <a:t> distribution visualization </a:t>
+            </a:r>
+          </a:p>
+          <a:p>
+            <a:pPr marL="228600" indent="-228600">
+              <a:buAutoNum type="arabicParenR"/>
+            </a:pPr>
+            <a:r>
+              <a:rPr lang="en-US" sz="1000" dirty="0"/>
+              <a:t>Visualize weather covariates neighboring cluster demands.</a:t>
+            </a:r>
+          </a:p>
+          <a:p>
+            <a:pPr marL="228600" indent="-228600">
+              <a:buAutoNum type="arabicParenR"/>
+            </a:pPr>
+            <a:r>
+              <a:rPr lang="en-US" sz="1000" dirty="0"/>
+              <a:t>Check stationarity using ADF test</a:t>
+            </a:r>
+          </a:p>
+          <a:p>
+            <a:pPr marL="228600" indent="-228600">
+              <a:buAutoNum type="arabicParenR"/>
+            </a:pPr>
+            <a:r>
+              <a:rPr lang="en-US" sz="1000" dirty="0"/>
+              <a:t>Weekly Box plot of numeric TS</a:t>
+            </a:r>
+          </a:p>
+          <a:p>
+            <a:pPr marL="228600" indent="-228600">
+              <a:buAutoNum type="arabicParenR"/>
+            </a:pPr>
+            <a:r>
+              <a:rPr lang="en-US" sz="1000" dirty="0"/>
+              <a:t>ACF, PACF &amp; FFT of demands of all clusters within </a:t>
+            </a:r>
+            <a:r>
+              <a:rPr lang="en-US" sz="1000" dirty="0" err="1"/>
+              <a:t>regio</a:t>
+            </a:r>
+            <a:endParaRPr lang="en-US" sz="1000" dirty="0"/>
+          </a:p>
+          <a:p>
+            <a:pPr marL="228600" indent="-228600">
+              <a:buAutoNum type="arabicParenR"/>
+            </a:pPr>
+            <a:r>
+              <a:rPr lang="en-US" sz="1000" dirty="0"/>
+              <a:t>Heatmap and week day seasonal plot of a particular weeks demands every hour</a:t>
+            </a:r>
+          </a:p>
+          <a:p>
+            <a:pPr marL="228600" indent="-228600">
+              <a:buAutoNum type="arabicParenR"/>
+            </a:pPr>
+            <a:r>
+              <a:rPr lang="en-US" sz="1000" dirty="0"/>
+              <a:t>IFFT TS of only the largest periods for all demands in region</a:t>
+            </a:r>
+          </a:p>
+          <a:p>
+            <a:pPr marL="228600" indent="-228600">
+              <a:buAutoNum type="arabicParenR"/>
+            </a:pPr>
+            <a:r>
+              <a:rPr lang="en-US" sz="1000" dirty="0"/>
+              <a:t>Cross correlation between different demands in region to select 2 cluster demands as covariates.</a:t>
+            </a:r>
+          </a:p>
+          <a:p>
+            <a:pPr marL="228600" indent="-228600">
+              <a:buAutoNum type="arabicParenR"/>
+            </a:pPr>
+            <a:r>
+              <a:rPr lang="en-US" sz="1000" dirty="0"/>
+              <a:t>Create </a:t>
+            </a:r>
+            <a:r>
+              <a:rPr lang="en-US" sz="1000" dirty="0" err="1"/>
+              <a:t>TSFresh</a:t>
+            </a:r>
+            <a:r>
+              <a:rPr lang="en-US" sz="1000" dirty="0"/>
+              <a:t> statistical features. </a:t>
+            </a:r>
+          </a:p>
+          <a:p>
+            <a:pPr marL="228600" indent="-228600">
+              <a:buAutoNum type="arabicParenR"/>
+            </a:pPr>
+            <a:r>
+              <a:rPr lang="en-US" sz="1000" dirty="0"/>
+              <a:t>Pandas profiling</a:t>
+            </a:r>
+          </a:p>
+          <a:p>
+            <a:pPr marL="228600" indent="-228600">
+              <a:buAutoNum type="arabicParenR"/>
+            </a:pPr>
+            <a:r>
+              <a:rPr lang="en-US" sz="1000" dirty="0"/>
+              <a:t>Include inflow as covariate</a:t>
+            </a:r>
+          </a:p>
+          <a:p>
+            <a:pPr marL="228600" indent="-228600">
+              <a:buAutoNum type="arabicParenR"/>
+            </a:pPr>
+            <a:r>
+              <a:rPr lang="en-US" sz="1000" dirty="0"/>
+              <a:t>Check granger causality between demand and covariates.</a:t>
+            </a:r>
+          </a:p>
+          <a:p>
+            <a:pPr marL="228600" indent="-228600">
+              <a:buAutoNum type="arabicParenR"/>
+            </a:pPr>
+            <a:r>
+              <a:rPr lang="en-US" sz="1000" dirty="0"/>
+              <a:t>Check correlation between categorial data with target (demand) TS using </a:t>
+            </a:r>
+            <a:r>
+              <a:rPr lang="en-US" sz="1000" dirty="0" err="1"/>
+              <a:t>cramer’s</a:t>
+            </a:r>
+            <a:r>
+              <a:rPr lang="en-US" sz="1000" dirty="0"/>
+              <a:t> V statistic </a:t>
+            </a:r>
+            <a:endParaRPr lang="en-SG" sz="1000" dirty="0"/>
+          </a:p>
+          <a:p>
+            <a:endParaRPr lang="en-SG" sz="1000" dirty="0"/>
+          </a:p>
+        </p:txBody>
+      </p:sp>
+      <p:sp>
+        <p:nvSpPr>
+          <p:cNvPr id="172" name="Rectangle: Rounded Corners 171">
+            <a:extLst>
+              <a:ext uri="{FF2B5EF4-FFF2-40B4-BE49-F238E27FC236}">
+                <a16:creationId xmlns:a16="http://schemas.microsoft.com/office/drawing/2014/main" id="{0DFF60A8-1868-3940-C9BC-CCFEEFD90583}"/>
+              </a:ext>
+            </a:extLst>
+          </p:cNvPr>
+          <p:cNvSpPr/>
+          <p:nvPr/>
+        </p:nvSpPr>
+        <p:spPr>
+          <a:xfrm>
+            <a:off x="5402551" y="2255341"/>
+            <a:ext cx="2264311" cy="2216725"/>
+          </a:xfrm>
+          <a:prstGeom prst="roundRect">
+            <a:avLst/>
+          </a:prstGeom>
+          <a:solidFill>
+            <a:schemeClr val="accent2">
+              <a:lumMod val="60000"/>
+              <a:lumOff val="40000"/>
+            </a:schemeClr>
+          </a:solidFill>
+        </p:spPr>
+        <p:style>
+          <a:lnRef idx="2">
+            <a:schemeClr val="accent1">
+              <a:shade val="50000"/>
+            </a:schemeClr>
+          </a:lnRef>
+          <a:fillRef idx="1">
+            <a:schemeClr val="accent1"/>
+          </a:fillRef>
+          <a:effectRef idx="0">
+            <a:schemeClr val="accent1"/>
+          </a:effectRef>
+          <a:fontRef idx="minor">
+            <a:schemeClr val="lt1"/>
+          </a:fontRef>
+        </p:style>
+        <p:txBody>
+          <a:bodyPr rtlCol="0" anchor="ctr"/>
+          <a:lstStyle/>
+          <a:p>
+            <a:pPr marL="228600" indent="-228600">
+              <a:buAutoNum type="arabicParenR"/>
+            </a:pPr>
+            <a:r>
+              <a:rPr lang="en-US" sz="1000" dirty="0"/>
+              <a:t>Feature extraction </a:t>
+            </a:r>
+          </a:p>
+          <a:p>
+            <a:pPr marL="228600" indent="-228600">
+              <a:buAutoNum type="arabicParenR"/>
+            </a:pPr>
+            <a:r>
+              <a:rPr lang="en-US" sz="1000" dirty="0"/>
+              <a:t>Clustering</a:t>
+            </a:r>
+          </a:p>
+          <a:p>
+            <a:pPr marL="228600" indent="-228600">
+              <a:buAutoNum type="arabicParenR"/>
+            </a:pPr>
+            <a:r>
+              <a:rPr lang="en-US" sz="1000" dirty="0"/>
+              <a:t>Identify representative stations</a:t>
+            </a:r>
+          </a:p>
+          <a:p>
+            <a:pPr marL="228600" indent="-228600">
+              <a:buAutoNum type="arabicParenR"/>
+            </a:pPr>
+            <a:r>
+              <a:rPr lang="en-US" sz="1000" dirty="0"/>
+              <a:t>Identify most busy station within a cluster.</a:t>
+            </a:r>
+          </a:p>
+          <a:p>
+            <a:pPr marL="228600" indent="-228600">
+              <a:buAutoNum type="arabicParenR"/>
+            </a:pPr>
+            <a:endParaRPr lang="en-US" sz="1000" dirty="0"/>
+          </a:p>
+          <a:p>
+            <a:endParaRPr lang="en-SG" sz="1000" dirty="0"/>
+          </a:p>
+        </p:txBody>
+      </p:sp>
+      <p:sp>
+        <p:nvSpPr>
+          <p:cNvPr id="173" name="Rectangle: Rounded Corners 172">
+            <a:extLst>
+              <a:ext uri="{FF2B5EF4-FFF2-40B4-BE49-F238E27FC236}">
+                <a16:creationId xmlns:a16="http://schemas.microsoft.com/office/drawing/2014/main" id="{99CC7465-D182-AF59-234E-C64C86900248}"/>
+              </a:ext>
+            </a:extLst>
+          </p:cNvPr>
+          <p:cNvSpPr/>
+          <p:nvPr/>
+        </p:nvSpPr>
+        <p:spPr>
+          <a:xfrm>
+            <a:off x="2848089" y="1546389"/>
+            <a:ext cx="2264311" cy="5311611"/>
+          </a:xfrm>
+          <a:prstGeom prst="roundRect">
+            <a:avLst/>
+          </a:prstGeom>
+          <a:solidFill>
+            <a:schemeClr val="accent2">
+              <a:lumMod val="60000"/>
+              <a:lumOff val="40000"/>
+            </a:schemeClr>
+          </a:solidFill>
+        </p:spPr>
+        <p:style>
+          <a:lnRef idx="2">
+            <a:schemeClr val="accent1">
+              <a:shade val="50000"/>
+            </a:schemeClr>
+          </a:lnRef>
+          <a:fillRef idx="1">
+            <a:schemeClr val="accent1"/>
+          </a:fillRef>
+          <a:effectRef idx="0">
+            <a:schemeClr val="accent1"/>
+          </a:effectRef>
+          <a:fontRef idx="minor">
+            <a:schemeClr val="lt1"/>
+          </a:fontRef>
+        </p:style>
+        <p:txBody>
+          <a:bodyPr rtlCol="0" anchor="ctr"/>
+          <a:lstStyle/>
+          <a:p>
+            <a:pPr marL="228600" indent="-228600">
+              <a:buAutoNum type="arabicParenR"/>
+            </a:pPr>
+            <a:r>
+              <a:rPr lang="en-US" sz="1000" dirty="0"/>
+              <a:t>Gain Business Insights</a:t>
+            </a:r>
+          </a:p>
+          <a:p>
+            <a:pPr marL="228600" indent="-228600">
+              <a:buAutoNum type="arabicParenR"/>
+            </a:pPr>
+            <a:r>
+              <a:rPr lang="en-US" sz="1000" dirty="0"/>
+              <a:t>Visualize region level demand on map</a:t>
+            </a:r>
+          </a:p>
+          <a:p>
+            <a:pPr marL="228600" indent="-228600">
+              <a:buAutoNum type="arabicParenR"/>
+            </a:pPr>
+            <a:r>
+              <a:rPr lang="en-US" sz="1000" dirty="0"/>
+              <a:t>Clustering of met, unmet and total demand to identify similar regions.</a:t>
+            </a:r>
+          </a:p>
+          <a:p>
+            <a:pPr marL="228600" indent="-228600">
+              <a:buFontTx/>
+              <a:buAutoNum type="arabicParenR"/>
+            </a:pPr>
+            <a:r>
+              <a:rPr lang="en-US" sz="1000" dirty="0"/>
+              <a:t>Identify representative regions</a:t>
+            </a:r>
+          </a:p>
+          <a:p>
+            <a:pPr marL="228600" indent="-228600">
+              <a:buAutoNum type="arabicParenR"/>
+            </a:pPr>
+            <a:r>
+              <a:rPr lang="en-US" sz="1000" dirty="0"/>
+              <a:t>Rank overall direction of demand flow between regions using correlation and rental logs analysis</a:t>
+            </a:r>
+          </a:p>
+          <a:p>
+            <a:pPr marL="228600" indent="-228600">
+              <a:buAutoNum type="arabicParenR"/>
+            </a:pPr>
+            <a:r>
+              <a:rPr lang="en-US" sz="1000" dirty="0"/>
+              <a:t>Discover dominant </a:t>
+            </a:r>
+            <a:r>
+              <a:rPr lang="en-US" sz="1000" dirty="0" err="1"/>
+              <a:t>seasonalities</a:t>
+            </a:r>
+            <a:r>
+              <a:rPr lang="en-US" sz="1000" dirty="0"/>
+              <a:t> and business cycles in met, unmet and total demand using FFT plots.</a:t>
+            </a:r>
+          </a:p>
+          <a:p>
+            <a:pPr marL="228600" indent="-228600">
+              <a:buAutoNum type="arabicParenR"/>
+            </a:pPr>
+            <a:r>
+              <a:rPr lang="en-US" sz="1000" dirty="0"/>
+              <a:t>Discover correlation with neighboring time points through PACF plots</a:t>
+            </a:r>
+          </a:p>
+          <a:p>
+            <a:pPr marL="228600" indent="-228600">
+              <a:buAutoNum type="arabicParenR"/>
+            </a:pPr>
+            <a:r>
+              <a:rPr lang="en-US" sz="1000" dirty="0"/>
+              <a:t>Rank well-performing and underperforming regions using high-level statistical comparison of unmet and demand across regions </a:t>
+            </a:r>
+          </a:p>
+          <a:p>
+            <a:pPr marL="228600" indent="-228600">
+              <a:buFontTx/>
+              <a:buAutoNum type="arabicParenR"/>
+            </a:pPr>
+            <a:r>
+              <a:rPr lang="en-US" sz="1000" dirty="0"/>
+              <a:t>Identify most busy cluster within a region.</a:t>
+            </a:r>
+          </a:p>
+          <a:p>
+            <a:pPr marL="228600" indent="-228600">
+              <a:buFontTx/>
+              <a:buAutoNum type="arabicParenR"/>
+            </a:pPr>
+            <a:r>
+              <a:rPr lang="en-US" sz="1000" dirty="0"/>
+              <a:t>Heatmap of hourly total demand in a week. To compare regions with high demand at certain hours and days.</a:t>
+            </a:r>
+          </a:p>
+          <a:p>
+            <a:pPr marL="228600" indent="-228600">
+              <a:buFontTx/>
+              <a:buAutoNum type="arabicParenR"/>
+            </a:pPr>
+            <a:r>
+              <a:rPr lang="en-US" sz="1000" dirty="0"/>
+              <a:t>Show boxplot showing summary statistics to compare regions</a:t>
+            </a:r>
+          </a:p>
+          <a:p>
+            <a:pPr marL="228600" indent="-228600">
+              <a:buFontTx/>
+              <a:buAutoNum type="arabicParenR"/>
+            </a:pPr>
+            <a:r>
+              <a:rPr lang="en-US" sz="1000" dirty="0"/>
+              <a:t>Feature engineering of region-level features.</a:t>
+            </a:r>
+          </a:p>
+        </p:txBody>
+      </p:sp>
+      <p:sp>
+        <p:nvSpPr>
+          <p:cNvPr id="174" name="Rectangle: Rounded Corners 173">
+            <a:extLst>
+              <a:ext uri="{FF2B5EF4-FFF2-40B4-BE49-F238E27FC236}">
+                <a16:creationId xmlns:a16="http://schemas.microsoft.com/office/drawing/2014/main" id="{F5AF8275-5A44-72FA-1D34-642712EA1053}"/>
+              </a:ext>
+            </a:extLst>
+          </p:cNvPr>
+          <p:cNvSpPr/>
+          <p:nvPr/>
+        </p:nvSpPr>
+        <p:spPr>
+          <a:xfrm>
+            <a:off x="304035" y="2145933"/>
+            <a:ext cx="2264311" cy="2079491"/>
+          </a:xfrm>
+          <a:prstGeom prst="roundRect">
+            <a:avLst/>
+          </a:prstGeom>
+          <a:solidFill>
+            <a:schemeClr val="accent2">
+              <a:lumMod val="60000"/>
+              <a:lumOff val="40000"/>
+            </a:schemeClr>
+          </a:solidFill>
+        </p:spPr>
+        <p:style>
+          <a:lnRef idx="2">
+            <a:schemeClr val="accent1">
+              <a:shade val="50000"/>
+            </a:schemeClr>
+          </a:lnRef>
+          <a:fillRef idx="1">
+            <a:schemeClr val="accent1"/>
+          </a:fillRef>
+          <a:effectRef idx="0">
+            <a:schemeClr val="accent1"/>
+          </a:effectRef>
+          <a:fontRef idx="minor">
+            <a:schemeClr val="lt1"/>
+          </a:fontRef>
+        </p:style>
+        <p:txBody>
+          <a:bodyPr rtlCol="0" anchor="ctr"/>
+          <a:lstStyle/>
+          <a:p>
+            <a:pPr marL="228600" indent="-228600">
+              <a:buAutoNum type="arabicParenR"/>
+            </a:pPr>
+            <a:r>
+              <a:rPr lang="en-US" sz="1000" dirty="0"/>
+              <a:t>Gain Business Insights</a:t>
+            </a:r>
+          </a:p>
+          <a:p>
+            <a:pPr marL="228600" indent="-228600">
+              <a:buAutoNum type="arabicParenR"/>
+            </a:pPr>
+            <a:r>
+              <a:rPr lang="en-US" sz="1000" dirty="0"/>
+              <a:t>Check correlation between met and unmet demand</a:t>
+            </a:r>
+          </a:p>
+          <a:p>
+            <a:pPr marL="228600" indent="-228600">
+              <a:buAutoNum type="arabicParenR"/>
+            </a:pPr>
+            <a:r>
+              <a:rPr lang="en-US" sz="1000" dirty="0"/>
+              <a:t>Discover dominant </a:t>
+            </a:r>
+            <a:r>
+              <a:rPr lang="en-US" sz="1000" dirty="0" err="1"/>
+              <a:t>seasonalities</a:t>
+            </a:r>
+            <a:r>
+              <a:rPr lang="en-US" sz="1000" dirty="0"/>
+              <a:t> and business cycles in met, unmet and total demand using FFT plots.</a:t>
+            </a:r>
+          </a:p>
+          <a:p>
+            <a:pPr marL="228600" indent="-228600">
+              <a:buAutoNum type="arabicParenR"/>
+            </a:pPr>
+            <a:r>
+              <a:rPr lang="en-US" sz="1000" dirty="0"/>
+              <a:t>Pandas profiling</a:t>
+            </a:r>
+          </a:p>
+          <a:p>
+            <a:pPr marL="228600" indent="-228600">
+              <a:buFontTx/>
+              <a:buAutoNum type="arabicParenR"/>
+            </a:pPr>
+            <a:r>
+              <a:rPr lang="en-US" sz="1000" dirty="0"/>
+              <a:t>Discover correlation with neighboring time points through ACF and PACF plots for met, unmet and total demand.</a:t>
+            </a:r>
+          </a:p>
+        </p:txBody>
+      </p:sp>
+      <p:sp>
+        <p:nvSpPr>
+          <p:cNvPr id="182" name="Flowchart: Magnetic Disk 181">
+            <a:extLst>
+              <a:ext uri="{FF2B5EF4-FFF2-40B4-BE49-F238E27FC236}">
+                <a16:creationId xmlns:a16="http://schemas.microsoft.com/office/drawing/2014/main" id="{0D895FFE-61B4-C233-E461-421548D22159}"/>
+              </a:ext>
+            </a:extLst>
+          </p:cNvPr>
+          <p:cNvSpPr/>
+          <p:nvPr/>
+        </p:nvSpPr>
+        <p:spPr>
+          <a:xfrm>
+            <a:off x="464396" y="127048"/>
+            <a:ext cx="2221117" cy="955063"/>
+          </a:xfrm>
+          <a:prstGeom prst="flowChartMagneticDisk">
+            <a:avLst/>
+          </a:prstGeom>
+          <a:noFill/>
+          <a:ln w="28575">
+            <a:solidFill>
+              <a:srgbClr val="92D050"/>
+            </a:solidFill>
+          </a:ln>
+        </p:spPr>
+        <p:style>
+          <a:lnRef idx="2">
+            <a:schemeClr val="accent1">
+              <a:shade val="50000"/>
+            </a:schemeClr>
+          </a:lnRef>
+          <a:fillRef idx="1">
+            <a:schemeClr val="accent1"/>
+          </a:fillRef>
+          <a:effectRef idx="0">
+            <a:schemeClr val="accent1"/>
+          </a:effectRef>
+          <a:fontRef idx="minor">
+            <a:schemeClr val="lt1"/>
+          </a:fontRef>
+        </p:style>
+        <p:txBody>
+          <a:bodyPr rtlCol="0" anchor="ctr"/>
+          <a:lstStyle/>
+          <a:p>
+            <a:pPr algn="ctr"/>
+            <a:r>
+              <a:rPr lang="en-SG" sz="1000" dirty="0">
+                <a:solidFill>
+                  <a:schemeClr val="tx1"/>
+                </a:solidFill>
+              </a:rPr>
+              <a:t>UnmetDemand_df_station_level.csv</a:t>
+            </a:r>
+          </a:p>
+          <a:p>
+            <a:pPr algn="ctr"/>
+            <a:r>
+              <a:rPr lang="en-US" sz="1000" dirty="0">
+                <a:solidFill>
+                  <a:schemeClr val="tx1"/>
+                </a:solidFill>
+              </a:rPr>
+              <a:t>station_outflow_60_0.01_('2021-09-24', 0)_to_('2021-12-23', 19).csv</a:t>
+            </a:r>
+            <a:endParaRPr lang="en-SG" sz="1000" dirty="0">
+              <a:solidFill>
+                <a:schemeClr val="tx1"/>
+              </a:solidFill>
+            </a:endParaRPr>
+          </a:p>
+        </p:txBody>
+      </p:sp>
+      <p:cxnSp>
+        <p:nvCxnSpPr>
+          <p:cNvPr id="183" name="Connector: Elbow 182">
+            <a:extLst>
+              <a:ext uri="{FF2B5EF4-FFF2-40B4-BE49-F238E27FC236}">
+                <a16:creationId xmlns:a16="http://schemas.microsoft.com/office/drawing/2014/main" id="{33CC396F-6E8F-68DE-02A3-F3B95B7182C9}"/>
+              </a:ext>
+            </a:extLst>
+          </p:cNvPr>
+          <p:cNvCxnSpPr>
+            <a:cxnSpLocks/>
+            <a:stCxn id="182" idx="2"/>
+            <a:endCxn id="4" idx="0"/>
+          </p:cNvCxnSpPr>
+          <p:nvPr/>
+        </p:nvCxnSpPr>
+        <p:spPr>
+          <a:xfrm rot="10800000" flipH="1" flipV="1">
+            <a:off x="464395" y="604579"/>
+            <a:ext cx="985843" cy="941809"/>
+          </a:xfrm>
+          <a:prstGeom prst="bentConnector4">
+            <a:avLst>
+              <a:gd name="adj1" fmla="val -14923"/>
+              <a:gd name="adj2" fmla="val 75352"/>
+            </a:avLst>
+          </a:prstGeom>
+          <a:ln>
+            <a:tailEnd type="triangle"/>
+          </a:ln>
+        </p:spPr>
+        <p:style>
+          <a:lnRef idx="1">
+            <a:schemeClr val="dk1"/>
+          </a:lnRef>
+          <a:fillRef idx="0">
+            <a:schemeClr val="dk1"/>
+          </a:fillRef>
+          <a:effectRef idx="0">
+            <a:schemeClr val="dk1"/>
+          </a:effectRef>
+          <a:fontRef idx="minor">
+            <a:schemeClr val="tx1"/>
+          </a:fontRef>
+        </p:style>
+      </p:cxnSp>
+      <p:sp>
+        <p:nvSpPr>
+          <p:cNvPr id="192" name="Flowchart: Process 191">
+            <a:extLst>
+              <a:ext uri="{FF2B5EF4-FFF2-40B4-BE49-F238E27FC236}">
+                <a16:creationId xmlns:a16="http://schemas.microsoft.com/office/drawing/2014/main" id="{D30E63F3-A349-21F5-BEB1-E246E8BF32B3}"/>
+              </a:ext>
+            </a:extLst>
+          </p:cNvPr>
+          <p:cNvSpPr/>
+          <p:nvPr/>
+        </p:nvSpPr>
+        <p:spPr>
+          <a:xfrm>
+            <a:off x="318083" y="5126944"/>
+            <a:ext cx="1771454" cy="369332"/>
+          </a:xfrm>
+          <a:prstGeom prst="flowChartProcess">
+            <a:avLst/>
+          </a:prstGeom>
+          <a:noFill/>
+          <a:ln w="28575">
+            <a:solidFill>
+              <a:srgbClr val="00B0F0"/>
+            </a:solidFill>
+          </a:ln>
+        </p:spPr>
+        <p:style>
+          <a:lnRef idx="2">
+            <a:schemeClr val="accent1">
+              <a:shade val="50000"/>
+            </a:schemeClr>
+          </a:lnRef>
+          <a:fillRef idx="1">
+            <a:schemeClr val="accent1"/>
+          </a:fillRef>
+          <a:effectRef idx="0">
+            <a:schemeClr val="accent1"/>
+          </a:effectRef>
+          <a:fontRef idx="minor">
+            <a:schemeClr val="lt1"/>
+          </a:fontRef>
+        </p:style>
+        <p:txBody>
+          <a:bodyPr rtlCol="0" anchor="ctr"/>
+          <a:lstStyle/>
+          <a:p>
+            <a:pPr algn="ctr"/>
+            <a:r>
+              <a:rPr lang="en-US" sz="1600" b="1" dirty="0">
+                <a:solidFill>
+                  <a:schemeClr val="tx1"/>
+                </a:solidFill>
+              </a:rPr>
+              <a:t>TABLEAU</a:t>
+            </a:r>
+            <a:endParaRPr lang="en-SG" sz="1600" b="1" dirty="0">
+              <a:solidFill>
+                <a:schemeClr val="tx1"/>
+              </a:solidFill>
+            </a:endParaRPr>
+          </a:p>
+        </p:txBody>
+      </p:sp>
+      <p:cxnSp>
+        <p:nvCxnSpPr>
+          <p:cNvPr id="194" name="Connector: Elbow 193">
+            <a:extLst>
+              <a:ext uri="{FF2B5EF4-FFF2-40B4-BE49-F238E27FC236}">
+                <a16:creationId xmlns:a16="http://schemas.microsoft.com/office/drawing/2014/main" id="{0BE68D5D-A6B2-23F0-F95D-FA2533BDEF6D}"/>
+              </a:ext>
+            </a:extLst>
+          </p:cNvPr>
+          <p:cNvCxnSpPr>
+            <a:cxnSpLocks/>
+            <a:stCxn id="182" idx="2"/>
+            <a:endCxn id="192" idx="1"/>
+          </p:cNvCxnSpPr>
+          <p:nvPr/>
+        </p:nvCxnSpPr>
+        <p:spPr>
+          <a:xfrm rot="10800000" flipV="1">
+            <a:off x="318084" y="604580"/>
+            <a:ext cx="146313" cy="4707030"/>
+          </a:xfrm>
+          <a:prstGeom prst="bentConnector3">
+            <a:avLst>
+              <a:gd name="adj1" fmla="val 256240"/>
+            </a:avLst>
+          </a:prstGeom>
+          <a:ln>
+            <a:tailEnd type="triangle"/>
+          </a:ln>
+        </p:spPr>
+        <p:style>
+          <a:lnRef idx="1">
+            <a:schemeClr val="dk1"/>
+          </a:lnRef>
+          <a:fillRef idx="0">
+            <a:schemeClr val="dk1"/>
+          </a:fillRef>
+          <a:effectRef idx="0">
+            <a:schemeClr val="dk1"/>
+          </a:effectRef>
+          <a:fontRef idx="minor">
+            <a:schemeClr val="tx1"/>
+          </a:fontRef>
+        </p:style>
+      </p:cxnSp>
+      <p:cxnSp>
+        <p:nvCxnSpPr>
+          <p:cNvPr id="200" name="Straight Arrow Connector 199">
+            <a:extLst>
+              <a:ext uri="{FF2B5EF4-FFF2-40B4-BE49-F238E27FC236}">
+                <a16:creationId xmlns:a16="http://schemas.microsoft.com/office/drawing/2014/main" id="{B5886B68-1F19-43D0-82BA-CA8552C67EC2}"/>
+              </a:ext>
+            </a:extLst>
+          </p:cNvPr>
+          <p:cNvCxnSpPr>
+            <a:cxnSpLocks/>
+            <a:stCxn id="192" idx="2"/>
+          </p:cNvCxnSpPr>
+          <p:nvPr/>
+        </p:nvCxnSpPr>
+        <p:spPr>
+          <a:xfrm>
+            <a:off x="1203810" y="5496276"/>
+            <a:ext cx="0" cy="1361724"/>
+          </a:xfrm>
+          <a:prstGeom prst="straightConnector1">
+            <a:avLst/>
+          </a:prstGeom>
+          <a:ln>
+            <a:tailEnd type="triangle"/>
+          </a:ln>
+        </p:spPr>
+        <p:style>
+          <a:lnRef idx="1">
+            <a:schemeClr val="dk1"/>
+          </a:lnRef>
+          <a:fillRef idx="0">
+            <a:schemeClr val="dk1"/>
+          </a:fillRef>
+          <a:effectRef idx="0">
+            <a:schemeClr val="dk1"/>
+          </a:effectRef>
+          <a:fontRef idx="minor">
+            <a:schemeClr val="tx1"/>
+          </a:fontRef>
+        </p:style>
+      </p:cxnSp>
+      <p:sp>
+        <p:nvSpPr>
+          <p:cNvPr id="213" name="TextBox 212">
+            <a:hlinkClick r:id="rId2" action="ppaction://hlinksldjump"/>
+            <a:extLst>
+              <a:ext uri="{FF2B5EF4-FFF2-40B4-BE49-F238E27FC236}">
+                <a16:creationId xmlns:a16="http://schemas.microsoft.com/office/drawing/2014/main" id="{999E1528-FFE1-4E5F-5917-95122140F993}"/>
+              </a:ext>
+            </a:extLst>
+          </p:cNvPr>
+          <p:cNvSpPr txBox="1"/>
+          <p:nvPr/>
+        </p:nvSpPr>
+        <p:spPr>
+          <a:xfrm>
+            <a:off x="102848" y="6177138"/>
+            <a:ext cx="1059000" cy="307777"/>
+          </a:xfrm>
+          <a:prstGeom prst="rect">
+            <a:avLst/>
+          </a:prstGeom>
+          <a:noFill/>
+          <a:ln>
+            <a:solidFill>
+              <a:schemeClr val="tx1"/>
+            </a:solidFill>
+          </a:ln>
+        </p:spPr>
+        <p:txBody>
+          <a:bodyPr wrap="square" rtlCol="0">
+            <a:spAutoFit/>
+          </a:bodyPr>
+          <a:lstStyle/>
+          <a:p>
+            <a:r>
+              <a:rPr lang="en-SG" sz="1400" dirty="0"/>
+              <a:t>Continued..</a:t>
+            </a:r>
+          </a:p>
+        </p:txBody>
+      </p:sp>
+      <p:sp>
+        <p:nvSpPr>
+          <p:cNvPr id="216" name="Flowchart: Magnetic Disk 215">
+            <a:extLst>
+              <a:ext uri="{FF2B5EF4-FFF2-40B4-BE49-F238E27FC236}">
+                <a16:creationId xmlns:a16="http://schemas.microsoft.com/office/drawing/2014/main" id="{02D5A5EF-AFB6-C320-CD42-4B665D967D75}"/>
+              </a:ext>
+            </a:extLst>
+          </p:cNvPr>
+          <p:cNvSpPr/>
+          <p:nvPr/>
+        </p:nvSpPr>
+        <p:spPr>
+          <a:xfrm>
+            <a:off x="2959508" y="69793"/>
+            <a:ext cx="2008947" cy="684304"/>
+          </a:xfrm>
+          <a:prstGeom prst="flowChartMagneticDisk">
+            <a:avLst/>
+          </a:prstGeom>
+          <a:noFill/>
+          <a:ln w="28575">
+            <a:solidFill>
+              <a:srgbClr val="92D050"/>
+            </a:solidFill>
+          </a:ln>
+        </p:spPr>
+        <p:style>
+          <a:lnRef idx="2">
+            <a:schemeClr val="accent1">
+              <a:shade val="50000"/>
+            </a:schemeClr>
+          </a:lnRef>
+          <a:fillRef idx="1">
+            <a:schemeClr val="accent1"/>
+          </a:fillRef>
+          <a:effectRef idx="0">
+            <a:schemeClr val="accent1"/>
+          </a:effectRef>
+          <a:fontRef idx="minor">
+            <a:schemeClr val="lt1"/>
+          </a:fontRef>
+        </p:style>
+        <p:txBody>
+          <a:bodyPr rtlCol="0" anchor="ctr"/>
+          <a:lstStyle/>
+          <a:p>
+            <a:pPr algn="ctr"/>
+            <a:r>
+              <a:rPr lang="en-SG" sz="1000" dirty="0">
+                <a:solidFill>
+                  <a:schemeClr val="tx1"/>
+                </a:solidFill>
+              </a:rPr>
+              <a:t>region_unmet_outflow.csv</a:t>
+            </a:r>
+          </a:p>
+          <a:p>
+            <a:pPr algn="ctr"/>
+            <a:r>
+              <a:rPr lang="en-SG" sz="1000" dirty="0">
+                <a:solidFill>
+                  <a:schemeClr val="tx1"/>
+                </a:solidFill>
+              </a:rPr>
+              <a:t>region_total_outflow.csv</a:t>
+            </a:r>
+          </a:p>
+        </p:txBody>
+      </p:sp>
+      <p:cxnSp>
+        <p:nvCxnSpPr>
+          <p:cNvPr id="226" name="Connector: Elbow 225">
+            <a:extLst>
+              <a:ext uri="{FF2B5EF4-FFF2-40B4-BE49-F238E27FC236}">
+                <a16:creationId xmlns:a16="http://schemas.microsoft.com/office/drawing/2014/main" id="{C34E67BC-68B9-F7C2-B9C7-2E0711E029B5}"/>
+              </a:ext>
+            </a:extLst>
+          </p:cNvPr>
+          <p:cNvCxnSpPr>
+            <a:cxnSpLocks/>
+            <a:stCxn id="231" idx="4"/>
+          </p:cNvCxnSpPr>
+          <p:nvPr/>
+        </p:nvCxnSpPr>
+        <p:spPr>
+          <a:xfrm>
+            <a:off x="10875338" y="337949"/>
+            <a:ext cx="541677" cy="6520051"/>
+          </a:xfrm>
+          <a:prstGeom prst="bentConnector2">
+            <a:avLst/>
+          </a:prstGeom>
+          <a:ln>
+            <a:tailEnd type="triangle"/>
+          </a:ln>
+        </p:spPr>
+        <p:style>
+          <a:lnRef idx="1">
+            <a:schemeClr val="dk1"/>
+          </a:lnRef>
+          <a:fillRef idx="0">
+            <a:schemeClr val="dk1"/>
+          </a:fillRef>
+          <a:effectRef idx="0">
+            <a:schemeClr val="dk1"/>
+          </a:effectRef>
+          <a:fontRef idx="minor">
+            <a:schemeClr val="tx1"/>
+          </a:fontRef>
+        </p:style>
+      </p:cxnSp>
+      <p:sp>
+        <p:nvSpPr>
+          <p:cNvPr id="230" name="Flowchart: Magnetic Disk 229">
+            <a:extLst>
+              <a:ext uri="{FF2B5EF4-FFF2-40B4-BE49-F238E27FC236}">
+                <a16:creationId xmlns:a16="http://schemas.microsoft.com/office/drawing/2014/main" id="{5A5A3A6A-6124-D7B5-0725-825D1714B04F}"/>
+              </a:ext>
+            </a:extLst>
+          </p:cNvPr>
+          <p:cNvSpPr/>
+          <p:nvPr/>
+        </p:nvSpPr>
+        <p:spPr>
+          <a:xfrm>
+            <a:off x="7539407" y="667420"/>
+            <a:ext cx="3226594" cy="635746"/>
+          </a:xfrm>
+          <a:prstGeom prst="flowChartMagneticDisk">
+            <a:avLst/>
+          </a:prstGeom>
+          <a:noFill/>
+          <a:ln w="28575">
+            <a:solidFill>
+              <a:srgbClr val="92D050"/>
+            </a:solidFill>
+          </a:ln>
+        </p:spPr>
+        <p:style>
+          <a:lnRef idx="2">
+            <a:schemeClr val="accent1">
+              <a:shade val="50000"/>
+            </a:schemeClr>
+          </a:lnRef>
+          <a:fillRef idx="1">
+            <a:schemeClr val="accent1"/>
+          </a:fillRef>
+          <a:effectRef idx="0">
+            <a:schemeClr val="accent1"/>
+          </a:effectRef>
+          <a:fontRef idx="minor">
+            <a:schemeClr val="lt1"/>
+          </a:fontRef>
+        </p:style>
+        <p:txBody>
+          <a:bodyPr rtlCol="0" anchor="ctr"/>
+          <a:lstStyle/>
+          <a:p>
+            <a:pPr algn="ctr"/>
+            <a:r>
+              <a:rPr lang="en-SG" sz="1000" dirty="0">
+                <a:solidFill>
+                  <a:schemeClr val="tx1"/>
+                </a:solidFill>
+              </a:rPr>
+              <a:t>tampines_clstr_175_weather_medium_dataset.csv</a:t>
+            </a:r>
+            <a:br>
+              <a:rPr lang="en-SG" sz="1000" dirty="0">
+                <a:solidFill>
+                  <a:schemeClr val="tx1"/>
+                </a:solidFill>
+              </a:rPr>
+            </a:br>
+            <a:r>
+              <a:rPr lang="nn-NO" sz="1000" dirty="0">
+                <a:solidFill>
+                  <a:schemeClr val="tx1"/>
+                </a:solidFill>
+              </a:rPr>
+              <a:t>tampines_region_inflow_medium_dataset_lag_502.csv</a:t>
+            </a:r>
+            <a:br>
+              <a:rPr lang="en-SG" sz="1000" dirty="0">
+                <a:solidFill>
+                  <a:schemeClr val="tx1"/>
+                </a:solidFill>
+              </a:rPr>
+            </a:br>
+            <a:r>
+              <a:rPr lang="nn-NO" sz="1000" dirty="0">
+                <a:solidFill>
+                  <a:schemeClr val="tx1"/>
+                </a:solidFill>
+              </a:rPr>
+              <a:t>tampines_region_demand_medium_dataset_lag_502.csv</a:t>
+            </a:r>
+            <a:endParaRPr lang="en-SG" sz="1000" dirty="0">
+              <a:solidFill>
+                <a:schemeClr val="tx1"/>
+              </a:solidFill>
+            </a:endParaRPr>
+          </a:p>
+        </p:txBody>
+      </p:sp>
+      <p:sp>
+        <p:nvSpPr>
+          <p:cNvPr id="231" name="Flowchart: Magnetic Disk 230">
+            <a:extLst>
+              <a:ext uri="{FF2B5EF4-FFF2-40B4-BE49-F238E27FC236}">
+                <a16:creationId xmlns:a16="http://schemas.microsoft.com/office/drawing/2014/main" id="{F7BC3B90-31C2-ABF4-3521-804328B4B8B5}"/>
+              </a:ext>
+            </a:extLst>
+          </p:cNvPr>
+          <p:cNvSpPr/>
+          <p:nvPr/>
+        </p:nvSpPr>
+        <p:spPr>
+          <a:xfrm>
+            <a:off x="8866391" y="119020"/>
+            <a:ext cx="2008947" cy="437857"/>
+          </a:xfrm>
+          <a:prstGeom prst="flowChartMagneticDisk">
+            <a:avLst/>
+          </a:prstGeom>
+          <a:noFill/>
+          <a:ln w="28575">
+            <a:solidFill>
+              <a:srgbClr val="92D050"/>
+            </a:solidFill>
+          </a:ln>
+        </p:spPr>
+        <p:style>
+          <a:lnRef idx="2">
+            <a:schemeClr val="accent1">
+              <a:shade val="50000"/>
+            </a:schemeClr>
+          </a:lnRef>
+          <a:fillRef idx="1">
+            <a:schemeClr val="accent1"/>
+          </a:fillRef>
+          <a:effectRef idx="0">
+            <a:schemeClr val="accent1"/>
+          </a:effectRef>
+          <a:fontRef idx="minor">
+            <a:schemeClr val="lt1"/>
+          </a:fontRef>
+        </p:style>
+        <p:txBody>
+          <a:bodyPr rtlCol="0" anchor="ctr"/>
+          <a:lstStyle/>
+          <a:p>
+            <a:pPr algn="ctr"/>
+            <a:endParaRPr lang="en-SG" sz="1000" dirty="0">
+              <a:solidFill>
+                <a:schemeClr val="tx1"/>
+              </a:solidFill>
+            </a:endParaRPr>
+          </a:p>
+        </p:txBody>
+      </p:sp>
+      <p:cxnSp>
+        <p:nvCxnSpPr>
+          <p:cNvPr id="243" name="Connector: Elbow 242">
+            <a:extLst>
+              <a:ext uri="{FF2B5EF4-FFF2-40B4-BE49-F238E27FC236}">
+                <a16:creationId xmlns:a16="http://schemas.microsoft.com/office/drawing/2014/main" id="{151C33F0-518C-9DEF-F815-89A83D166D6E}"/>
+              </a:ext>
+            </a:extLst>
+          </p:cNvPr>
+          <p:cNvCxnSpPr>
+            <a:cxnSpLocks/>
+            <a:stCxn id="66" idx="3"/>
+          </p:cNvCxnSpPr>
+          <p:nvPr/>
+        </p:nvCxnSpPr>
+        <p:spPr>
+          <a:xfrm>
+            <a:off x="10277935" y="1683446"/>
+            <a:ext cx="861228" cy="5185396"/>
+          </a:xfrm>
+          <a:prstGeom prst="bentConnector2">
+            <a:avLst/>
+          </a:prstGeom>
+          <a:ln>
+            <a:tailEnd type="triangle"/>
+          </a:ln>
+        </p:spPr>
+        <p:style>
+          <a:lnRef idx="1">
+            <a:schemeClr val="dk1"/>
+          </a:lnRef>
+          <a:fillRef idx="0">
+            <a:schemeClr val="dk1"/>
+          </a:fillRef>
+          <a:effectRef idx="0">
+            <a:schemeClr val="dk1"/>
+          </a:effectRef>
+          <a:fontRef idx="minor">
+            <a:schemeClr val="tx1"/>
+          </a:fontRef>
+        </p:style>
+      </p:cxnSp>
     </p:spTree>
     <p:extLst>
       <p:ext uri="{BB962C8B-B14F-4D97-AF65-F5344CB8AC3E}">
@@ -7648,6 +9251,1186 @@
           <a:chExt cx="0" cy="0"/>
         </a:xfrm>
       </p:grpSpPr>
+      <p:sp>
+        <p:nvSpPr>
+          <p:cNvPr id="13" name="Flowchart: Data 12">
+            <a:extLst>
+              <a:ext uri="{FF2B5EF4-FFF2-40B4-BE49-F238E27FC236}">
+                <a16:creationId xmlns:a16="http://schemas.microsoft.com/office/drawing/2014/main" id="{1836F050-2710-3650-E452-77886A3ED355}"/>
+              </a:ext>
+            </a:extLst>
+          </p:cNvPr>
+          <p:cNvSpPr/>
+          <p:nvPr/>
+        </p:nvSpPr>
+        <p:spPr>
+          <a:xfrm>
+            <a:off x="7773834" y="6211489"/>
+            <a:ext cx="3456601" cy="480195"/>
+          </a:xfrm>
+          <a:prstGeom prst="flowChartInputOutput">
+            <a:avLst/>
+          </a:prstGeom>
+          <a:noFill/>
+          <a:ln w="28575">
+            <a:solidFill>
+              <a:srgbClr val="92D050"/>
+            </a:solidFill>
+          </a:ln>
+        </p:spPr>
+        <p:style>
+          <a:lnRef idx="2">
+            <a:schemeClr val="accent1">
+              <a:shade val="50000"/>
+            </a:schemeClr>
+          </a:lnRef>
+          <a:fillRef idx="1">
+            <a:schemeClr val="accent1"/>
+          </a:fillRef>
+          <a:effectRef idx="0">
+            <a:schemeClr val="accent1"/>
+          </a:effectRef>
+          <a:fontRef idx="minor">
+            <a:schemeClr val="lt1"/>
+          </a:fontRef>
+        </p:style>
+        <p:txBody>
+          <a:bodyPr rtlCol="0" anchor="ctr"/>
+          <a:lstStyle/>
+          <a:p>
+            <a:pPr algn="ctr"/>
+            <a:r>
+              <a:rPr lang="en-SG" sz="1000" b="0" dirty="0">
+                <a:solidFill>
+                  <a:srgbClr val="CE9178"/>
+                </a:solidFill>
+                <a:effectLst/>
+                <a:latin typeface="Consolas" panose="020B0609020204030204" pitchFamily="49" charset="0"/>
+              </a:rPr>
+              <a:t>‘selected_features.csv’</a:t>
+            </a:r>
+          </a:p>
+          <a:p>
+            <a:pPr algn="ctr"/>
+            <a:r>
+              <a:rPr lang="en-SG" sz="1000" b="0" dirty="0">
+                <a:solidFill>
+                  <a:srgbClr val="CE9178"/>
+                </a:solidFill>
+                <a:effectLst/>
+                <a:latin typeface="Consolas" panose="020B0609020204030204" pitchFamily="49" charset="0"/>
+              </a:rPr>
+              <a:t>‘</a:t>
+            </a:r>
+            <a:r>
+              <a:rPr lang="en-SG" sz="1000" dirty="0">
+                <a:solidFill>
+                  <a:srgbClr val="CE9178"/>
+                </a:solidFill>
+                <a:latin typeface="Consolas" panose="020B0609020204030204" pitchFamily="49" charset="0"/>
+              </a:rPr>
+              <a:t>baseline_performance_metrics.csv</a:t>
+            </a:r>
+            <a:r>
+              <a:rPr lang="en-SG" sz="1000" b="0" dirty="0">
+                <a:solidFill>
+                  <a:srgbClr val="CE9178"/>
+                </a:solidFill>
+                <a:effectLst/>
+                <a:latin typeface="Consolas" panose="020B0609020204030204" pitchFamily="49" charset="0"/>
+              </a:rPr>
+              <a:t>’</a:t>
+            </a:r>
+          </a:p>
+        </p:txBody>
+      </p:sp>
+      <p:cxnSp>
+        <p:nvCxnSpPr>
+          <p:cNvPr id="16" name="Straight Arrow Connector 15">
+            <a:extLst>
+              <a:ext uri="{FF2B5EF4-FFF2-40B4-BE49-F238E27FC236}">
+                <a16:creationId xmlns:a16="http://schemas.microsoft.com/office/drawing/2014/main" id="{EE17BCCD-A21B-643E-FE6A-029B0533A182}"/>
+              </a:ext>
+            </a:extLst>
+          </p:cNvPr>
+          <p:cNvCxnSpPr>
+            <a:cxnSpLocks/>
+            <a:stCxn id="13" idx="2"/>
+            <a:endCxn id="17" idx="3"/>
+          </p:cNvCxnSpPr>
+          <p:nvPr/>
+        </p:nvCxnSpPr>
+        <p:spPr>
+          <a:xfrm flipH="1">
+            <a:off x="7198185" y="6451587"/>
+            <a:ext cx="921309" cy="11473"/>
+          </a:xfrm>
+          <a:prstGeom prst="straightConnector1">
+            <a:avLst/>
+          </a:prstGeom>
+          <a:ln>
+            <a:tailEnd type="triangle"/>
+          </a:ln>
+        </p:spPr>
+        <p:style>
+          <a:lnRef idx="1">
+            <a:schemeClr val="dk1"/>
+          </a:lnRef>
+          <a:fillRef idx="0">
+            <a:schemeClr val="dk1"/>
+          </a:fillRef>
+          <a:effectRef idx="0">
+            <a:schemeClr val="dk1"/>
+          </a:effectRef>
+          <a:fontRef idx="minor">
+            <a:schemeClr val="tx1"/>
+          </a:fontRef>
+        </p:style>
+      </p:cxnSp>
+      <p:sp>
+        <p:nvSpPr>
+          <p:cNvPr id="17" name="Flowchart: Process 16">
+            <a:extLst>
+              <a:ext uri="{FF2B5EF4-FFF2-40B4-BE49-F238E27FC236}">
+                <a16:creationId xmlns:a16="http://schemas.microsoft.com/office/drawing/2014/main" id="{C6EF3031-3014-ACD6-8F76-0E8AF6B1645B}"/>
+              </a:ext>
+            </a:extLst>
+          </p:cNvPr>
+          <p:cNvSpPr/>
+          <p:nvPr/>
+        </p:nvSpPr>
+        <p:spPr>
+          <a:xfrm>
+            <a:off x="5105468" y="6278394"/>
+            <a:ext cx="2092717" cy="369332"/>
+          </a:xfrm>
+          <a:prstGeom prst="flowChartProcess">
+            <a:avLst/>
+          </a:prstGeom>
+          <a:noFill/>
+          <a:ln w="28575">
+            <a:solidFill>
+              <a:schemeClr val="accent2">
+                <a:lumMod val="75000"/>
+              </a:schemeClr>
+            </a:solidFill>
+          </a:ln>
+        </p:spPr>
+        <p:style>
+          <a:lnRef idx="2">
+            <a:schemeClr val="accent1">
+              <a:shade val="50000"/>
+            </a:schemeClr>
+          </a:lnRef>
+          <a:fillRef idx="1">
+            <a:schemeClr val="accent1"/>
+          </a:fillRef>
+          <a:effectRef idx="0">
+            <a:schemeClr val="accent1"/>
+          </a:effectRef>
+          <a:fontRef idx="minor">
+            <a:schemeClr val="lt1"/>
+          </a:fontRef>
+        </p:style>
+        <p:txBody>
+          <a:bodyPr rtlCol="0" anchor="ctr"/>
+          <a:lstStyle/>
+          <a:p>
+            <a:pPr algn="ctr"/>
+            <a:r>
+              <a:rPr lang="en-SG" sz="1000" dirty="0" err="1">
+                <a:solidFill>
+                  <a:schemeClr val="tx1"/>
+                </a:solidFill>
+              </a:rPr>
+              <a:t>deepar_performance_monitor.ipynb</a:t>
+            </a:r>
+            <a:endParaRPr lang="en-SG" sz="1000" dirty="0">
+              <a:solidFill>
+                <a:schemeClr val="tx1"/>
+              </a:solidFill>
+            </a:endParaRPr>
+          </a:p>
+        </p:txBody>
+      </p:sp>
+      <p:sp>
+        <p:nvSpPr>
+          <p:cNvPr id="18" name="Multiplication Sign 17">
+            <a:extLst>
+              <a:ext uri="{FF2B5EF4-FFF2-40B4-BE49-F238E27FC236}">
+                <a16:creationId xmlns:a16="http://schemas.microsoft.com/office/drawing/2014/main" id="{CD2316F4-E77D-1CD7-EF4E-D0335069E389}"/>
+              </a:ext>
+            </a:extLst>
+          </p:cNvPr>
+          <p:cNvSpPr/>
+          <p:nvPr/>
+        </p:nvSpPr>
+        <p:spPr>
+          <a:xfrm>
+            <a:off x="10318220" y="5928546"/>
+            <a:ext cx="579421" cy="480195"/>
+          </a:xfrm>
+          <a:prstGeom prst="mathMultiply">
+            <a:avLst/>
+          </a:prstGeom>
+          <a:solidFill>
+            <a:srgbClr val="FF0000"/>
+          </a:solidFill>
+        </p:spPr>
+        <p:style>
+          <a:lnRef idx="2">
+            <a:schemeClr val="accent1">
+              <a:shade val="50000"/>
+            </a:schemeClr>
+          </a:lnRef>
+          <a:fillRef idx="1">
+            <a:schemeClr val="accent1"/>
+          </a:fillRef>
+          <a:effectRef idx="0">
+            <a:schemeClr val="accent1"/>
+          </a:effectRef>
+          <a:fontRef idx="minor">
+            <a:schemeClr val="lt1"/>
+          </a:fontRef>
+        </p:style>
+        <p:txBody>
+          <a:bodyPr rtlCol="0" anchor="ctr"/>
+          <a:lstStyle/>
+          <a:p>
+            <a:pPr algn="ctr"/>
+            <a:endParaRPr lang="en-SG"/>
+          </a:p>
+        </p:txBody>
+      </p:sp>
+      <p:sp>
+        <p:nvSpPr>
+          <p:cNvPr id="21" name="Oval 20">
+            <a:extLst>
+              <a:ext uri="{FF2B5EF4-FFF2-40B4-BE49-F238E27FC236}">
+                <a16:creationId xmlns:a16="http://schemas.microsoft.com/office/drawing/2014/main" id="{FEA2BB11-C4C6-4C76-45AE-F531734B11CE}"/>
+              </a:ext>
+            </a:extLst>
+          </p:cNvPr>
+          <p:cNvSpPr/>
+          <p:nvPr/>
+        </p:nvSpPr>
+        <p:spPr>
+          <a:xfrm>
+            <a:off x="2393825" y="5851430"/>
+            <a:ext cx="2092717" cy="634425"/>
+          </a:xfrm>
+          <a:prstGeom prst="ellipse">
+            <a:avLst/>
+          </a:prstGeom>
+          <a:solidFill>
+            <a:schemeClr val="bg1"/>
+          </a:solidFill>
+          <a:ln w="28575">
+            <a:solidFill>
+              <a:schemeClr val="tx1"/>
+            </a:solidFill>
+          </a:ln>
+        </p:spPr>
+        <p:style>
+          <a:lnRef idx="2">
+            <a:schemeClr val="accent1">
+              <a:shade val="50000"/>
+            </a:schemeClr>
+          </a:lnRef>
+          <a:fillRef idx="1">
+            <a:schemeClr val="accent1"/>
+          </a:fillRef>
+          <a:effectRef idx="0">
+            <a:schemeClr val="accent1"/>
+          </a:effectRef>
+          <a:fontRef idx="minor">
+            <a:schemeClr val="lt1"/>
+          </a:fontRef>
+        </p:style>
+        <p:txBody>
+          <a:bodyPr rtlCol="0" anchor="ctr"/>
+          <a:lstStyle/>
+          <a:p>
+            <a:pPr algn="ctr"/>
+            <a:r>
+              <a:rPr lang="en-SG" sz="1200" b="1" dirty="0">
+                <a:solidFill>
+                  <a:schemeClr val="tx1"/>
+                </a:solidFill>
+              </a:rPr>
+              <a:t>FINISH</a:t>
+            </a:r>
+          </a:p>
+          <a:p>
+            <a:pPr algn="ctr"/>
+            <a:r>
+              <a:rPr lang="en-SG" sz="1200" dirty="0">
+                <a:solidFill>
+                  <a:schemeClr val="tx1"/>
+                </a:solidFill>
+              </a:rPr>
+              <a:t>(Do nothing Or Raise exception)</a:t>
+            </a:r>
+          </a:p>
+        </p:txBody>
+      </p:sp>
+      <p:sp>
+        <p:nvSpPr>
+          <p:cNvPr id="23" name="Multiplication Sign 22">
+            <a:extLst>
+              <a:ext uri="{FF2B5EF4-FFF2-40B4-BE49-F238E27FC236}">
+                <a16:creationId xmlns:a16="http://schemas.microsoft.com/office/drawing/2014/main" id="{3DDB687B-44DC-5C54-03AE-12E63A82CD87}"/>
+              </a:ext>
+            </a:extLst>
+          </p:cNvPr>
+          <p:cNvSpPr/>
+          <p:nvPr/>
+        </p:nvSpPr>
+        <p:spPr>
+          <a:xfrm>
+            <a:off x="6743923" y="5897556"/>
+            <a:ext cx="579421" cy="480195"/>
+          </a:xfrm>
+          <a:prstGeom prst="mathMultiply">
+            <a:avLst/>
+          </a:prstGeom>
+          <a:solidFill>
+            <a:srgbClr val="FF0000"/>
+          </a:solidFill>
+        </p:spPr>
+        <p:style>
+          <a:lnRef idx="2">
+            <a:schemeClr val="accent1">
+              <a:shade val="50000"/>
+            </a:schemeClr>
+          </a:lnRef>
+          <a:fillRef idx="1">
+            <a:schemeClr val="accent1"/>
+          </a:fillRef>
+          <a:effectRef idx="0">
+            <a:schemeClr val="accent1"/>
+          </a:effectRef>
+          <a:fontRef idx="minor">
+            <a:schemeClr val="lt1"/>
+          </a:fontRef>
+        </p:style>
+        <p:txBody>
+          <a:bodyPr rtlCol="0" anchor="ctr"/>
+          <a:lstStyle/>
+          <a:p>
+            <a:pPr algn="ctr"/>
+            <a:endParaRPr lang="en-SG"/>
+          </a:p>
+        </p:txBody>
+      </p:sp>
+      <p:sp>
+        <p:nvSpPr>
+          <p:cNvPr id="25" name="Rectangle: Rounded Corners 24">
+            <a:extLst>
+              <a:ext uri="{FF2B5EF4-FFF2-40B4-BE49-F238E27FC236}">
+                <a16:creationId xmlns:a16="http://schemas.microsoft.com/office/drawing/2014/main" id="{5A6D41DB-DCAF-BECB-CC25-6C293886A2C9}"/>
+              </a:ext>
+            </a:extLst>
+          </p:cNvPr>
+          <p:cNvSpPr/>
+          <p:nvPr/>
+        </p:nvSpPr>
+        <p:spPr>
+          <a:xfrm>
+            <a:off x="259271" y="484948"/>
+            <a:ext cx="2264311" cy="2079491"/>
+          </a:xfrm>
+          <a:prstGeom prst="roundRect">
+            <a:avLst/>
+          </a:prstGeom>
+          <a:solidFill>
+            <a:schemeClr val="accent2">
+              <a:lumMod val="60000"/>
+              <a:lumOff val="40000"/>
+            </a:schemeClr>
+          </a:solidFill>
+        </p:spPr>
+        <p:style>
+          <a:lnRef idx="2">
+            <a:schemeClr val="accent1">
+              <a:shade val="50000"/>
+            </a:schemeClr>
+          </a:lnRef>
+          <a:fillRef idx="1">
+            <a:schemeClr val="accent1"/>
+          </a:fillRef>
+          <a:effectRef idx="0">
+            <a:schemeClr val="accent1"/>
+          </a:effectRef>
+          <a:fontRef idx="minor">
+            <a:schemeClr val="lt1"/>
+          </a:fontRef>
+        </p:style>
+        <p:txBody>
+          <a:bodyPr rtlCol="0" anchor="ctr"/>
+          <a:lstStyle/>
+          <a:p>
+            <a:pPr marL="228600" indent="-228600">
+              <a:buAutoNum type="arabicParenR"/>
+            </a:pPr>
+            <a:r>
+              <a:rPr lang="en-US" sz="1000" dirty="0" err="1"/>
+              <a:t>Treemap</a:t>
+            </a:r>
+            <a:r>
+              <a:rPr lang="en-US" sz="1000" dirty="0"/>
+              <a:t>/Heatmap of Week over Week met, unmet and total demand. Highest/Lowest hour of day of week.</a:t>
+            </a:r>
+          </a:p>
+          <a:p>
+            <a:pPr marL="228600" indent="-228600">
+              <a:buAutoNum type="arabicParenR"/>
+            </a:pPr>
+            <a:r>
+              <a:rPr lang="en-US" sz="1000" dirty="0"/>
+              <a:t>Distributions of met, unmet and total demand.</a:t>
+            </a:r>
+          </a:p>
+          <a:p>
+            <a:pPr marL="228600" indent="-228600">
+              <a:buAutoNum type="arabicParenR"/>
+            </a:pPr>
+            <a:r>
+              <a:rPr lang="en-US" sz="1000" dirty="0"/>
+              <a:t>FFT plot showing times when peaks and troughs in TS</a:t>
+            </a:r>
+          </a:p>
+          <a:p>
+            <a:pPr marL="228600" indent="-228600">
+              <a:buAutoNum type="arabicParenR"/>
+            </a:pPr>
+            <a:r>
+              <a:rPr lang="en-US" sz="1000" dirty="0"/>
+              <a:t>Boxplot of </a:t>
+            </a:r>
+            <a:r>
+              <a:rPr lang="en-US" sz="1000" dirty="0" err="1"/>
+              <a:t>hourly,daily</a:t>
+            </a:r>
+            <a:r>
+              <a:rPr lang="en-US" sz="1000" dirty="0"/>
+              <a:t>,  distribution of met, unmet and total demand.</a:t>
+            </a:r>
+          </a:p>
+          <a:p>
+            <a:pPr marL="228600" indent="-228600">
+              <a:buAutoNum type="arabicParenR"/>
+            </a:pPr>
+            <a:r>
+              <a:rPr lang="en-US" sz="1000" dirty="0"/>
+              <a:t>Daily Seasonal plots for anomaly detection.</a:t>
+            </a:r>
+          </a:p>
+        </p:txBody>
+      </p:sp>
+      <p:cxnSp>
+        <p:nvCxnSpPr>
+          <p:cNvPr id="26" name="Straight Arrow Connector 25">
+            <a:extLst>
+              <a:ext uri="{FF2B5EF4-FFF2-40B4-BE49-F238E27FC236}">
+                <a16:creationId xmlns:a16="http://schemas.microsoft.com/office/drawing/2014/main" id="{35DD52EC-B655-4D37-4EAE-61D0BB7AA167}"/>
+              </a:ext>
+            </a:extLst>
+          </p:cNvPr>
+          <p:cNvCxnSpPr>
+            <a:cxnSpLocks/>
+            <a:endCxn id="25" idx="0"/>
+          </p:cNvCxnSpPr>
+          <p:nvPr/>
+        </p:nvCxnSpPr>
+        <p:spPr>
+          <a:xfrm>
+            <a:off x="1391427" y="90530"/>
+            <a:ext cx="0" cy="394418"/>
+          </a:xfrm>
+          <a:prstGeom prst="straightConnector1">
+            <a:avLst/>
+          </a:prstGeom>
+          <a:ln>
+            <a:tailEnd type="triangle"/>
+          </a:ln>
+        </p:spPr>
+        <p:style>
+          <a:lnRef idx="1">
+            <a:schemeClr val="dk1"/>
+          </a:lnRef>
+          <a:fillRef idx="0">
+            <a:schemeClr val="dk1"/>
+          </a:fillRef>
+          <a:effectRef idx="0">
+            <a:schemeClr val="dk1"/>
+          </a:effectRef>
+          <a:fontRef idx="minor">
+            <a:schemeClr val="tx1"/>
+          </a:fontRef>
+        </p:style>
+      </p:cxnSp>
+      <p:sp>
+        <p:nvSpPr>
+          <p:cNvPr id="29" name="TextBox 28">
+            <a:hlinkClick r:id="rId2" action="ppaction://hlinksldjump"/>
+            <a:extLst>
+              <a:ext uri="{FF2B5EF4-FFF2-40B4-BE49-F238E27FC236}">
+                <a16:creationId xmlns:a16="http://schemas.microsoft.com/office/drawing/2014/main" id="{0CAFD957-556D-77D8-5873-8F8E7E91EA48}"/>
+              </a:ext>
+            </a:extLst>
+          </p:cNvPr>
+          <p:cNvSpPr txBox="1"/>
+          <p:nvPr/>
+        </p:nvSpPr>
+        <p:spPr>
+          <a:xfrm>
+            <a:off x="226464" y="61383"/>
+            <a:ext cx="1059000" cy="307777"/>
+          </a:xfrm>
+          <a:prstGeom prst="rect">
+            <a:avLst/>
+          </a:prstGeom>
+          <a:noFill/>
+          <a:ln>
+            <a:solidFill>
+              <a:schemeClr val="tx1"/>
+            </a:solidFill>
+          </a:ln>
+        </p:spPr>
+        <p:txBody>
+          <a:bodyPr wrap="square" rtlCol="0">
+            <a:spAutoFit/>
+          </a:bodyPr>
+          <a:lstStyle/>
+          <a:p>
+            <a:r>
+              <a:rPr lang="en-SG" sz="1400" dirty="0"/>
+              <a:t>Continued..</a:t>
+            </a:r>
+          </a:p>
+        </p:txBody>
+      </p:sp>
+      <p:sp>
+        <p:nvSpPr>
+          <p:cNvPr id="32" name="Flowchart: Process 31">
+            <a:extLst>
+              <a:ext uri="{FF2B5EF4-FFF2-40B4-BE49-F238E27FC236}">
+                <a16:creationId xmlns:a16="http://schemas.microsoft.com/office/drawing/2014/main" id="{851E3053-C830-20FA-6C6D-8D386A28FAED}"/>
+              </a:ext>
+            </a:extLst>
+          </p:cNvPr>
+          <p:cNvSpPr/>
+          <p:nvPr/>
+        </p:nvSpPr>
+        <p:spPr>
+          <a:xfrm>
+            <a:off x="4956967" y="5536435"/>
+            <a:ext cx="2209731" cy="369332"/>
+          </a:xfrm>
+          <a:prstGeom prst="flowChartProcess">
+            <a:avLst/>
+          </a:prstGeom>
+          <a:noFill/>
+          <a:ln w="28575">
+            <a:solidFill>
+              <a:schemeClr val="accent2">
+                <a:lumMod val="75000"/>
+              </a:schemeClr>
+            </a:solidFill>
+          </a:ln>
+        </p:spPr>
+        <p:style>
+          <a:lnRef idx="2">
+            <a:schemeClr val="accent1">
+              <a:shade val="50000"/>
+            </a:schemeClr>
+          </a:lnRef>
+          <a:fillRef idx="1">
+            <a:schemeClr val="accent1"/>
+          </a:fillRef>
+          <a:effectRef idx="0">
+            <a:schemeClr val="accent1"/>
+          </a:effectRef>
+          <a:fontRef idx="minor">
+            <a:schemeClr val="lt1"/>
+          </a:fontRef>
+        </p:style>
+        <p:txBody>
+          <a:bodyPr rtlCol="0" anchor="ctr"/>
+          <a:lstStyle/>
+          <a:p>
+            <a:pPr algn="ctr"/>
+            <a:r>
+              <a:rPr lang="en-SG" sz="1000" dirty="0" err="1">
+                <a:solidFill>
+                  <a:schemeClr val="tx1"/>
+                </a:solidFill>
+              </a:rPr>
+              <a:t>xgboost_performance_monitor.ipynb</a:t>
+            </a:r>
+            <a:endParaRPr lang="en-SG" sz="1000" dirty="0">
+              <a:solidFill>
+                <a:schemeClr val="tx1"/>
+              </a:solidFill>
+            </a:endParaRPr>
+          </a:p>
+        </p:txBody>
+      </p:sp>
+      <p:sp>
+        <p:nvSpPr>
+          <p:cNvPr id="33" name="Multiplication Sign 32">
+            <a:extLst>
+              <a:ext uri="{FF2B5EF4-FFF2-40B4-BE49-F238E27FC236}">
+                <a16:creationId xmlns:a16="http://schemas.microsoft.com/office/drawing/2014/main" id="{80B143F1-C6CA-3FA3-148B-D505AC3618FE}"/>
+              </a:ext>
+            </a:extLst>
+          </p:cNvPr>
+          <p:cNvSpPr/>
+          <p:nvPr/>
+        </p:nvSpPr>
+        <p:spPr>
+          <a:xfrm>
+            <a:off x="6164502" y="5240906"/>
+            <a:ext cx="579421" cy="480195"/>
+          </a:xfrm>
+          <a:prstGeom prst="mathMultiply">
+            <a:avLst/>
+          </a:prstGeom>
+          <a:solidFill>
+            <a:srgbClr val="FF0000"/>
+          </a:solidFill>
+        </p:spPr>
+        <p:style>
+          <a:lnRef idx="2">
+            <a:schemeClr val="accent1">
+              <a:shade val="50000"/>
+            </a:schemeClr>
+          </a:lnRef>
+          <a:fillRef idx="1">
+            <a:schemeClr val="accent1"/>
+          </a:fillRef>
+          <a:effectRef idx="0">
+            <a:schemeClr val="accent1"/>
+          </a:effectRef>
+          <a:fontRef idx="minor">
+            <a:schemeClr val="lt1"/>
+          </a:fontRef>
+        </p:style>
+        <p:txBody>
+          <a:bodyPr rtlCol="0" anchor="ctr"/>
+          <a:lstStyle/>
+          <a:p>
+            <a:pPr algn="ctr"/>
+            <a:endParaRPr lang="en-SG"/>
+          </a:p>
+        </p:txBody>
+      </p:sp>
+      <p:cxnSp>
+        <p:nvCxnSpPr>
+          <p:cNvPr id="35" name="Connector: Elbow 34">
+            <a:extLst>
+              <a:ext uri="{FF2B5EF4-FFF2-40B4-BE49-F238E27FC236}">
+                <a16:creationId xmlns:a16="http://schemas.microsoft.com/office/drawing/2014/main" id="{A5C7BC36-7862-2BFC-72F3-4DCE2FF7A75E}"/>
+              </a:ext>
+            </a:extLst>
+          </p:cNvPr>
+          <p:cNvCxnSpPr>
+            <a:cxnSpLocks/>
+            <a:stCxn id="13" idx="2"/>
+            <a:endCxn id="32" idx="3"/>
+          </p:cNvCxnSpPr>
+          <p:nvPr/>
+        </p:nvCxnSpPr>
+        <p:spPr>
+          <a:xfrm rot="10800000">
+            <a:off x="7166698" y="5721101"/>
+            <a:ext cx="952796" cy="730486"/>
+          </a:xfrm>
+          <a:prstGeom prst="bentConnector3">
+            <a:avLst/>
+          </a:prstGeom>
+          <a:ln>
+            <a:solidFill>
+              <a:schemeClr val="tx1"/>
+            </a:solidFill>
+            <a:tailEnd type="triangle"/>
+          </a:ln>
+        </p:spPr>
+        <p:style>
+          <a:lnRef idx="1">
+            <a:schemeClr val="accent1"/>
+          </a:lnRef>
+          <a:fillRef idx="0">
+            <a:schemeClr val="accent1"/>
+          </a:fillRef>
+          <a:effectRef idx="0">
+            <a:schemeClr val="accent1"/>
+          </a:effectRef>
+          <a:fontRef idx="minor">
+            <a:schemeClr val="tx1"/>
+          </a:fontRef>
+        </p:style>
+      </p:cxnSp>
+      <p:cxnSp>
+        <p:nvCxnSpPr>
+          <p:cNvPr id="37" name="Connector: Elbow 36">
+            <a:extLst>
+              <a:ext uri="{FF2B5EF4-FFF2-40B4-BE49-F238E27FC236}">
+                <a16:creationId xmlns:a16="http://schemas.microsoft.com/office/drawing/2014/main" id="{3EE45B08-D91D-32B3-754A-16F5ED18D263}"/>
+              </a:ext>
+            </a:extLst>
+          </p:cNvPr>
+          <p:cNvCxnSpPr>
+            <a:cxnSpLocks/>
+            <a:stCxn id="32" idx="1"/>
+            <a:endCxn id="21" idx="6"/>
+          </p:cNvCxnSpPr>
+          <p:nvPr/>
+        </p:nvCxnSpPr>
+        <p:spPr>
+          <a:xfrm rot="10800000" flipV="1">
+            <a:off x="4486543" y="5721101"/>
+            <a:ext cx="470425" cy="447542"/>
+          </a:xfrm>
+          <a:prstGeom prst="bentConnector3">
+            <a:avLst/>
+          </a:prstGeom>
+          <a:ln>
+            <a:solidFill>
+              <a:schemeClr val="tx1"/>
+            </a:solidFill>
+            <a:tailEnd type="triangle"/>
+          </a:ln>
+        </p:spPr>
+        <p:style>
+          <a:lnRef idx="1">
+            <a:schemeClr val="accent1"/>
+          </a:lnRef>
+          <a:fillRef idx="0">
+            <a:schemeClr val="accent1"/>
+          </a:fillRef>
+          <a:effectRef idx="0">
+            <a:schemeClr val="accent1"/>
+          </a:effectRef>
+          <a:fontRef idx="minor">
+            <a:schemeClr val="tx1"/>
+          </a:fontRef>
+        </p:style>
+      </p:cxnSp>
+      <p:cxnSp>
+        <p:nvCxnSpPr>
+          <p:cNvPr id="40" name="Connector: Elbow 39">
+            <a:extLst>
+              <a:ext uri="{FF2B5EF4-FFF2-40B4-BE49-F238E27FC236}">
+                <a16:creationId xmlns:a16="http://schemas.microsoft.com/office/drawing/2014/main" id="{A3DFA0CB-CB62-F88C-B97C-931604F69A38}"/>
+              </a:ext>
+            </a:extLst>
+          </p:cNvPr>
+          <p:cNvCxnSpPr>
+            <a:cxnSpLocks/>
+            <a:stCxn id="17" idx="1"/>
+            <a:endCxn id="21" idx="6"/>
+          </p:cNvCxnSpPr>
+          <p:nvPr/>
+        </p:nvCxnSpPr>
+        <p:spPr>
+          <a:xfrm rot="10800000">
+            <a:off x="4486542" y="6168644"/>
+            <a:ext cx="618926" cy="294417"/>
+          </a:xfrm>
+          <a:prstGeom prst="bentConnector3">
+            <a:avLst/>
+          </a:prstGeom>
+          <a:ln>
+            <a:solidFill>
+              <a:schemeClr val="tx1"/>
+            </a:solidFill>
+            <a:tailEnd type="triangle"/>
+          </a:ln>
+        </p:spPr>
+        <p:style>
+          <a:lnRef idx="1">
+            <a:schemeClr val="accent1"/>
+          </a:lnRef>
+          <a:fillRef idx="0">
+            <a:schemeClr val="accent1"/>
+          </a:fillRef>
+          <a:effectRef idx="0">
+            <a:schemeClr val="accent1"/>
+          </a:effectRef>
+          <a:fontRef idx="minor">
+            <a:schemeClr val="tx1"/>
+          </a:fontRef>
+        </p:style>
+      </p:cxnSp>
+      <p:sp>
+        <p:nvSpPr>
+          <p:cNvPr id="43" name="TextBox 42">
+            <a:extLst>
+              <a:ext uri="{FF2B5EF4-FFF2-40B4-BE49-F238E27FC236}">
+                <a16:creationId xmlns:a16="http://schemas.microsoft.com/office/drawing/2014/main" id="{6F11A660-5EC6-EC2A-A3C5-317B87BF933C}"/>
+              </a:ext>
+            </a:extLst>
+          </p:cNvPr>
+          <p:cNvSpPr txBox="1"/>
+          <p:nvPr/>
+        </p:nvSpPr>
+        <p:spPr>
+          <a:xfrm>
+            <a:off x="11519765" y="127048"/>
+            <a:ext cx="569387" cy="6411976"/>
+          </a:xfrm>
+          <a:prstGeom prst="rect">
+            <a:avLst/>
+          </a:prstGeom>
+          <a:solidFill>
+            <a:srgbClr val="FF0000"/>
+          </a:solidFill>
+        </p:spPr>
+        <p:txBody>
+          <a:bodyPr vert="eaVert" wrap="square" rtlCol="0">
+            <a:spAutoFit/>
+          </a:bodyPr>
+          <a:lstStyle/>
+          <a:p>
+            <a:pPr algn="ctr"/>
+            <a:r>
+              <a:rPr lang="en-US" sz="2500" dirty="0">
+                <a:solidFill>
+                  <a:srgbClr val="FFFF00"/>
+                </a:solidFill>
+              </a:rPr>
+              <a:t>VISUALIZATION Control Flow 2</a:t>
+            </a:r>
+            <a:endParaRPr lang="en-SG" sz="2500" dirty="0">
+              <a:solidFill>
+                <a:srgbClr val="FFFF00"/>
+              </a:solidFill>
+            </a:endParaRPr>
+          </a:p>
+        </p:txBody>
+      </p:sp>
+      <p:sp>
+        <p:nvSpPr>
+          <p:cNvPr id="44" name="Rectangle: Rounded Corners 43">
+            <a:extLst>
+              <a:ext uri="{FF2B5EF4-FFF2-40B4-BE49-F238E27FC236}">
+                <a16:creationId xmlns:a16="http://schemas.microsoft.com/office/drawing/2014/main" id="{C0044931-5869-3C2D-8C05-501D1E847C39}"/>
+              </a:ext>
+            </a:extLst>
+          </p:cNvPr>
+          <p:cNvSpPr/>
+          <p:nvPr/>
+        </p:nvSpPr>
+        <p:spPr>
+          <a:xfrm>
+            <a:off x="8343619" y="1279473"/>
+            <a:ext cx="2264311" cy="1419892"/>
+          </a:xfrm>
+          <a:prstGeom prst="roundRect">
+            <a:avLst/>
+          </a:prstGeom>
+          <a:solidFill>
+            <a:schemeClr val="accent2">
+              <a:lumMod val="60000"/>
+              <a:lumOff val="40000"/>
+            </a:schemeClr>
+          </a:solidFill>
+        </p:spPr>
+        <p:style>
+          <a:lnRef idx="2">
+            <a:schemeClr val="accent1">
+              <a:shade val="50000"/>
+            </a:schemeClr>
+          </a:lnRef>
+          <a:fillRef idx="1">
+            <a:schemeClr val="accent1"/>
+          </a:fillRef>
+          <a:effectRef idx="0">
+            <a:schemeClr val="accent1"/>
+          </a:effectRef>
+          <a:fontRef idx="minor">
+            <a:schemeClr val="lt1"/>
+          </a:fontRef>
+        </p:style>
+        <p:txBody>
+          <a:bodyPr rtlCol="0" anchor="ctr"/>
+          <a:lstStyle/>
+          <a:p>
+            <a:r>
+              <a:rPr lang="en-US" sz="1000" dirty="0"/>
+              <a:t>Overall Analysis of All clusters</a:t>
+            </a:r>
+          </a:p>
+          <a:p>
+            <a:pPr marL="228600" indent="-228600">
+              <a:buAutoNum type="arabicParenR"/>
+            </a:pPr>
+            <a:r>
+              <a:rPr lang="en-US" sz="1000" dirty="0"/>
+              <a:t>Pandas profiling all clusters in region</a:t>
+            </a:r>
+          </a:p>
+          <a:p>
+            <a:pPr marL="228600" indent="-228600">
+              <a:buAutoNum type="arabicParenR"/>
+            </a:pPr>
+            <a:r>
+              <a:rPr lang="en-US" sz="1000" dirty="0"/>
+              <a:t>“Non-geographical grouping of clusters (clustering)</a:t>
+            </a:r>
+          </a:p>
+          <a:p>
+            <a:pPr marL="228600" indent="-228600">
+              <a:buAutoNum type="arabicParenR"/>
+            </a:pPr>
+            <a:r>
+              <a:rPr lang="en-SG" sz="1000" dirty="0"/>
+              <a:t>Gain Model-related insights like upper and lower bound of predictions</a:t>
+            </a:r>
+          </a:p>
+        </p:txBody>
+      </p:sp>
+      <p:cxnSp>
+        <p:nvCxnSpPr>
+          <p:cNvPr id="45" name="Connector: Elbow 44">
+            <a:extLst>
+              <a:ext uri="{FF2B5EF4-FFF2-40B4-BE49-F238E27FC236}">
+                <a16:creationId xmlns:a16="http://schemas.microsoft.com/office/drawing/2014/main" id="{2DC87C59-AD27-081E-E45F-66CC65817AC2}"/>
+              </a:ext>
+            </a:extLst>
+          </p:cNvPr>
+          <p:cNvCxnSpPr>
+            <a:cxnSpLocks/>
+            <a:endCxn id="46" idx="3"/>
+          </p:cNvCxnSpPr>
+          <p:nvPr/>
+        </p:nvCxnSpPr>
+        <p:spPr>
+          <a:xfrm rot="5400000">
+            <a:off x="10381785" y="145321"/>
+            <a:ext cx="828863" cy="660986"/>
+          </a:xfrm>
+          <a:prstGeom prst="bentConnector2">
+            <a:avLst/>
+          </a:prstGeom>
+          <a:ln>
+            <a:tailEnd type="triangle"/>
+          </a:ln>
+        </p:spPr>
+        <p:style>
+          <a:lnRef idx="1">
+            <a:schemeClr val="dk1"/>
+          </a:lnRef>
+          <a:fillRef idx="0">
+            <a:schemeClr val="dk1"/>
+          </a:fillRef>
+          <a:effectRef idx="0">
+            <a:schemeClr val="dk1"/>
+          </a:effectRef>
+          <a:fontRef idx="minor">
+            <a:schemeClr val="tx1"/>
+          </a:fontRef>
+        </p:style>
+      </p:cxnSp>
+      <p:sp>
+        <p:nvSpPr>
+          <p:cNvPr id="46" name="Flowchart: Process 45">
+            <a:extLst>
+              <a:ext uri="{FF2B5EF4-FFF2-40B4-BE49-F238E27FC236}">
+                <a16:creationId xmlns:a16="http://schemas.microsoft.com/office/drawing/2014/main" id="{625713E8-1D4D-C5C1-3DB7-3795C580076F}"/>
+              </a:ext>
+            </a:extLst>
+          </p:cNvPr>
+          <p:cNvSpPr/>
+          <p:nvPr/>
+        </p:nvSpPr>
+        <p:spPr>
+          <a:xfrm>
+            <a:off x="8201412" y="705580"/>
+            <a:ext cx="2264311" cy="369332"/>
+          </a:xfrm>
+          <a:prstGeom prst="flowChartProcess">
+            <a:avLst/>
+          </a:prstGeom>
+          <a:noFill/>
+          <a:ln w="28575">
+            <a:solidFill>
+              <a:schemeClr val="accent2">
+                <a:lumMod val="75000"/>
+              </a:schemeClr>
+            </a:solidFill>
+          </a:ln>
+        </p:spPr>
+        <p:style>
+          <a:lnRef idx="2">
+            <a:schemeClr val="accent1">
+              <a:shade val="50000"/>
+            </a:schemeClr>
+          </a:lnRef>
+          <a:fillRef idx="1">
+            <a:schemeClr val="accent1"/>
+          </a:fillRef>
+          <a:effectRef idx="0">
+            <a:schemeClr val="accent1"/>
+          </a:effectRef>
+          <a:fontRef idx="minor">
+            <a:schemeClr val="lt1"/>
+          </a:fontRef>
+        </p:style>
+        <p:txBody>
+          <a:bodyPr rtlCol="0" anchor="ctr"/>
+          <a:lstStyle/>
+          <a:p>
+            <a:pPr algn="ctr"/>
+            <a:r>
+              <a:rPr lang="en-US" sz="1000" dirty="0" err="1">
+                <a:solidFill>
+                  <a:schemeClr val="tx1"/>
+                </a:solidFill>
+              </a:rPr>
+              <a:t>cluster_unmet_demand_analysis.ipynb</a:t>
+            </a:r>
+            <a:endParaRPr lang="en-SG" sz="1000" dirty="0">
+              <a:solidFill>
+                <a:schemeClr val="tx1"/>
+              </a:solidFill>
+            </a:endParaRPr>
+          </a:p>
+        </p:txBody>
+      </p:sp>
+      <p:sp>
+        <p:nvSpPr>
+          <p:cNvPr id="48" name="TextBox 47">
+            <a:hlinkClick r:id="rId2" action="ppaction://hlinksldjump"/>
+            <a:extLst>
+              <a:ext uri="{FF2B5EF4-FFF2-40B4-BE49-F238E27FC236}">
+                <a16:creationId xmlns:a16="http://schemas.microsoft.com/office/drawing/2014/main" id="{268C1A89-2A6B-04A0-3F25-B88A72B557FD}"/>
+              </a:ext>
+            </a:extLst>
+          </p:cNvPr>
+          <p:cNvSpPr txBox="1"/>
+          <p:nvPr/>
+        </p:nvSpPr>
+        <p:spPr>
+          <a:xfrm>
+            <a:off x="10800573" y="177171"/>
+            <a:ext cx="1059000" cy="307777"/>
+          </a:xfrm>
+          <a:prstGeom prst="rect">
+            <a:avLst/>
+          </a:prstGeom>
+          <a:noFill/>
+          <a:ln>
+            <a:solidFill>
+              <a:schemeClr val="tx1"/>
+            </a:solidFill>
+          </a:ln>
+        </p:spPr>
+        <p:txBody>
+          <a:bodyPr wrap="square" rtlCol="0">
+            <a:spAutoFit/>
+          </a:bodyPr>
+          <a:lstStyle/>
+          <a:p>
+            <a:r>
+              <a:rPr lang="en-SG" sz="1400" dirty="0"/>
+              <a:t>Continued..</a:t>
+            </a:r>
+          </a:p>
+        </p:txBody>
+      </p:sp>
+      <p:cxnSp>
+        <p:nvCxnSpPr>
+          <p:cNvPr id="50" name="Connector: Elbow 49">
+            <a:extLst>
+              <a:ext uri="{FF2B5EF4-FFF2-40B4-BE49-F238E27FC236}">
+                <a16:creationId xmlns:a16="http://schemas.microsoft.com/office/drawing/2014/main" id="{F8A83B85-BFA7-5ECD-523B-E8353C86793E}"/>
+              </a:ext>
+            </a:extLst>
+          </p:cNvPr>
+          <p:cNvCxnSpPr>
+            <a:cxnSpLocks/>
+            <a:endCxn id="13" idx="5"/>
+          </p:cNvCxnSpPr>
+          <p:nvPr/>
+        </p:nvCxnSpPr>
+        <p:spPr>
+          <a:xfrm rot="16200000" flipH="1">
+            <a:off x="7647572" y="3214383"/>
+            <a:ext cx="6390205" cy="84202"/>
+          </a:xfrm>
+          <a:prstGeom prst="bentConnector4">
+            <a:avLst>
+              <a:gd name="adj1" fmla="val 48121"/>
+              <a:gd name="adj2" fmla="val 782003"/>
+            </a:avLst>
+          </a:prstGeom>
+          <a:ln>
+            <a:tailEnd type="triangle"/>
+          </a:ln>
+        </p:spPr>
+        <p:style>
+          <a:lnRef idx="1">
+            <a:schemeClr val="dk1"/>
+          </a:lnRef>
+          <a:fillRef idx="0">
+            <a:schemeClr val="dk1"/>
+          </a:fillRef>
+          <a:effectRef idx="0">
+            <a:schemeClr val="dk1"/>
+          </a:effectRef>
+          <a:fontRef idx="minor">
+            <a:schemeClr val="tx1"/>
+          </a:fontRef>
+        </p:style>
+      </p:cxnSp>
+      <p:cxnSp>
+        <p:nvCxnSpPr>
+          <p:cNvPr id="55" name="Connector: Elbow 54">
+            <a:extLst>
+              <a:ext uri="{FF2B5EF4-FFF2-40B4-BE49-F238E27FC236}">
+                <a16:creationId xmlns:a16="http://schemas.microsoft.com/office/drawing/2014/main" id="{DB470CF2-EFCC-A072-669B-D332E1296299}"/>
+              </a:ext>
+            </a:extLst>
+          </p:cNvPr>
+          <p:cNvCxnSpPr>
+            <a:cxnSpLocks/>
+            <a:stCxn id="46" idx="2"/>
+            <a:endCxn id="13" idx="0"/>
+          </p:cNvCxnSpPr>
+          <p:nvPr/>
+        </p:nvCxnSpPr>
+        <p:spPr>
+          <a:xfrm rot="16200000" flipH="1">
+            <a:off x="7022393" y="3386086"/>
+            <a:ext cx="5136577" cy="514227"/>
+          </a:xfrm>
+          <a:prstGeom prst="bentConnector3">
+            <a:avLst>
+              <a:gd name="adj1" fmla="val 1882"/>
+            </a:avLst>
+          </a:prstGeom>
+          <a:ln>
+            <a:tailEnd type="triangle"/>
+          </a:ln>
+        </p:spPr>
+        <p:style>
+          <a:lnRef idx="1">
+            <a:schemeClr val="dk1"/>
+          </a:lnRef>
+          <a:fillRef idx="0">
+            <a:schemeClr val="dk1"/>
+          </a:fillRef>
+          <a:effectRef idx="0">
+            <a:schemeClr val="dk1"/>
+          </a:effectRef>
+          <a:fontRef idx="minor">
+            <a:schemeClr val="tx1"/>
+          </a:fontRef>
+        </p:style>
+      </p:cxnSp>
     </p:spTree>
     <p:extLst>
       <p:ext uri="{BB962C8B-B14F-4D97-AF65-F5344CB8AC3E}">

</xml_diff>